<commit_message>
Update the background introduction section.
</commit_message>
<xml_diff>
--- a/OT_System_Attack_Case_Study/Railway_HQ_HMI/img/designDoc.pptx
+++ b/OT_System_Attack_Case_Study/Railway_HQ_HMI/img/designDoc.pptx
@@ -6,6 +6,8 @@
   </p:sldMasterIdLst>
   <p:sldIdLst>
     <p:sldId id="256" r:id="rId2"/>
+    <p:sldId id="257" r:id="rId3"/>
+    <p:sldId id="258" r:id="rId4"/>
   </p:sldIdLst>
   <p:sldSz cx="12192000" cy="6858000"/>
   <p:notesSz cx="6858000" cy="9144000"/>
@@ -104,6 +106,11 @@
       </a:defRPr>
     </a:lvl9pPr>
   </p:defaultTextStyle>
+  <p:extLst>
+    <p:ext uri="{EFAFB233-063F-42B5-8137-9DF3F51BA10A}">
+      <p15:sldGuideLst xmlns:p15="http://schemas.microsoft.com/office/powerpoint/2012/main"/>
+    </p:ext>
+  </p:extLst>
 </p:presentation>
 </file>
 
@@ -256,7 +263,7 @@
           <a:p>
             <a:fld id="{F2DA730E-443D-4FEA-B256-D307B42C74F1}" type="datetimeFigureOut">
               <a:rPr lang="en-SG" smtClean="0"/>
-              <a:t>13/6/2025</a:t>
+              <a:t>14/6/2025</a:t>
             </a:fld>
             <a:endParaRPr lang="en-SG"/>
           </a:p>
@@ -456,7 +463,7 @@
           <a:p>
             <a:fld id="{F2DA730E-443D-4FEA-B256-D307B42C74F1}" type="datetimeFigureOut">
               <a:rPr lang="en-SG" smtClean="0"/>
-              <a:t>13/6/2025</a:t>
+              <a:t>14/6/2025</a:t>
             </a:fld>
             <a:endParaRPr lang="en-SG"/>
           </a:p>
@@ -666,7 +673,7 @@
           <a:p>
             <a:fld id="{F2DA730E-443D-4FEA-B256-D307B42C74F1}" type="datetimeFigureOut">
               <a:rPr lang="en-SG" smtClean="0"/>
-              <a:t>13/6/2025</a:t>
+              <a:t>14/6/2025</a:t>
             </a:fld>
             <a:endParaRPr lang="en-SG"/>
           </a:p>
@@ -866,7 +873,7 @@
           <a:p>
             <a:fld id="{F2DA730E-443D-4FEA-B256-D307B42C74F1}" type="datetimeFigureOut">
               <a:rPr lang="en-SG" smtClean="0"/>
-              <a:t>13/6/2025</a:t>
+              <a:t>14/6/2025</a:t>
             </a:fld>
             <a:endParaRPr lang="en-SG"/>
           </a:p>
@@ -1142,7 +1149,7 @@
           <a:p>
             <a:fld id="{F2DA730E-443D-4FEA-B256-D307B42C74F1}" type="datetimeFigureOut">
               <a:rPr lang="en-SG" smtClean="0"/>
-              <a:t>13/6/2025</a:t>
+              <a:t>14/6/2025</a:t>
             </a:fld>
             <a:endParaRPr lang="en-SG"/>
           </a:p>
@@ -1410,7 +1417,7 @@
           <a:p>
             <a:fld id="{F2DA730E-443D-4FEA-B256-D307B42C74F1}" type="datetimeFigureOut">
               <a:rPr lang="en-SG" smtClean="0"/>
-              <a:t>13/6/2025</a:t>
+              <a:t>14/6/2025</a:t>
             </a:fld>
             <a:endParaRPr lang="en-SG"/>
           </a:p>
@@ -1825,7 +1832,7 @@
           <a:p>
             <a:fld id="{F2DA730E-443D-4FEA-B256-D307B42C74F1}" type="datetimeFigureOut">
               <a:rPr lang="en-SG" smtClean="0"/>
-              <a:t>13/6/2025</a:t>
+              <a:t>14/6/2025</a:t>
             </a:fld>
             <a:endParaRPr lang="en-SG"/>
           </a:p>
@@ -1967,7 +1974,7 @@
           <a:p>
             <a:fld id="{F2DA730E-443D-4FEA-B256-D307B42C74F1}" type="datetimeFigureOut">
               <a:rPr lang="en-SG" smtClean="0"/>
-              <a:t>13/6/2025</a:t>
+              <a:t>14/6/2025</a:t>
             </a:fld>
             <a:endParaRPr lang="en-SG"/>
           </a:p>
@@ -2080,7 +2087,7 @@
           <a:p>
             <a:fld id="{F2DA730E-443D-4FEA-B256-D307B42C74F1}" type="datetimeFigureOut">
               <a:rPr lang="en-SG" smtClean="0"/>
-              <a:t>13/6/2025</a:t>
+              <a:t>14/6/2025</a:t>
             </a:fld>
             <a:endParaRPr lang="en-SG"/>
           </a:p>
@@ -2393,7 +2400,7 @@
           <a:p>
             <a:fld id="{F2DA730E-443D-4FEA-B256-D307B42C74F1}" type="datetimeFigureOut">
               <a:rPr lang="en-SG" smtClean="0"/>
-              <a:t>13/6/2025</a:t>
+              <a:t>14/6/2025</a:t>
             </a:fld>
             <a:endParaRPr lang="en-SG"/>
           </a:p>
@@ -2682,7 +2689,7 @@
           <a:p>
             <a:fld id="{F2DA730E-443D-4FEA-B256-D307B42C74F1}" type="datetimeFigureOut">
               <a:rPr lang="en-SG" smtClean="0"/>
-              <a:t>13/6/2025</a:t>
+              <a:t>14/6/2025</a:t>
             </a:fld>
             <a:endParaRPr lang="en-SG"/>
           </a:p>
@@ -2925,7 +2932,7 @@
           <a:p>
             <a:fld id="{F2DA730E-443D-4FEA-B256-D307B42C74F1}" type="datetimeFigureOut">
               <a:rPr lang="en-SG" smtClean="0"/>
-              <a:t>13/6/2025</a:t>
+              <a:t>14/6/2025</a:t>
             </a:fld>
             <a:endParaRPr lang="en-SG"/>
           </a:p>
@@ -4868,6 +4875,2246 @@
     <p:extLst>
       <p:ext uri="{BB962C8B-B14F-4D97-AF65-F5344CB8AC3E}">
         <p14:creationId xmlns:p14="http://schemas.microsoft.com/office/powerpoint/2010/main" val="2003157020"/>
+      </p:ext>
+    </p:extLst>
+  </p:cSld>
+  <p:clrMapOvr>
+    <a:masterClrMapping/>
+  </p:clrMapOvr>
+</p:sld>
+</file>
+
+<file path=ppt/slides/slide2.xml><?xml version="1.0" encoding="utf-8"?>
+<p:sld xmlns:a="http://schemas.openxmlformats.org/drawingml/2006/main" xmlns:r="http://schemas.openxmlformats.org/officeDocument/2006/relationships" xmlns:p="http://schemas.openxmlformats.org/presentationml/2006/main">
+  <p:cSld>
+    <p:spTree>
+      <p:nvGrpSpPr>
+        <p:cNvPr id="1" name=""/>
+        <p:cNvGrpSpPr/>
+        <p:nvPr/>
+      </p:nvGrpSpPr>
+      <p:grpSpPr>
+        <a:xfrm>
+          <a:off x="0" y="0"/>
+          <a:ext cx="0" cy="0"/>
+          <a:chOff x="0" y="0"/>
+          <a:chExt cx="0" cy="0"/>
+        </a:xfrm>
+      </p:grpSpPr>
+      <p:pic>
+        <p:nvPicPr>
+          <p:cNvPr id="9" name="Picture 8">
+            <a:extLst>
+              <a:ext uri="{FF2B5EF4-FFF2-40B4-BE49-F238E27FC236}">
+                <a16:creationId xmlns:a16="http://schemas.microsoft.com/office/drawing/2014/main" id="{7FC741D0-7A91-0BB1-A82F-E2CD3CB663E9}"/>
+              </a:ext>
+            </a:extLst>
+          </p:cNvPr>
+          <p:cNvPicPr>
+            <a:picLocks noChangeAspect="1"/>
+          </p:cNvPicPr>
+          <p:nvPr/>
+        </p:nvPicPr>
+        <p:blipFill>
+          <a:blip r:embed="rId2"/>
+          <a:stretch>
+            <a:fillRect/>
+          </a:stretch>
+        </p:blipFill>
+        <p:spPr>
+          <a:xfrm>
+            <a:off x="1759296" y="635769"/>
+            <a:ext cx="1209815" cy="1084563"/>
+          </a:xfrm>
+          <a:prstGeom prst="rect">
+            <a:avLst/>
+          </a:prstGeom>
+        </p:spPr>
+      </p:pic>
+      <p:pic>
+        <p:nvPicPr>
+          <p:cNvPr id="11" name="Picture 10">
+            <a:extLst>
+              <a:ext uri="{FF2B5EF4-FFF2-40B4-BE49-F238E27FC236}">
+                <a16:creationId xmlns:a16="http://schemas.microsoft.com/office/drawing/2014/main" id="{E4EC70BD-0FB3-741A-B379-D3C3BC49A064}"/>
+              </a:ext>
+            </a:extLst>
+          </p:cNvPr>
+          <p:cNvPicPr>
+            <a:picLocks noChangeAspect="1"/>
+          </p:cNvPicPr>
+          <p:nvPr/>
+        </p:nvPicPr>
+        <p:blipFill>
+          <a:blip r:embed="rId3"/>
+          <a:stretch>
+            <a:fillRect/>
+          </a:stretch>
+        </p:blipFill>
+        <p:spPr>
+          <a:xfrm>
+            <a:off x="4001845" y="635769"/>
+            <a:ext cx="1373543" cy="1084563"/>
+          </a:xfrm>
+          <a:prstGeom prst="rect">
+            <a:avLst/>
+          </a:prstGeom>
+        </p:spPr>
+      </p:pic>
+      <p:cxnSp>
+        <p:nvCxnSpPr>
+          <p:cNvPr id="13" name="Straight Connector 12">
+            <a:extLst>
+              <a:ext uri="{FF2B5EF4-FFF2-40B4-BE49-F238E27FC236}">
+                <a16:creationId xmlns:a16="http://schemas.microsoft.com/office/drawing/2014/main" id="{F78F2BCC-F932-A0B9-2F36-CCBFDAD4D5A5}"/>
+              </a:ext>
+            </a:extLst>
+          </p:cNvPr>
+          <p:cNvCxnSpPr>
+            <a:cxnSpLocks/>
+            <a:stCxn id="9" idx="3"/>
+          </p:cNvCxnSpPr>
+          <p:nvPr/>
+        </p:nvCxnSpPr>
+        <p:spPr>
+          <a:xfrm>
+            <a:off x="2969111" y="1178051"/>
+            <a:ext cx="1032734" cy="0"/>
+          </a:xfrm>
+          <a:prstGeom prst="line">
+            <a:avLst/>
+          </a:prstGeom>
+          <a:ln w="38100"/>
+        </p:spPr>
+        <p:style>
+          <a:lnRef idx="2">
+            <a:schemeClr val="accent1"/>
+          </a:lnRef>
+          <a:fillRef idx="0">
+            <a:schemeClr val="accent1"/>
+          </a:fillRef>
+          <a:effectRef idx="1">
+            <a:schemeClr val="accent1"/>
+          </a:effectRef>
+          <a:fontRef idx="minor">
+            <a:schemeClr val="tx1"/>
+          </a:fontRef>
+        </p:style>
+      </p:cxnSp>
+      <p:sp>
+        <p:nvSpPr>
+          <p:cNvPr id="15" name="TextBox 14">
+            <a:extLst>
+              <a:ext uri="{FF2B5EF4-FFF2-40B4-BE49-F238E27FC236}">
+                <a16:creationId xmlns:a16="http://schemas.microsoft.com/office/drawing/2014/main" id="{7D58BDA6-6F8C-42EA-421A-F0A938BEA1A6}"/>
+              </a:ext>
+            </a:extLst>
+          </p:cNvPr>
+          <p:cNvSpPr txBox="1"/>
+          <p:nvPr/>
+        </p:nvSpPr>
+        <p:spPr>
+          <a:xfrm>
+            <a:off x="1759295" y="374159"/>
+            <a:ext cx="1373543" cy="307777"/>
+          </a:xfrm>
+          <a:prstGeom prst="rect">
+            <a:avLst/>
+          </a:prstGeom>
+          <a:noFill/>
+        </p:spPr>
+        <p:txBody>
+          <a:bodyPr wrap="square" rtlCol="0">
+            <a:spAutoFit/>
+          </a:bodyPr>
+          <a:lstStyle/>
+          <a:p>
+            <a:r>
+              <a:rPr lang="en-US" sz="1400" b="1" dirty="0">
+                <a:solidFill>
+                  <a:schemeClr val="accent1">
+                    <a:lumMod val="75000"/>
+                  </a:schemeClr>
+                </a:solidFill>
+              </a:rPr>
+              <a:t>Master HMI</a:t>
+            </a:r>
+          </a:p>
+        </p:txBody>
+      </p:sp>
+      <p:sp>
+        <p:nvSpPr>
+          <p:cNvPr id="16" name="TextBox 15">
+            <a:extLst>
+              <a:ext uri="{FF2B5EF4-FFF2-40B4-BE49-F238E27FC236}">
+                <a16:creationId xmlns:a16="http://schemas.microsoft.com/office/drawing/2014/main" id="{2C10D218-5B43-003F-CA0F-7DB75238356D}"/>
+              </a:ext>
+            </a:extLst>
+          </p:cNvPr>
+          <p:cNvSpPr txBox="1"/>
+          <p:nvPr/>
+        </p:nvSpPr>
+        <p:spPr>
+          <a:xfrm>
+            <a:off x="3926540" y="374159"/>
+            <a:ext cx="1373543" cy="307777"/>
+          </a:xfrm>
+          <a:prstGeom prst="rect">
+            <a:avLst/>
+          </a:prstGeom>
+          <a:noFill/>
+        </p:spPr>
+        <p:txBody>
+          <a:bodyPr wrap="square" rtlCol="0">
+            <a:spAutoFit/>
+          </a:bodyPr>
+          <a:lstStyle/>
+          <a:p>
+            <a:r>
+              <a:rPr lang="en-US" sz="1400" b="1" dirty="0">
+                <a:solidFill>
+                  <a:schemeClr val="accent1">
+                    <a:lumMod val="75000"/>
+                  </a:schemeClr>
+                </a:solidFill>
+              </a:rPr>
+              <a:t>OT Controller </a:t>
+            </a:r>
+          </a:p>
+        </p:txBody>
+      </p:sp>
+      <p:sp>
+        <p:nvSpPr>
+          <p:cNvPr id="17" name="TextBox 16">
+            <a:extLst>
+              <a:ext uri="{FF2B5EF4-FFF2-40B4-BE49-F238E27FC236}">
+                <a16:creationId xmlns:a16="http://schemas.microsoft.com/office/drawing/2014/main" id="{748A0567-92CE-E495-B606-C82999D08536}"/>
+              </a:ext>
+            </a:extLst>
+          </p:cNvPr>
+          <p:cNvSpPr txBox="1"/>
+          <p:nvPr/>
+        </p:nvSpPr>
+        <p:spPr>
+          <a:xfrm>
+            <a:off x="2979870" y="616707"/>
+            <a:ext cx="1463040" cy="523220"/>
+          </a:xfrm>
+          <a:prstGeom prst="rect">
+            <a:avLst/>
+          </a:prstGeom>
+          <a:noFill/>
+        </p:spPr>
+        <p:txBody>
+          <a:bodyPr wrap="square" rtlCol="0">
+            <a:spAutoFit/>
+          </a:bodyPr>
+          <a:lstStyle/>
+          <a:p>
+            <a:r>
+              <a:rPr lang="en-US" sz="1400" b="1" dirty="0">
+                <a:solidFill>
+                  <a:schemeClr val="accent1">
+                    <a:lumMod val="75000"/>
+                  </a:schemeClr>
+                </a:solidFill>
+              </a:rPr>
+              <a:t>Ethernet Connection </a:t>
+            </a:r>
+          </a:p>
+        </p:txBody>
+      </p:sp>
+      <p:pic>
+        <p:nvPicPr>
+          <p:cNvPr id="18" name="Picture 17">
+            <a:extLst>
+              <a:ext uri="{FF2B5EF4-FFF2-40B4-BE49-F238E27FC236}">
+                <a16:creationId xmlns:a16="http://schemas.microsoft.com/office/drawing/2014/main" id="{48B8149E-E5E3-44E6-8D41-202230418224}"/>
+              </a:ext>
+            </a:extLst>
+          </p:cNvPr>
+          <p:cNvPicPr>
+            <a:picLocks noChangeAspect="1"/>
+          </p:cNvPicPr>
+          <p:nvPr/>
+        </p:nvPicPr>
+        <p:blipFill>
+          <a:blip r:embed="rId2"/>
+          <a:stretch>
+            <a:fillRect/>
+          </a:stretch>
+        </p:blipFill>
+        <p:spPr>
+          <a:xfrm>
+            <a:off x="1759296" y="2243552"/>
+            <a:ext cx="1209815" cy="1084563"/>
+          </a:xfrm>
+          <a:prstGeom prst="rect">
+            <a:avLst/>
+          </a:prstGeom>
+        </p:spPr>
+      </p:pic>
+      <p:pic>
+        <p:nvPicPr>
+          <p:cNvPr id="19" name="Picture 18">
+            <a:extLst>
+              <a:ext uri="{FF2B5EF4-FFF2-40B4-BE49-F238E27FC236}">
+                <a16:creationId xmlns:a16="http://schemas.microsoft.com/office/drawing/2014/main" id="{86041C0C-7537-C5DF-86EA-E1D0B129013F}"/>
+              </a:ext>
+            </a:extLst>
+          </p:cNvPr>
+          <p:cNvPicPr>
+            <a:picLocks noChangeAspect="1"/>
+          </p:cNvPicPr>
+          <p:nvPr/>
+        </p:nvPicPr>
+        <p:blipFill>
+          <a:blip r:embed="rId3"/>
+          <a:stretch>
+            <a:fillRect/>
+          </a:stretch>
+        </p:blipFill>
+        <p:spPr>
+          <a:xfrm>
+            <a:off x="4001845" y="2243552"/>
+            <a:ext cx="1373543" cy="1084563"/>
+          </a:xfrm>
+          <a:prstGeom prst="rect">
+            <a:avLst/>
+          </a:prstGeom>
+        </p:spPr>
+      </p:pic>
+      <p:cxnSp>
+        <p:nvCxnSpPr>
+          <p:cNvPr id="20" name="Straight Connector 19">
+            <a:extLst>
+              <a:ext uri="{FF2B5EF4-FFF2-40B4-BE49-F238E27FC236}">
+                <a16:creationId xmlns:a16="http://schemas.microsoft.com/office/drawing/2014/main" id="{E75A2CC8-A6B7-4614-E8ED-74BF20C3C255}"/>
+              </a:ext>
+            </a:extLst>
+          </p:cNvPr>
+          <p:cNvCxnSpPr>
+            <a:cxnSpLocks/>
+            <a:stCxn id="18" idx="3"/>
+          </p:cNvCxnSpPr>
+          <p:nvPr/>
+        </p:nvCxnSpPr>
+        <p:spPr>
+          <a:xfrm>
+            <a:off x="2969111" y="2785834"/>
+            <a:ext cx="1032734" cy="0"/>
+          </a:xfrm>
+          <a:prstGeom prst="line">
+            <a:avLst/>
+          </a:prstGeom>
+          <a:ln w="38100"/>
+        </p:spPr>
+        <p:style>
+          <a:lnRef idx="2">
+            <a:schemeClr val="accent3"/>
+          </a:lnRef>
+          <a:fillRef idx="0">
+            <a:schemeClr val="accent3"/>
+          </a:fillRef>
+          <a:effectRef idx="1">
+            <a:schemeClr val="accent3"/>
+          </a:effectRef>
+          <a:fontRef idx="minor">
+            <a:schemeClr val="tx1"/>
+          </a:fontRef>
+        </p:style>
+      </p:cxnSp>
+      <p:sp>
+        <p:nvSpPr>
+          <p:cNvPr id="21" name="TextBox 20">
+            <a:extLst>
+              <a:ext uri="{FF2B5EF4-FFF2-40B4-BE49-F238E27FC236}">
+                <a16:creationId xmlns:a16="http://schemas.microsoft.com/office/drawing/2014/main" id="{8A14D7F4-8404-100F-B2E1-3CB992472DA6}"/>
+              </a:ext>
+            </a:extLst>
+          </p:cNvPr>
+          <p:cNvSpPr txBox="1"/>
+          <p:nvPr/>
+        </p:nvSpPr>
+        <p:spPr>
+          <a:xfrm>
+            <a:off x="1759295" y="1981942"/>
+            <a:ext cx="1373543" cy="307777"/>
+          </a:xfrm>
+          <a:prstGeom prst="rect">
+            <a:avLst/>
+          </a:prstGeom>
+          <a:noFill/>
+        </p:spPr>
+        <p:txBody>
+          <a:bodyPr wrap="square" rtlCol="0">
+            <a:spAutoFit/>
+          </a:bodyPr>
+          <a:lstStyle/>
+          <a:p>
+            <a:r>
+              <a:rPr lang="en-US" sz="1400" b="1" dirty="0">
+                <a:solidFill>
+                  <a:schemeClr val="accent1">
+                    <a:lumMod val="75000"/>
+                  </a:schemeClr>
+                </a:solidFill>
+              </a:rPr>
+              <a:t>Master HMI</a:t>
+            </a:r>
+          </a:p>
+        </p:txBody>
+      </p:sp>
+      <p:sp>
+        <p:nvSpPr>
+          <p:cNvPr id="22" name="TextBox 21">
+            <a:extLst>
+              <a:ext uri="{FF2B5EF4-FFF2-40B4-BE49-F238E27FC236}">
+                <a16:creationId xmlns:a16="http://schemas.microsoft.com/office/drawing/2014/main" id="{AA20FC58-713E-E6FE-C0D0-E7F3D1958D76}"/>
+              </a:ext>
+            </a:extLst>
+          </p:cNvPr>
+          <p:cNvSpPr txBox="1"/>
+          <p:nvPr/>
+        </p:nvSpPr>
+        <p:spPr>
+          <a:xfrm>
+            <a:off x="3926540" y="1981942"/>
+            <a:ext cx="1373543" cy="307777"/>
+          </a:xfrm>
+          <a:prstGeom prst="rect">
+            <a:avLst/>
+          </a:prstGeom>
+          <a:noFill/>
+        </p:spPr>
+        <p:txBody>
+          <a:bodyPr wrap="square" rtlCol="0">
+            <a:spAutoFit/>
+          </a:bodyPr>
+          <a:lstStyle/>
+          <a:p>
+            <a:r>
+              <a:rPr lang="en-US" sz="1400" b="1" dirty="0">
+                <a:solidFill>
+                  <a:schemeClr val="accent1">
+                    <a:lumMod val="75000"/>
+                  </a:schemeClr>
+                </a:solidFill>
+              </a:rPr>
+              <a:t>OT Controller </a:t>
+            </a:r>
+          </a:p>
+        </p:txBody>
+      </p:sp>
+      <p:sp>
+        <p:nvSpPr>
+          <p:cNvPr id="23" name="TextBox 22">
+            <a:extLst>
+              <a:ext uri="{FF2B5EF4-FFF2-40B4-BE49-F238E27FC236}">
+                <a16:creationId xmlns:a16="http://schemas.microsoft.com/office/drawing/2014/main" id="{0C44CD08-EBF2-D803-0162-7C85A7391B43}"/>
+              </a:ext>
+            </a:extLst>
+          </p:cNvPr>
+          <p:cNvSpPr txBox="1"/>
+          <p:nvPr/>
+        </p:nvSpPr>
+        <p:spPr>
+          <a:xfrm>
+            <a:off x="2917685" y="2154801"/>
+            <a:ext cx="1463040" cy="523220"/>
+          </a:xfrm>
+          <a:prstGeom prst="rect">
+            <a:avLst/>
+          </a:prstGeom>
+          <a:noFill/>
+        </p:spPr>
+        <p:txBody>
+          <a:bodyPr wrap="square" rtlCol="0">
+            <a:spAutoFit/>
+          </a:bodyPr>
+          <a:lstStyle/>
+          <a:p>
+            <a:r>
+              <a:rPr lang="en-US" sz="1400" b="1" dirty="0">
+                <a:solidFill>
+                  <a:schemeClr val="accent6">
+                    <a:lumMod val="75000"/>
+                  </a:schemeClr>
+                </a:solidFill>
+              </a:rPr>
+              <a:t>NMEA Bus Connection </a:t>
+            </a:r>
+          </a:p>
+        </p:txBody>
+      </p:sp>
+      <p:pic>
+        <p:nvPicPr>
+          <p:cNvPr id="24" name="Picture 23">
+            <a:extLst>
+              <a:ext uri="{FF2B5EF4-FFF2-40B4-BE49-F238E27FC236}">
+                <a16:creationId xmlns:a16="http://schemas.microsoft.com/office/drawing/2014/main" id="{BD4897FE-AE46-6999-88B5-E3A09F040735}"/>
+              </a:ext>
+            </a:extLst>
+          </p:cNvPr>
+          <p:cNvPicPr>
+            <a:picLocks noChangeAspect="1"/>
+          </p:cNvPicPr>
+          <p:nvPr/>
+        </p:nvPicPr>
+        <p:blipFill>
+          <a:blip r:embed="rId2"/>
+          <a:stretch>
+            <a:fillRect/>
+          </a:stretch>
+        </p:blipFill>
+        <p:spPr>
+          <a:xfrm>
+            <a:off x="5891606" y="519228"/>
+            <a:ext cx="1209815" cy="1084563"/>
+          </a:xfrm>
+          <a:prstGeom prst="rect">
+            <a:avLst/>
+          </a:prstGeom>
+        </p:spPr>
+      </p:pic>
+      <p:pic>
+        <p:nvPicPr>
+          <p:cNvPr id="25" name="Picture 24">
+            <a:extLst>
+              <a:ext uri="{FF2B5EF4-FFF2-40B4-BE49-F238E27FC236}">
+                <a16:creationId xmlns:a16="http://schemas.microsoft.com/office/drawing/2014/main" id="{5D068133-D2C7-63CE-25F5-5E7805D50524}"/>
+              </a:ext>
+            </a:extLst>
+          </p:cNvPr>
+          <p:cNvPicPr>
+            <a:picLocks noChangeAspect="1"/>
+          </p:cNvPicPr>
+          <p:nvPr/>
+        </p:nvPicPr>
+        <p:blipFill>
+          <a:blip r:embed="rId3"/>
+          <a:stretch>
+            <a:fillRect/>
+          </a:stretch>
+        </p:blipFill>
+        <p:spPr>
+          <a:xfrm>
+            <a:off x="8127329" y="519228"/>
+            <a:ext cx="1373543" cy="1084563"/>
+          </a:xfrm>
+          <a:prstGeom prst="rect">
+            <a:avLst/>
+          </a:prstGeom>
+        </p:spPr>
+      </p:pic>
+      <p:cxnSp>
+        <p:nvCxnSpPr>
+          <p:cNvPr id="26" name="Straight Connector 25">
+            <a:extLst>
+              <a:ext uri="{FF2B5EF4-FFF2-40B4-BE49-F238E27FC236}">
+                <a16:creationId xmlns:a16="http://schemas.microsoft.com/office/drawing/2014/main" id="{67645AAA-ADE5-E553-BEEE-B2108CEE0097}"/>
+              </a:ext>
+            </a:extLst>
+          </p:cNvPr>
+          <p:cNvCxnSpPr>
+            <a:cxnSpLocks/>
+            <a:stCxn id="24" idx="3"/>
+          </p:cNvCxnSpPr>
+          <p:nvPr/>
+        </p:nvCxnSpPr>
+        <p:spPr>
+          <a:xfrm>
+            <a:off x="7101421" y="1061510"/>
+            <a:ext cx="1032734" cy="0"/>
+          </a:xfrm>
+          <a:prstGeom prst="line">
+            <a:avLst/>
+          </a:prstGeom>
+          <a:ln w="38100">
+            <a:solidFill>
+              <a:schemeClr val="accent2"/>
+            </a:solidFill>
+          </a:ln>
+        </p:spPr>
+        <p:style>
+          <a:lnRef idx="2">
+            <a:schemeClr val="accent1"/>
+          </a:lnRef>
+          <a:fillRef idx="0">
+            <a:schemeClr val="accent1"/>
+          </a:fillRef>
+          <a:effectRef idx="1">
+            <a:schemeClr val="accent1"/>
+          </a:effectRef>
+          <a:fontRef idx="minor">
+            <a:schemeClr val="tx1"/>
+          </a:fontRef>
+        </p:style>
+      </p:cxnSp>
+      <p:sp>
+        <p:nvSpPr>
+          <p:cNvPr id="27" name="TextBox 26">
+            <a:extLst>
+              <a:ext uri="{FF2B5EF4-FFF2-40B4-BE49-F238E27FC236}">
+                <a16:creationId xmlns:a16="http://schemas.microsoft.com/office/drawing/2014/main" id="{AD71704A-8FFD-8F40-AB59-DA87F7621545}"/>
+              </a:ext>
+            </a:extLst>
+          </p:cNvPr>
+          <p:cNvSpPr txBox="1"/>
+          <p:nvPr/>
+        </p:nvSpPr>
+        <p:spPr>
+          <a:xfrm>
+            <a:off x="5891605" y="257618"/>
+            <a:ext cx="1373543" cy="307777"/>
+          </a:xfrm>
+          <a:prstGeom prst="rect">
+            <a:avLst/>
+          </a:prstGeom>
+          <a:noFill/>
+        </p:spPr>
+        <p:txBody>
+          <a:bodyPr wrap="square" rtlCol="0">
+            <a:spAutoFit/>
+          </a:bodyPr>
+          <a:lstStyle/>
+          <a:p>
+            <a:r>
+              <a:rPr lang="en-US" sz="1400" b="1" dirty="0">
+                <a:solidFill>
+                  <a:schemeClr val="accent1">
+                    <a:lumMod val="75000"/>
+                  </a:schemeClr>
+                </a:solidFill>
+              </a:rPr>
+              <a:t>Master HMI</a:t>
+            </a:r>
+          </a:p>
+        </p:txBody>
+      </p:sp>
+      <p:sp>
+        <p:nvSpPr>
+          <p:cNvPr id="28" name="TextBox 27">
+            <a:extLst>
+              <a:ext uri="{FF2B5EF4-FFF2-40B4-BE49-F238E27FC236}">
+                <a16:creationId xmlns:a16="http://schemas.microsoft.com/office/drawing/2014/main" id="{137E47E5-371E-9423-534D-D7A350FCD389}"/>
+              </a:ext>
+            </a:extLst>
+          </p:cNvPr>
+          <p:cNvSpPr txBox="1"/>
+          <p:nvPr/>
+        </p:nvSpPr>
+        <p:spPr>
+          <a:xfrm>
+            <a:off x="8052024" y="257618"/>
+            <a:ext cx="1373543" cy="307777"/>
+          </a:xfrm>
+          <a:prstGeom prst="rect">
+            <a:avLst/>
+          </a:prstGeom>
+          <a:noFill/>
+        </p:spPr>
+        <p:txBody>
+          <a:bodyPr wrap="square" rtlCol="0">
+            <a:spAutoFit/>
+          </a:bodyPr>
+          <a:lstStyle/>
+          <a:p>
+            <a:r>
+              <a:rPr lang="en-US" sz="1400" b="1" dirty="0">
+                <a:solidFill>
+                  <a:schemeClr val="accent1">
+                    <a:lumMod val="75000"/>
+                  </a:schemeClr>
+                </a:solidFill>
+              </a:rPr>
+              <a:t>OT Controller </a:t>
+            </a:r>
+          </a:p>
+        </p:txBody>
+      </p:sp>
+      <p:sp>
+        <p:nvSpPr>
+          <p:cNvPr id="29" name="TextBox 28">
+            <a:extLst>
+              <a:ext uri="{FF2B5EF4-FFF2-40B4-BE49-F238E27FC236}">
+                <a16:creationId xmlns:a16="http://schemas.microsoft.com/office/drawing/2014/main" id="{E49C8CE8-15C0-0853-D773-B312BF6D3136}"/>
+              </a:ext>
+            </a:extLst>
+          </p:cNvPr>
+          <p:cNvSpPr txBox="1"/>
+          <p:nvPr/>
+        </p:nvSpPr>
+        <p:spPr>
+          <a:xfrm>
+            <a:off x="7120211" y="457397"/>
+            <a:ext cx="1463040" cy="523220"/>
+          </a:xfrm>
+          <a:prstGeom prst="rect">
+            <a:avLst/>
+          </a:prstGeom>
+          <a:noFill/>
+        </p:spPr>
+        <p:txBody>
+          <a:bodyPr wrap="square" rtlCol="0">
+            <a:spAutoFit/>
+          </a:bodyPr>
+          <a:lstStyle/>
+          <a:p>
+            <a:r>
+              <a:rPr lang="en-US" sz="1400" b="1" dirty="0">
+                <a:solidFill>
+                  <a:schemeClr val="accent2"/>
+                </a:solidFill>
+              </a:rPr>
+              <a:t>Serial-Com Connection </a:t>
+            </a:r>
+          </a:p>
+        </p:txBody>
+      </p:sp>
+      <p:pic>
+        <p:nvPicPr>
+          <p:cNvPr id="30" name="Picture 29">
+            <a:extLst>
+              <a:ext uri="{FF2B5EF4-FFF2-40B4-BE49-F238E27FC236}">
+                <a16:creationId xmlns:a16="http://schemas.microsoft.com/office/drawing/2014/main" id="{D99EC894-EFAA-574C-E757-E7BA4AA874D5}"/>
+              </a:ext>
+            </a:extLst>
+          </p:cNvPr>
+          <p:cNvPicPr>
+            <a:picLocks noChangeAspect="1"/>
+          </p:cNvPicPr>
+          <p:nvPr/>
+        </p:nvPicPr>
+        <p:blipFill>
+          <a:blip r:embed="rId2"/>
+          <a:stretch>
+            <a:fillRect/>
+          </a:stretch>
+        </p:blipFill>
+        <p:spPr>
+          <a:xfrm>
+            <a:off x="5884432" y="2127325"/>
+            <a:ext cx="1209815" cy="1084563"/>
+          </a:xfrm>
+          <a:prstGeom prst="rect">
+            <a:avLst/>
+          </a:prstGeom>
+        </p:spPr>
+      </p:pic>
+      <p:pic>
+        <p:nvPicPr>
+          <p:cNvPr id="31" name="Picture 30">
+            <a:extLst>
+              <a:ext uri="{FF2B5EF4-FFF2-40B4-BE49-F238E27FC236}">
+                <a16:creationId xmlns:a16="http://schemas.microsoft.com/office/drawing/2014/main" id="{BF7CD886-27F4-B5CC-E62A-8D5EC7A01545}"/>
+              </a:ext>
+            </a:extLst>
+          </p:cNvPr>
+          <p:cNvPicPr>
+            <a:picLocks noChangeAspect="1"/>
+          </p:cNvPicPr>
+          <p:nvPr/>
+        </p:nvPicPr>
+        <p:blipFill>
+          <a:blip r:embed="rId3"/>
+          <a:stretch>
+            <a:fillRect/>
+          </a:stretch>
+        </p:blipFill>
+        <p:spPr>
+          <a:xfrm>
+            <a:off x="8814099" y="2173492"/>
+            <a:ext cx="1373543" cy="1084563"/>
+          </a:xfrm>
+          <a:prstGeom prst="rect">
+            <a:avLst/>
+          </a:prstGeom>
+        </p:spPr>
+      </p:pic>
+      <p:cxnSp>
+        <p:nvCxnSpPr>
+          <p:cNvPr id="32" name="Straight Connector 31">
+            <a:extLst>
+              <a:ext uri="{FF2B5EF4-FFF2-40B4-BE49-F238E27FC236}">
+                <a16:creationId xmlns:a16="http://schemas.microsoft.com/office/drawing/2014/main" id="{1F1882AF-B858-0352-2CBF-C152305EAEC2}"/>
+              </a:ext>
+            </a:extLst>
+          </p:cNvPr>
+          <p:cNvCxnSpPr>
+            <a:cxnSpLocks/>
+            <a:stCxn id="30" idx="3"/>
+          </p:cNvCxnSpPr>
+          <p:nvPr/>
+        </p:nvCxnSpPr>
+        <p:spPr>
+          <a:xfrm flipV="1">
+            <a:off x="7094247" y="2669606"/>
+            <a:ext cx="328530" cy="1"/>
+          </a:xfrm>
+          <a:prstGeom prst="line">
+            <a:avLst/>
+          </a:prstGeom>
+          <a:ln w="38100">
+            <a:solidFill>
+              <a:schemeClr val="accent5">
+                <a:lumMod val="75000"/>
+              </a:schemeClr>
+            </a:solidFill>
+          </a:ln>
+        </p:spPr>
+        <p:style>
+          <a:lnRef idx="2">
+            <a:schemeClr val="accent1"/>
+          </a:lnRef>
+          <a:fillRef idx="0">
+            <a:schemeClr val="accent1"/>
+          </a:fillRef>
+          <a:effectRef idx="1">
+            <a:schemeClr val="accent1"/>
+          </a:effectRef>
+          <a:fontRef idx="minor">
+            <a:schemeClr val="tx1"/>
+          </a:fontRef>
+        </p:style>
+      </p:cxnSp>
+      <p:sp>
+        <p:nvSpPr>
+          <p:cNvPr id="33" name="TextBox 32">
+            <a:extLst>
+              <a:ext uri="{FF2B5EF4-FFF2-40B4-BE49-F238E27FC236}">
+                <a16:creationId xmlns:a16="http://schemas.microsoft.com/office/drawing/2014/main" id="{218F62B7-2F0F-6562-859E-1DFA8F93EF0D}"/>
+              </a:ext>
+            </a:extLst>
+          </p:cNvPr>
+          <p:cNvSpPr txBox="1"/>
+          <p:nvPr/>
+        </p:nvSpPr>
+        <p:spPr>
+          <a:xfrm>
+            <a:off x="5884431" y="1865715"/>
+            <a:ext cx="1373543" cy="307777"/>
+          </a:xfrm>
+          <a:prstGeom prst="rect">
+            <a:avLst/>
+          </a:prstGeom>
+          <a:noFill/>
+        </p:spPr>
+        <p:txBody>
+          <a:bodyPr wrap="square" rtlCol="0">
+            <a:spAutoFit/>
+          </a:bodyPr>
+          <a:lstStyle/>
+          <a:p>
+            <a:r>
+              <a:rPr lang="en-US" sz="1400" b="1" dirty="0">
+                <a:solidFill>
+                  <a:schemeClr val="accent1">
+                    <a:lumMod val="75000"/>
+                  </a:schemeClr>
+                </a:solidFill>
+              </a:rPr>
+              <a:t>Master HMI</a:t>
+            </a:r>
+          </a:p>
+        </p:txBody>
+      </p:sp>
+      <p:sp>
+        <p:nvSpPr>
+          <p:cNvPr id="34" name="TextBox 33">
+            <a:extLst>
+              <a:ext uri="{FF2B5EF4-FFF2-40B4-BE49-F238E27FC236}">
+                <a16:creationId xmlns:a16="http://schemas.microsoft.com/office/drawing/2014/main" id="{CD5D1CD6-6A47-A552-FF5B-AE0FE89785B5}"/>
+              </a:ext>
+            </a:extLst>
+          </p:cNvPr>
+          <p:cNvSpPr txBox="1"/>
+          <p:nvPr/>
+        </p:nvSpPr>
+        <p:spPr>
+          <a:xfrm>
+            <a:off x="8814100" y="1824190"/>
+            <a:ext cx="1373543" cy="307777"/>
+          </a:xfrm>
+          <a:prstGeom prst="rect">
+            <a:avLst/>
+          </a:prstGeom>
+          <a:noFill/>
+        </p:spPr>
+        <p:txBody>
+          <a:bodyPr wrap="square" rtlCol="0">
+            <a:spAutoFit/>
+          </a:bodyPr>
+          <a:lstStyle/>
+          <a:p>
+            <a:r>
+              <a:rPr lang="en-US" sz="1400" b="1" dirty="0">
+                <a:solidFill>
+                  <a:schemeClr val="accent1">
+                    <a:lumMod val="75000"/>
+                  </a:schemeClr>
+                </a:solidFill>
+              </a:rPr>
+              <a:t>OT Controller </a:t>
+            </a:r>
+          </a:p>
+        </p:txBody>
+      </p:sp>
+      <p:pic>
+        <p:nvPicPr>
+          <p:cNvPr id="1026" name="Picture 2" descr="radio Vector Icons free download in SVG, PNG Format">
+            <a:extLst>
+              <a:ext uri="{FF2B5EF4-FFF2-40B4-BE49-F238E27FC236}">
+                <a16:creationId xmlns:a16="http://schemas.microsoft.com/office/drawing/2014/main" id="{A664EF4B-3DC8-3E37-7C46-AF7052ED46A5}"/>
+              </a:ext>
+            </a:extLst>
+          </p:cNvPr>
+          <p:cNvPicPr>
+            <a:picLocks noChangeAspect="1" noChangeArrowheads="1"/>
+          </p:cNvPicPr>
+          <p:nvPr/>
+        </p:nvPicPr>
+        <p:blipFill>
+          <a:blip r:embed="rId4">
+            <a:extLst>
+              <a:ext uri="{28A0092B-C50C-407E-A947-70E740481C1C}">
+                <a14:useLocalDpi xmlns:a14="http://schemas.microsoft.com/office/drawing/2010/main" val="0"/>
+              </a:ext>
+            </a:extLst>
+          </a:blip>
+          <a:srcRect/>
+          <a:stretch>
+            <a:fillRect/>
+          </a:stretch>
+        </p:blipFill>
+        <p:spPr bwMode="auto">
+          <a:xfrm flipH="1">
+            <a:off x="7112829" y="2177053"/>
+            <a:ext cx="574637" cy="574637"/>
+          </a:xfrm>
+          <a:prstGeom prst="rect">
+            <a:avLst/>
+          </a:prstGeom>
+          <a:noFill/>
+          <a:extLst>
+            <a:ext uri="{909E8E84-426E-40DD-AFC4-6F175D3DCCD1}">
+              <a14:hiddenFill xmlns:a14="http://schemas.microsoft.com/office/drawing/2010/main">
+                <a:solidFill>
+                  <a:srgbClr val="FFFFFF"/>
+                </a:solidFill>
+              </a14:hiddenFill>
+            </a:ext>
+          </a:extLst>
+        </p:spPr>
+      </p:pic>
+      <p:cxnSp>
+        <p:nvCxnSpPr>
+          <p:cNvPr id="39" name="Straight Connector 38">
+            <a:extLst>
+              <a:ext uri="{FF2B5EF4-FFF2-40B4-BE49-F238E27FC236}">
+                <a16:creationId xmlns:a16="http://schemas.microsoft.com/office/drawing/2014/main" id="{AADF64B7-2168-D216-FD54-5D71E5A5727C}"/>
+              </a:ext>
+            </a:extLst>
+          </p:cNvPr>
+          <p:cNvCxnSpPr>
+            <a:cxnSpLocks/>
+          </p:cNvCxnSpPr>
+          <p:nvPr/>
+        </p:nvCxnSpPr>
+        <p:spPr>
+          <a:xfrm flipV="1">
+            <a:off x="8496327" y="2650859"/>
+            <a:ext cx="328530" cy="1"/>
+          </a:xfrm>
+          <a:prstGeom prst="line">
+            <a:avLst/>
+          </a:prstGeom>
+          <a:ln w="38100">
+            <a:solidFill>
+              <a:schemeClr val="accent5">
+                <a:lumMod val="75000"/>
+              </a:schemeClr>
+            </a:solidFill>
+          </a:ln>
+        </p:spPr>
+        <p:style>
+          <a:lnRef idx="2">
+            <a:schemeClr val="accent1"/>
+          </a:lnRef>
+          <a:fillRef idx="0">
+            <a:schemeClr val="accent1"/>
+          </a:fillRef>
+          <a:effectRef idx="1">
+            <a:schemeClr val="accent1"/>
+          </a:effectRef>
+          <a:fontRef idx="minor">
+            <a:schemeClr val="tx1"/>
+          </a:fontRef>
+        </p:style>
+      </p:cxnSp>
+      <p:pic>
+        <p:nvPicPr>
+          <p:cNvPr id="40" name="Picture 2" descr="radio Vector Icons free download in SVG, PNG Format">
+            <a:extLst>
+              <a:ext uri="{FF2B5EF4-FFF2-40B4-BE49-F238E27FC236}">
+                <a16:creationId xmlns:a16="http://schemas.microsoft.com/office/drawing/2014/main" id="{CA43DA99-5F95-DFBC-5561-45AF6E3D5120}"/>
+              </a:ext>
+            </a:extLst>
+          </p:cNvPr>
+          <p:cNvPicPr>
+            <a:picLocks noChangeAspect="1" noChangeArrowheads="1"/>
+          </p:cNvPicPr>
+          <p:nvPr/>
+        </p:nvPicPr>
+        <p:blipFill>
+          <a:blip r:embed="rId4">
+            <a:extLst>
+              <a:ext uri="{28A0092B-C50C-407E-A947-70E740481C1C}">
+                <a14:useLocalDpi xmlns:a14="http://schemas.microsoft.com/office/drawing/2010/main" val="0"/>
+              </a:ext>
+            </a:extLst>
+          </a:blip>
+          <a:srcRect/>
+          <a:stretch>
+            <a:fillRect/>
+          </a:stretch>
+        </p:blipFill>
+        <p:spPr bwMode="auto">
+          <a:xfrm flipH="1">
+            <a:off x="8208561" y="2154801"/>
+            <a:ext cx="574637" cy="574637"/>
+          </a:xfrm>
+          <a:prstGeom prst="rect">
+            <a:avLst/>
+          </a:prstGeom>
+          <a:noFill/>
+          <a:extLst>
+            <a:ext uri="{909E8E84-426E-40DD-AFC4-6F175D3DCCD1}">
+              <a14:hiddenFill xmlns:a14="http://schemas.microsoft.com/office/drawing/2010/main">
+                <a:solidFill>
+                  <a:srgbClr val="FFFFFF"/>
+                </a:solidFill>
+              </a14:hiddenFill>
+            </a:ext>
+          </a:extLst>
+        </p:spPr>
+      </p:pic>
+      <p:cxnSp>
+        <p:nvCxnSpPr>
+          <p:cNvPr id="41" name="Straight Connector 40">
+            <a:extLst>
+              <a:ext uri="{FF2B5EF4-FFF2-40B4-BE49-F238E27FC236}">
+                <a16:creationId xmlns:a16="http://schemas.microsoft.com/office/drawing/2014/main" id="{0229918A-3BD8-29E7-67B9-78253E31DEB0}"/>
+              </a:ext>
+            </a:extLst>
+          </p:cNvPr>
+          <p:cNvCxnSpPr>
+            <a:cxnSpLocks/>
+            <a:stCxn id="1026" idx="1"/>
+            <a:endCxn id="40" idx="3"/>
+          </p:cNvCxnSpPr>
+          <p:nvPr/>
+        </p:nvCxnSpPr>
+        <p:spPr>
+          <a:xfrm flipV="1">
+            <a:off x="7687466" y="2442120"/>
+            <a:ext cx="521095" cy="0"/>
+          </a:xfrm>
+          <a:prstGeom prst="line">
+            <a:avLst/>
+          </a:prstGeom>
+          <a:ln w="38100">
+            <a:solidFill>
+              <a:schemeClr val="accent5">
+                <a:lumMod val="75000"/>
+              </a:schemeClr>
+            </a:solidFill>
+            <a:prstDash val="sysDash"/>
+          </a:ln>
+        </p:spPr>
+        <p:style>
+          <a:lnRef idx="2">
+            <a:schemeClr val="accent1"/>
+          </a:lnRef>
+          <a:fillRef idx="0">
+            <a:schemeClr val="accent1"/>
+          </a:fillRef>
+          <a:effectRef idx="1">
+            <a:schemeClr val="accent1"/>
+          </a:effectRef>
+          <a:fontRef idx="minor">
+            <a:schemeClr val="tx1"/>
+          </a:fontRef>
+        </p:style>
+      </p:cxnSp>
+      <p:sp>
+        <p:nvSpPr>
+          <p:cNvPr id="44" name="TextBox 43">
+            <a:extLst>
+              <a:ext uri="{FF2B5EF4-FFF2-40B4-BE49-F238E27FC236}">
+                <a16:creationId xmlns:a16="http://schemas.microsoft.com/office/drawing/2014/main" id="{FB8B2385-A00F-3CA9-AA83-22573F98C719}"/>
+              </a:ext>
+            </a:extLst>
+          </p:cNvPr>
+          <p:cNvSpPr txBox="1"/>
+          <p:nvPr/>
+        </p:nvSpPr>
+        <p:spPr>
+          <a:xfrm>
+            <a:off x="7100069" y="2708686"/>
+            <a:ext cx="1895234" cy="523220"/>
+          </a:xfrm>
+          <a:prstGeom prst="rect">
+            <a:avLst/>
+          </a:prstGeom>
+          <a:noFill/>
+        </p:spPr>
+        <p:txBody>
+          <a:bodyPr wrap="square" rtlCol="0">
+            <a:spAutoFit/>
+          </a:bodyPr>
+          <a:lstStyle/>
+          <a:p>
+            <a:r>
+              <a:rPr lang="en-US" sz="1400" b="1" dirty="0">
+                <a:solidFill>
+                  <a:schemeClr val="accent5">
+                    <a:lumMod val="75000"/>
+                  </a:schemeClr>
+                </a:solidFill>
+              </a:rPr>
+              <a:t>Radio or Bluetooth Connection  </a:t>
+            </a:r>
+          </a:p>
+        </p:txBody>
+      </p:sp>
+      <p:pic>
+        <p:nvPicPr>
+          <p:cNvPr id="47" name="Picture 46">
+            <a:extLst>
+              <a:ext uri="{FF2B5EF4-FFF2-40B4-BE49-F238E27FC236}">
+                <a16:creationId xmlns:a16="http://schemas.microsoft.com/office/drawing/2014/main" id="{C6C48F7A-D211-1E4A-762B-61DB952B6E6E}"/>
+              </a:ext>
+            </a:extLst>
+          </p:cNvPr>
+          <p:cNvPicPr>
+            <a:picLocks noChangeAspect="1"/>
+          </p:cNvPicPr>
+          <p:nvPr/>
+        </p:nvPicPr>
+        <p:blipFill>
+          <a:blip r:embed="rId2"/>
+          <a:stretch>
+            <a:fillRect/>
+          </a:stretch>
+        </p:blipFill>
+        <p:spPr>
+          <a:xfrm>
+            <a:off x="5809475" y="4450004"/>
+            <a:ext cx="1209815" cy="1084563"/>
+          </a:xfrm>
+          <a:prstGeom prst="rect">
+            <a:avLst/>
+          </a:prstGeom>
+        </p:spPr>
+      </p:pic>
+      <p:pic>
+        <p:nvPicPr>
+          <p:cNvPr id="48" name="Picture 47">
+            <a:extLst>
+              <a:ext uri="{FF2B5EF4-FFF2-40B4-BE49-F238E27FC236}">
+                <a16:creationId xmlns:a16="http://schemas.microsoft.com/office/drawing/2014/main" id="{CDE26813-71AC-912C-6CD1-B0AD0E858DE0}"/>
+              </a:ext>
+            </a:extLst>
+          </p:cNvPr>
+          <p:cNvPicPr>
+            <a:picLocks noChangeAspect="1"/>
+          </p:cNvPicPr>
+          <p:nvPr/>
+        </p:nvPicPr>
+        <p:blipFill>
+          <a:blip r:embed="rId3"/>
+          <a:stretch>
+            <a:fillRect/>
+          </a:stretch>
+        </p:blipFill>
+        <p:spPr>
+          <a:xfrm>
+            <a:off x="8052024" y="4450004"/>
+            <a:ext cx="1373543" cy="1084563"/>
+          </a:xfrm>
+          <a:prstGeom prst="rect">
+            <a:avLst/>
+          </a:prstGeom>
+        </p:spPr>
+      </p:pic>
+      <p:cxnSp>
+        <p:nvCxnSpPr>
+          <p:cNvPr id="49" name="Straight Connector 48">
+            <a:extLst>
+              <a:ext uri="{FF2B5EF4-FFF2-40B4-BE49-F238E27FC236}">
+                <a16:creationId xmlns:a16="http://schemas.microsoft.com/office/drawing/2014/main" id="{A426D5A4-C00C-429C-0D28-E0C1DE9861E5}"/>
+              </a:ext>
+            </a:extLst>
+          </p:cNvPr>
+          <p:cNvCxnSpPr>
+            <a:cxnSpLocks/>
+            <a:stCxn id="47" idx="3"/>
+          </p:cNvCxnSpPr>
+          <p:nvPr/>
+        </p:nvCxnSpPr>
+        <p:spPr>
+          <a:xfrm>
+            <a:off x="7019290" y="4992286"/>
+            <a:ext cx="1032734" cy="0"/>
+          </a:xfrm>
+          <a:prstGeom prst="line">
+            <a:avLst/>
+          </a:prstGeom>
+          <a:ln w="38100"/>
+        </p:spPr>
+        <p:style>
+          <a:lnRef idx="2">
+            <a:schemeClr val="accent3"/>
+          </a:lnRef>
+          <a:fillRef idx="0">
+            <a:schemeClr val="accent3"/>
+          </a:fillRef>
+          <a:effectRef idx="1">
+            <a:schemeClr val="accent3"/>
+          </a:effectRef>
+          <a:fontRef idx="minor">
+            <a:schemeClr val="tx1"/>
+          </a:fontRef>
+        </p:style>
+      </p:cxnSp>
+      <p:sp>
+        <p:nvSpPr>
+          <p:cNvPr id="50" name="TextBox 49">
+            <a:extLst>
+              <a:ext uri="{FF2B5EF4-FFF2-40B4-BE49-F238E27FC236}">
+                <a16:creationId xmlns:a16="http://schemas.microsoft.com/office/drawing/2014/main" id="{F9239B6B-C249-F23B-DFDB-CE05A5968052}"/>
+              </a:ext>
+            </a:extLst>
+          </p:cNvPr>
+          <p:cNvSpPr txBox="1"/>
+          <p:nvPr/>
+        </p:nvSpPr>
+        <p:spPr>
+          <a:xfrm>
+            <a:off x="5809474" y="4188394"/>
+            <a:ext cx="1373543" cy="307777"/>
+          </a:xfrm>
+          <a:prstGeom prst="rect">
+            <a:avLst/>
+          </a:prstGeom>
+          <a:noFill/>
+        </p:spPr>
+        <p:txBody>
+          <a:bodyPr wrap="square" rtlCol="0">
+            <a:spAutoFit/>
+          </a:bodyPr>
+          <a:lstStyle/>
+          <a:p>
+            <a:r>
+              <a:rPr lang="en-US" sz="1400" b="1" dirty="0">
+                <a:solidFill>
+                  <a:schemeClr val="accent1">
+                    <a:lumMod val="75000"/>
+                  </a:schemeClr>
+                </a:solidFill>
+              </a:rPr>
+              <a:t>Master HMI</a:t>
+            </a:r>
+          </a:p>
+        </p:txBody>
+      </p:sp>
+      <p:sp>
+        <p:nvSpPr>
+          <p:cNvPr id="51" name="TextBox 50">
+            <a:extLst>
+              <a:ext uri="{FF2B5EF4-FFF2-40B4-BE49-F238E27FC236}">
+                <a16:creationId xmlns:a16="http://schemas.microsoft.com/office/drawing/2014/main" id="{31D420F9-F46F-86D7-1EC4-5EF68A43BFED}"/>
+              </a:ext>
+            </a:extLst>
+          </p:cNvPr>
+          <p:cNvSpPr txBox="1"/>
+          <p:nvPr/>
+        </p:nvSpPr>
+        <p:spPr>
+          <a:xfrm>
+            <a:off x="7976719" y="4188394"/>
+            <a:ext cx="1373543" cy="307777"/>
+          </a:xfrm>
+          <a:prstGeom prst="rect">
+            <a:avLst/>
+          </a:prstGeom>
+          <a:noFill/>
+        </p:spPr>
+        <p:txBody>
+          <a:bodyPr wrap="square" rtlCol="0">
+            <a:spAutoFit/>
+          </a:bodyPr>
+          <a:lstStyle/>
+          <a:p>
+            <a:r>
+              <a:rPr lang="en-US" sz="1400" b="1" dirty="0">
+                <a:solidFill>
+                  <a:schemeClr val="accent1">
+                    <a:lumMod val="75000"/>
+                  </a:schemeClr>
+                </a:solidFill>
+              </a:rPr>
+              <a:t>OT Controller </a:t>
+            </a:r>
+          </a:p>
+        </p:txBody>
+      </p:sp>
+      <p:sp>
+        <p:nvSpPr>
+          <p:cNvPr id="52" name="TextBox 51">
+            <a:extLst>
+              <a:ext uri="{FF2B5EF4-FFF2-40B4-BE49-F238E27FC236}">
+                <a16:creationId xmlns:a16="http://schemas.microsoft.com/office/drawing/2014/main" id="{DEA377FF-4BF4-0FA8-E071-FEF32385FCD1}"/>
+              </a:ext>
+            </a:extLst>
+          </p:cNvPr>
+          <p:cNvSpPr txBox="1"/>
+          <p:nvPr/>
+        </p:nvSpPr>
+        <p:spPr>
+          <a:xfrm>
+            <a:off x="7020301" y="4469063"/>
+            <a:ext cx="1463040" cy="523220"/>
+          </a:xfrm>
+          <a:prstGeom prst="rect">
+            <a:avLst/>
+          </a:prstGeom>
+          <a:noFill/>
+        </p:spPr>
+        <p:txBody>
+          <a:bodyPr wrap="square" rtlCol="0">
+            <a:spAutoFit/>
+          </a:bodyPr>
+          <a:lstStyle/>
+          <a:p>
+            <a:r>
+              <a:rPr lang="en-US" sz="1400" b="1" dirty="0">
+                <a:solidFill>
+                  <a:schemeClr val="accent1">
+                    <a:lumMod val="75000"/>
+                  </a:schemeClr>
+                </a:solidFill>
+              </a:rPr>
+              <a:t>Ethernet Connection </a:t>
+            </a:r>
+          </a:p>
+        </p:txBody>
+      </p:sp>
+      <p:pic>
+        <p:nvPicPr>
+          <p:cNvPr id="53" name="Picture 52">
+            <a:extLst>
+              <a:ext uri="{FF2B5EF4-FFF2-40B4-BE49-F238E27FC236}">
+                <a16:creationId xmlns:a16="http://schemas.microsoft.com/office/drawing/2014/main" id="{3EE7A027-663C-AA66-F944-3CBAFD43A38E}"/>
+              </a:ext>
+            </a:extLst>
+          </p:cNvPr>
+          <p:cNvPicPr>
+            <a:picLocks noChangeAspect="1"/>
+          </p:cNvPicPr>
+          <p:nvPr/>
+        </p:nvPicPr>
+        <p:blipFill>
+          <a:blip r:embed="rId5">
+            <a:extLst>
+              <a:ext uri="{BEBA8EAE-BF5A-486C-A8C5-ECC9F3942E4B}">
+                <a14:imgProps xmlns:a14="http://schemas.microsoft.com/office/drawing/2010/main">
+                  <a14:imgLayer r:embed="rId6">
+                    <a14:imgEffect>
+                      <a14:saturation sat="0"/>
+                    </a14:imgEffect>
+                  </a14:imgLayer>
+                </a14:imgProps>
+              </a:ext>
+            </a:extLst>
+          </a:blip>
+          <a:stretch>
+            <a:fillRect/>
+          </a:stretch>
+        </p:blipFill>
+        <p:spPr>
+          <a:xfrm>
+            <a:off x="4083292" y="4450002"/>
+            <a:ext cx="1209815" cy="1084563"/>
+          </a:xfrm>
+          <a:prstGeom prst="rect">
+            <a:avLst/>
+          </a:prstGeom>
+        </p:spPr>
+      </p:pic>
+      <p:pic>
+        <p:nvPicPr>
+          <p:cNvPr id="54" name="Picture 53">
+            <a:extLst>
+              <a:ext uri="{FF2B5EF4-FFF2-40B4-BE49-F238E27FC236}">
+                <a16:creationId xmlns:a16="http://schemas.microsoft.com/office/drawing/2014/main" id="{9B7A6A60-A54E-37F2-BEEE-040C01F4C401}"/>
+              </a:ext>
+            </a:extLst>
+          </p:cNvPr>
+          <p:cNvPicPr>
+            <a:picLocks noChangeAspect="1"/>
+          </p:cNvPicPr>
+          <p:nvPr/>
+        </p:nvPicPr>
+        <p:blipFill>
+          <a:blip r:embed="rId5">
+            <a:grayscl/>
+            <a:extLst>
+              <a:ext uri="{BEBA8EAE-BF5A-486C-A8C5-ECC9F3942E4B}">
+                <a14:imgProps xmlns:a14="http://schemas.microsoft.com/office/drawing/2010/main">
+                  <a14:imgLayer r:embed="rId6">
+                    <a14:imgEffect>
+                      <a14:saturation sat="0"/>
+                    </a14:imgEffect>
+                  </a14:imgLayer>
+                </a14:imgProps>
+              </a:ext>
+            </a:extLst>
+          </a:blip>
+          <a:stretch>
+            <a:fillRect/>
+          </a:stretch>
+        </p:blipFill>
+        <p:spPr>
+          <a:xfrm>
+            <a:off x="2389382" y="4450002"/>
+            <a:ext cx="1209815" cy="1084563"/>
+          </a:xfrm>
+          <a:prstGeom prst="rect">
+            <a:avLst/>
+          </a:prstGeom>
+        </p:spPr>
+      </p:pic>
+      <p:sp>
+        <p:nvSpPr>
+          <p:cNvPr id="55" name="TextBox 54">
+            <a:extLst>
+              <a:ext uri="{FF2B5EF4-FFF2-40B4-BE49-F238E27FC236}">
+                <a16:creationId xmlns:a16="http://schemas.microsoft.com/office/drawing/2014/main" id="{EF21D859-1093-3D62-8D49-09F711BC9816}"/>
+              </a:ext>
+            </a:extLst>
+          </p:cNvPr>
+          <p:cNvSpPr txBox="1"/>
+          <p:nvPr/>
+        </p:nvSpPr>
+        <p:spPr>
+          <a:xfrm>
+            <a:off x="2363786" y="4207364"/>
+            <a:ext cx="1373543" cy="307777"/>
+          </a:xfrm>
+          <a:prstGeom prst="rect">
+            <a:avLst/>
+          </a:prstGeom>
+          <a:noFill/>
+        </p:spPr>
+        <p:txBody>
+          <a:bodyPr wrap="square" rtlCol="0">
+            <a:spAutoFit/>
+          </a:bodyPr>
+          <a:lstStyle/>
+          <a:p>
+            <a:r>
+              <a:rPr lang="en-US" sz="1400" b="1" dirty="0">
+                <a:solidFill>
+                  <a:schemeClr val="tx1">
+                    <a:lumMod val="50000"/>
+                    <a:lumOff val="50000"/>
+                  </a:schemeClr>
+                </a:solidFill>
+              </a:rPr>
+              <a:t>Slave HMI</a:t>
+            </a:r>
+          </a:p>
+        </p:txBody>
+      </p:sp>
+      <p:sp>
+        <p:nvSpPr>
+          <p:cNvPr id="56" name="TextBox 55">
+            <a:extLst>
+              <a:ext uri="{FF2B5EF4-FFF2-40B4-BE49-F238E27FC236}">
+                <a16:creationId xmlns:a16="http://schemas.microsoft.com/office/drawing/2014/main" id="{234BE7FE-35EF-9B5A-255D-272C3CBAC32C}"/>
+              </a:ext>
+            </a:extLst>
+          </p:cNvPr>
+          <p:cNvSpPr txBox="1"/>
+          <p:nvPr/>
+        </p:nvSpPr>
+        <p:spPr>
+          <a:xfrm>
+            <a:off x="4115564" y="4207364"/>
+            <a:ext cx="1373543" cy="307777"/>
+          </a:xfrm>
+          <a:prstGeom prst="rect">
+            <a:avLst/>
+          </a:prstGeom>
+          <a:noFill/>
+        </p:spPr>
+        <p:txBody>
+          <a:bodyPr wrap="square" rtlCol="0">
+            <a:spAutoFit/>
+          </a:bodyPr>
+          <a:lstStyle/>
+          <a:p>
+            <a:r>
+              <a:rPr lang="en-US" sz="1400" b="1" dirty="0">
+                <a:solidFill>
+                  <a:schemeClr val="tx1">
+                    <a:lumMod val="50000"/>
+                    <a:lumOff val="50000"/>
+                  </a:schemeClr>
+                </a:solidFill>
+              </a:rPr>
+              <a:t>Slave HMI</a:t>
+            </a:r>
+          </a:p>
+        </p:txBody>
+      </p:sp>
+      <p:cxnSp>
+        <p:nvCxnSpPr>
+          <p:cNvPr id="63" name="Connector: Elbow 62">
+            <a:extLst>
+              <a:ext uri="{FF2B5EF4-FFF2-40B4-BE49-F238E27FC236}">
+                <a16:creationId xmlns:a16="http://schemas.microsoft.com/office/drawing/2014/main" id="{A38F702D-A77A-297B-51F2-2E60A0180CFC}"/>
+              </a:ext>
+            </a:extLst>
+          </p:cNvPr>
+          <p:cNvCxnSpPr>
+            <a:cxnSpLocks/>
+            <a:stCxn id="47" idx="2"/>
+            <a:endCxn id="53" idx="2"/>
+          </p:cNvCxnSpPr>
+          <p:nvPr/>
+        </p:nvCxnSpPr>
+        <p:spPr>
+          <a:xfrm rot="5400000" flipH="1">
+            <a:off x="5551291" y="4671475"/>
+            <a:ext cx="2" cy="1726183"/>
+          </a:xfrm>
+          <a:prstGeom prst="bentConnector3">
+            <a:avLst>
+              <a:gd name="adj1" fmla="val -11430000000"/>
+            </a:avLst>
+          </a:prstGeom>
+        </p:spPr>
+        <p:style>
+          <a:lnRef idx="2">
+            <a:schemeClr val="accent1"/>
+          </a:lnRef>
+          <a:fillRef idx="0">
+            <a:schemeClr val="accent1"/>
+          </a:fillRef>
+          <a:effectRef idx="1">
+            <a:schemeClr val="accent1"/>
+          </a:effectRef>
+          <a:fontRef idx="minor">
+            <a:schemeClr val="tx1"/>
+          </a:fontRef>
+        </p:style>
+      </p:cxnSp>
+      <p:cxnSp>
+        <p:nvCxnSpPr>
+          <p:cNvPr id="1025" name="Connector: Elbow 1024">
+            <a:extLst>
+              <a:ext uri="{FF2B5EF4-FFF2-40B4-BE49-F238E27FC236}">
+                <a16:creationId xmlns:a16="http://schemas.microsoft.com/office/drawing/2014/main" id="{12C26D9E-C0E8-3852-273D-5DEB5072A40E}"/>
+              </a:ext>
+            </a:extLst>
+          </p:cNvPr>
+          <p:cNvCxnSpPr>
+            <a:cxnSpLocks/>
+            <a:stCxn id="53" idx="2"/>
+            <a:endCxn id="54" idx="2"/>
+          </p:cNvCxnSpPr>
+          <p:nvPr/>
+        </p:nvCxnSpPr>
+        <p:spPr>
+          <a:xfrm rot="5400000">
+            <a:off x="3841245" y="4687610"/>
+            <a:ext cx="12700" cy="1693910"/>
+          </a:xfrm>
+          <a:prstGeom prst="bentConnector3">
+            <a:avLst>
+              <a:gd name="adj1" fmla="val 1800000"/>
+            </a:avLst>
+          </a:prstGeom>
+        </p:spPr>
+        <p:style>
+          <a:lnRef idx="2">
+            <a:schemeClr val="accent1"/>
+          </a:lnRef>
+          <a:fillRef idx="0">
+            <a:schemeClr val="accent1"/>
+          </a:fillRef>
+          <a:effectRef idx="1">
+            <a:schemeClr val="accent1"/>
+          </a:effectRef>
+          <a:fontRef idx="minor">
+            <a:schemeClr val="tx1"/>
+          </a:fontRef>
+        </p:style>
+      </p:cxnSp>
+      <p:sp>
+        <p:nvSpPr>
+          <p:cNvPr id="1029" name="TextBox 1028">
+            <a:extLst>
+              <a:ext uri="{FF2B5EF4-FFF2-40B4-BE49-F238E27FC236}">
+                <a16:creationId xmlns:a16="http://schemas.microsoft.com/office/drawing/2014/main" id="{76B694FE-2F52-65F8-D4CA-E9D9F4F5648B}"/>
+              </a:ext>
+            </a:extLst>
+          </p:cNvPr>
+          <p:cNvSpPr txBox="1"/>
+          <p:nvPr/>
+        </p:nvSpPr>
+        <p:spPr>
+          <a:xfrm>
+            <a:off x="3686289" y="5800379"/>
+            <a:ext cx="2765179" cy="307777"/>
+          </a:xfrm>
+          <a:prstGeom prst="rect">
+            <a:avLst/>
+          </a:prstGeom>
+          <a:noFill/>
+        </p:spPr>
+        <p:txBody>
+          <a:bodyPr wrap="square" rtlCol="0">
+            <a:spAutoFit/>
+          </a:bodyPr>
+          <a:lstStyle/>
+          <a:p>
+            <a:r>
+              <a:rPr lang="en-US" sz="1400" b="1" dirty="0">
+                <a:solidFill>
+                  <a:schemeClr val="accent1">
+                    <a:lumMod val="75000"/>
+                  </a:schemeClr>
+                </a:solidFill>
+              </a:rPr>
+              <a:t>Ethernet Connection </a:t>
+            </a:r>
+          </a:p>
+        </p:txBody>
+      </p:sp>
+    </p:spTree>
+    <p:extLst>
+      <p:ext uri="{BB962C8B-B14F-4D97-AF65-F5344CB8AC3E}">
+        <p14:creationId xmlns:p14="http://schemas.microsoft.com/office/powerpoint/2010/main" val="1607773486"/>
+      </p:ext>
+    </p:extLst>
+  </p:cSld>
+  <p:clrMapOvr>
+    <a:masterClrMapping/>
+  </p:clrMapOvr>
+</p:sld>
+</file>
+
+<file path=ppt/slides/slide3.xml><?xml version="1.0" encoding="utf-8"?>
+<p:sld xmlns:a="http://schemas.openxmlformats.org/drawingml/2006/main" xmlns:r="http://schemas.openxmlformats.org/officeDocument/2006/relationships" xmlns:p="http://schemas.openxmlformats.org/presentationml/2006/main">
+  <p:cSld>
+    <p:spTree>
+      <p:nvGrpSpPr>
+        <p:cNvPr id="1" name=""/>
+        <p:cNvGrpSpPr/>
+        <p:nvPr/>
+      </p:nvGrpSpPr>
+      <p:grpSpPr>
+        <a:xfrm>
+          <a:off x="0" y="0"/>
+          <a:ext cx="0" cy="0"/>
+          <a:chOff x="0" y="0"/>
+          <a:chExt cx="0" cy="0"/>
+        </a:xfrm>
+      </p:grpSpPr>
+      <p:pic>
+        <p:nvPicPr>
+          <p:cNvPr id="4" name="Picture 3">
+            <a:extLst>
+              <a:ext uri="{FF2B5EF4-FFF2-40B4-BE49-F238E27FC236}">
+                <a16:creationId xmlns:a16="http://schemas.microsoft.com/office/drawing/2014/main" id="{C0538145-2640-2CD7-C99C-0CCDE770F68B}"/>
+              </a:ext>
+            </a:extLst>
+          </p:cNvPr>
+          <p:cNvPicPr>
+            <a:picLocks noChangeAspect="1"/>
+          </p:cNvPicPr>
+          <p:nvPr/>
+        </p:nvPicPr>
+        <p:blipFill>
+          <a:blip r:embed="rId2"/>
+          <a:stretch>
+            <a:fillRect/>
+          </a:stretch>
+        </p:blipFill>
+        <p:spPr>
+          <a:xfrm>
+            <a:off x="5594322" y="1631501"/>
+            <a:ext cx="1209815" cy="1084563"/>
+          </a:xfrm>
+          <a:prstGeom prst="rect">
+            <a:avLst/>
+          </a:prstGeom>
+        </p:spPr>
+      </p:pic>
+      <p:pic>
+        <p:nvPicPr>
+          <p:cNvPr id="5" name="Picture 4">
+            <a:extLst>
+              <a:ext uri="{FF2B5EF4-FFF2-40B4-BE49-F238E27FC236}">
+                <a16:creationId xmlns:a16="http://schemas.microsoft.com/office/drawing/2014/main" id="{69303A76-540C-332B-8A68-0947114E8535}"/>
+              </a:ext>
+            </a:extLst>
+          </p:cNvPr>
+          <p:cNvPicPr>
+            <a:picLocks noChangeAspect="1"/>
+          </p:cNvPicPr>
+          <p:nvPr/>
+        </p:nvPicPr>
+        <p:blipFill>
+          <a:blip r:embed="rId3"/>
+          <a:stretch>
+            <a:fillRect/>
+          </a:stretch>
+        </p:blipFill>
+        <p:spPr>
+          <a:xfrm>
+            <a:off x="7836871" y="1631501"/>
+            <a:ext cx="1373543" cy="1084563"/>
+          </a:xfrm>
+          <a:prstGeom prst="rect">
+            <a:avLst/>
+          </a:prstGeom>
+        </p:spPr>
+      </p:pic>
+      <p:cxnSp>
+        <p:nvCxnSpPr>
+          <p:cNvPr id="6" name="Straight Connector 5">
+            <a:extLst>
+              <a:ext uri="{FF2B5EF4-FFF2-40B4-BE49-F238E27FC236}">
+                <a16:creationId xmlns:a16="http://schemas.microsoft.com/office/drawing/2014/main" id="{EF6793B8-DB65-DEF9-4869-831C2DAD914E}"/>
+              </a:ext>
+            </a:extLst>
+          </p:cNvPr>
+          <p:cNvCxnSpPr>
+            <a:cxnSpLocks/>
+            <a:stCxn id="4" idx="3"/>
+          </p:cNvCxnSpPr>
+          <p:nvPr/>
+        </p:nvCxnSpPr>
+        <p:spPr>
+          <a:xfrm>
+            <a:off x="6804137" y="2173783"/>
+            <a:ext cx="1032734" cy="0"/>
+          </a:xfrm>
+          <a:prstGeom prst="line">
+            <a:avLst/>
+          </a:prstGeom>
+          <a:ln w="38100"/>
+        </p:spPr>
+        <p:style>
+          <a:lnRef idx="2">
+            <a:schemeClr val="accent3"/>
+          </a:lnRef>
+          <a:fillRef idx="0">
+            <a:schemeClr val="accent3"/>
+          </a:fillRef>
+          <a:effectRef idx="1">
+            <a:schemeClr val="accent3"/>
+          </a:effectRef>
+          <a:fontRef idx="minor">
+            <a:schemeClr val="tx1"/>
+          </a:fontRef>
+        </p:style>
+      </p:cxnSp>
+      <p:sp>
+        <p:nvSpPr>
+          <p:cNvPr id="7" name="TextBox 6">
+            <a:extLst>
+              <a:ext uri="{FF2B5EF4-FFF2-40B4-BE49-F238E27FC236}">
+                <a16:creationId xmlns:a16="http://schemas.microsoft.com/office/drawing/2014/main" id="{9380A600-B108-E03D-F896-F755C1C77F82}"/>
+              </a:ext>
+            </a:extLst>
+          </p:cNvPr>
+          <p:cNvSpPr txBox="1"/>
+          <p:nvPr/>
+        </p:nvSpPr>
+        <p:spPr>
+          <a:xfrm>
+            <a:off x="5594321" y="1369891"/>
+            <a:ext cx="1373543" cy="307777"/>
+          </a:xfrm>
+          <a:prstGeom prst="rect">
+            <a:avLst/>
+          </a:prstGeom>
+          <a:noFill/>
+        </p:spPr>
+        <p:txBody>
+          <a:bodyPr wrap="square" rtlCol="0">
+            <a:spAutoFit/>
+          </a:bodyPr>
+          <a:lstStyle/>
+          <a:p>
+            <a:r>
+              <a:rPr lang="en-US" sz="1400" b="1" dirty="0">
+                <a:solidFill>
+                  <a:schemeClr val="accent1">
+                    <a:lumMod val="75000"/>
+                  </a:schemeClr>
+                </a:solidFill>
+              </a:rPr>
+              <a:t>Master HMI</a:t>
+            </a:r>
+          </a:p>
+        </p:txBody>
+      </p:sp>
+      <p:sp>
+        <p:nvSpPr>
+          <p:cNvPr id="8" name="TextBox 7">
+            <a:extLst>
+              <a:ext uri="{FF2B5EF4-FFF2-40B4-BE49-F238E27FC236}">
+                <a16:creationId xmlns:a16="http://schemas.microsoft.com/office/drawing/2014/main" id="{03D3D277-264B-4E57-E60C-D629E3A644A7}"/>
+              </a:ext>
+            </a:extLst>
+          </p:cNvPr>
+          <p:cNvSpPr txBox="1"/>
+          <p:nvPr/>
+        </p:nvSpPr>
+        <p:spPr>
+          <a:xfrm>
+            <a:off x="7761566" y="1369891"/>
+            <a:ext cx="1373543" cy="307777"/>
+          </a:xfrm>
+          <a:prstGeom prst="rect">
+            <a:avLst/>
+          </a:prstGeom>
+          <a:noFill/>
+        </p:spPr>
+        <p:txBody>
+          <a:bodyPr wrap="square" rtlCol="0">
+            <a:spAutoFit/>
+          </a:bodyPr>
+          <a:lstStyle/>
+          <a:p>
+            <a:r>
+              <a:rPr lang="en-US" sz="1400" b="1" dirty="0">
+                <a:solidFill>
+                  <a:schemeClr val="accent1">
+                    <a:lumMod val="75000"/>
+                  </a:schemeClr>
+                </a:solidFill>
+              </a:rPr>
+              <a:t>OT Controller </a:t>
+            </a:r>
+          </a:p>
+        </p:txBody>
+      </p:sp>
+      <p:sp>
+        <p:nvSpPr>
+          <p:cNvPr id="9" name="TextBox 8">
+            <a:extLst>
+              <a:ext uri="{FF2B5EF4-FFF2-40B4-BE49-F238E27FC236}">
+                <a16:creationId xmlns:a16="http://schemas.microsoft.com/office/drawing/2014/main" id="{77173455-486C-0EB0-7DB8-E62BDFCB8A9F}"/>
+              </a:ext>
+            </a:extLst>
+          </p:cNvPr>
+          <p:cNvSpPr txBox="1"/>
+          <p:nvPr/>
+        </p:nvSpPr>
+        <p:spPr>
+          <a:xfrm>
+            <a:off x="6804137" y="1542129"/>
+            <a:ext cx="1463040" cy="523220"/>
+          </a:xfrm>
+          <a:prstGeom prst="rect">
+            <a:avLst/>
+          </a:prstGeom>
+          <a:noFill/>
+        </p:spPr>
+        <p:txBody>
+          <a:bodyPr wrap="square" rtlCol="0">
+            <a:spAutoFit/>
+          </a:bodyPr>
+          <a:lstStyle/>
+          <a:p>
+            <a:r>
+              <a:rPr lang="en-US" sz="1400" b="1" dirty="0">
+                <a:solidFill>
+                  <a:schemeClr val="accent1">
+                    <a:lumMod val="75000"/>
+                  </a:schemeClr>
+                </a:solidFill>
+              </a:rPr>
+              <a:t>Ethernet Connection </a:t>
+            </a:r>
+          </a:p>
+        </p:txBody>
+      </p:sp>
+      <p:sp>
+        <p:nvSpPr>
+          <p:cNvPr id="10" name="Cylinder 9">
+            <a:extLst>
+              <a:ext uri="{FF2B5EF4-FFF2-40B4-BE49-F238E27FC236}">
+                <a16:creationId xmlns:a16="http://schemas.microsoft.com/office/drawing/2014/main" id="{F3A67AD4-89B1-75CF-00D5-AAA39B31CF98}"/>
+              </a:ext>
+            </a:extLst>
+          </p:cNvPr>
+          <p:cNvSpPr/>
+          <p:nvPr/>
+        </p:nvSpPr>
+        <p:spPr>
+          <a:xfrm>
+            <a:off x="3706011" y="1786505"/>
+            <a:ext cx="978946" cy="645459"/>
+          </a:xfrm>
+          <a:prstGeom prst="can">
+            <a:avLst/>
+          </a:prstGeom>
+        </p:spPr>
+        <p:style>
+          <a:lnRef idx="2">
+            <a:schemeClr val="accent1">
+              <a:shade val="15000"/>
+            </a:schemeClr>
+          </a:lnRef>
+          <a:fillRef idx="1">
+            <a:schemeClr val="accent1"/>
+          </a:fillRef>
+          <a:effectRef idx="0">
+            <a:schemeClr val="accent1"/>
+          </a:effectRef>
+          <a:fontRef idx="minor">
+            <a:schemeClr val="lt1"/>
+          </a:fontRef>
+        </p:style>
+        <p:txBody>
+          <a:bodyPr rtlCol="0" anchor="ctr"/>
+          <a:lstStyle/>
+          <a:p>
+            <a:pPr algn="ctr"/>
+            <a:r>
+              <a:rPr lang="en-US" sz="1200" b="1" dirty="0"/>
+              <a:t>Database</a:t>
+            </a:r>
+            <a:endParaRPr lang="en-SG" sz="1200" b="1" dirty="0"/>
+          </a:p>
+        </p:txBody>
+      </p:sp>
+      <p:pic>
+        <p:nvPicPr>
+          <p:cNvPr id="15" name="Picture 14">
+            <a:extLst>
+              <a:ext uri="{FF2B5EF4-FFF2-40B4-BE49-F238E27FC236}">
+                <a16:creationId xmlns:a16="http://schemas.microsoft.com/office/drawing/2014/main" id="{C520F121-6D4B-EBEF-927E-F3F29A352447}"/>
+              </a:ext>
+            </a:extLst>
+          </p:cNvPr>
+          <p:cNvPicPr>
+            <a:picLocks noChangeAspect="1"/>
+          </p:cNvPicPr>
+          <p:nvPr/>
+        </p:nvPicPr>
+        <p:blipFill>
+          <a:blip r:embed="rId4">
+            <a:duotone>
+              <a:schemeClr val="accent2">
+                <a:shade val="45000"/>
+                <a:satMod val="135000"/>
+              </a:schemeClr>
+              <a:prstClr val="white"/>
+            </a:duotone>
+            <a:extLst>
+              <a:ext uri="{BEBA8EAE-BF5A-486C-A8C5-ECC9F3942E4B}">
+                <a14:imgProps xmlns:a14="http://schemas.microsoft.com/office/drawing/2010/main">
+                  <a14:imgLayer r:embed="rId5">
+                    <a14:imgEffect>
+                      <a14:saturation sat="0"/>
+                    </a14:imgEffect>
+                  </a14:imgLayer>
+                </a14:imgProps>
+              </a:ext>
+            </a:extLst>
+          </a:blip>
+          <a:stretch>
+            <a:fillRect/>
+          </a:stretch>
+        </p:blipFill>
+        <p:spPr>
+          <a:xfrm>
+            <a:off x="1436606" y="1566952"/>
+            <a:ext cx="1209815" cy="1084563"/>
+          </a:xfrm>
+          <a:prstGeom prst="rect">
+            <a:avLst/>
+          </a:prstGeom>
+        </p:spPr>
+      </p:pic>
+      <p:sp>
+        <p:nvSpPr>
+          <p:cNvPr id="16" name="TextBox 15">
+            <a:extLst>
+              <a:ext uri="{FF2B5EF4-FFF2-40B4-BE49-F238E27FC236}">
+                <a16:creationId xmlns:a16="http://schemas.microsoft.com/office/drawing/2014/main" id="{C76D2AA7-005A-CC33-2F67-E748A2936151}"/>
+              </a:ext>
+            </a:extLst>
+          </p:cNvPr>
+          <p:cNvSpPr txBox="1"/>
+          <p:nvPr/>
+        </p:nvSpPr>
+        <p:spPr>
+          <a:xfrm>
+            <a:off x="1287257" y="1259175"/>
+            <a:ext cx="1800187" cy="307777"/>
+          </a:xfrm>
+          <a:prstGeom prst="rect">
+            <a:avLst/>
+          </a:prstGeom>
+          <a:noFill/>
+        </p:spPr>
+        <p:txBody>
+          <a:bodyPr wrap="square" rtlCol="0">
+            <a:spAutoFit/>
+          </a:bodyPr>
+          <a:lstStyle/>
+          <a:p>
+            <a:r>
+              <a:rPr lang="en-US" sz="1400" b="1" dirty="0">
+                <a:solidFill>
+                  <a:schemeClr val="accent1">
+                    <a:lumMod val="75000"/>
+                  </a:schemeClr>
+                </a:solidFill>
+              </a:rPr>
+              <a:t>Management HMI</a:t>
+            </a:r>
+          </a:p>
+        </p:txBody>
+      </p:sp>
+      <p:cxnSp>
+        <p:nvCxnSpPr>
+          <p:cNvPr id="18" name="Straight Connector 17">
+            <a:extLst>
+              <a:ext uri="{FF2B5EF4-FFF2-40B4-BE49-F238E27FC236}">
+                <a16:creationId xmlns:a16="http://schemas.microsoft.com/office/drawing/2014/main" id="{4E538609-6F64-BB08-F305-ADCFF9A2186C}"/>
+              </a:ext>
+            </a:extLst>
+          </p:cNvPr>
+          <p:cNvCxnSpPr>
+            <a:stCxn id="15" idx="3"/>
+            <a:endCxn id="10" idx="2"/>
+          </p:cNvCxnSpPr>
+          <p:nvPr/>
+        </p:nvCxnSpPr>
+        <p:spPr>
+          <a:xfrm>
+            <a:off x="2646421" y="2109234"/>
+            <a:ext cx="1059590" cy="1"/>
+          </a:xfrm>
+          <a:prstGeom prst="line">
+            <a:avLst/>
+          </a:prstGeom>
+          <a:ln w="38100"/>
+        </p:spPr>
+        <p:style>
+          <a:lnRef idx="2">
+            <a:schemeClr val="accent2"/>
+          </a:lnRef>
+          <a:fillRef idx="0">
+            <a:schemeClr val="accent2"/>
+          </a:fillRef>
+          <a:effectRef idx="1">
+            <a:schemeClr val="accent2"/>
+          </a:effectRef>
+          <a:fontRef idx="minor">
+            <a:schemeClr val="tx1"/>
+          </a:fontRef>
+        </p:style>
+      </p:cxnSp>
+      <p:sp>
+        <p:nvSpPr>
+          <p:cNvPr id="24" name="Rectangle: Rounded Corners 23">
+            <a:extLst>
+              <a:ext uri="{FF2B5EF4-FFF2-40B4-BE49-F238E27FC236}">
+                <a16:creationId xmlns:a16="http://schemas.microsoft.com/office/drawing/2014/main" id="{6229CC76-BC5C-16E7-81B5-D3A5AC54F843}"/>
+              </a:ext>
+            </a:extLst>
+          </p:cNvPr>
+          <p:cNvSpPr/>
+          <p:nvPr/>
+        </p:nvSpPr>
+        <p:spPr>
+          <a:xfrm>
+            <a:off x="5276589" y="2824498"/>
+            <a:ext cx="1845280" cy="379530"/>
+          </a:xfrm>
+          <a:prstGeom prst="roundRect">
+            <a:avLst/>
+          </a:prstGeom>
+          <a:solidFill>
+            <a:schemeClr val="accent6">
+              <a:lumMod val="75000"/>
+            </a:schemeClr>
+          </a:solidFill>
+        </p:spPr>
+        <p:style>
+          <a:lnRef idx="2">
+            <a:schemeClr val="accent2">
+              <a:shade val="15000"/>
+            </a:schemeClr>
+          </a:lnRef>
+          <a:fillRef idx="1">
+            <a:schemeClr val="accent2"/>
+          </a:fillRef>
+          <a:effectRef idx="0">
+            <a:schemeClr val="accent2"/>
+          </a:effectRef>
+          <a:fontRef idx="minor">
+            <a:schemeClr val="lt1"/>
+          </a:fontRef>
+        </p:style>
+        <p:txBody>
+          <a:bodyPr rtlCol="0" anchor="ctr"/>
+          <a:lstStyle/>
+          <a:p>
+            <a:pPr algn="ctr"/>
+            <a:r>
+              <a:rPr lang="en-US" sz="1200" b="1" dirty="0"/>
+              <a:t>OT data process units </a:t>
+            </a:r>
+            <a:endParaRPr lang="en-SG" sz="1200" b="1" dirty="0"/>
+          </a:p>
+        </p:txBody>
+      </p:sp>
+      <p:cxnSp>
+        <p:nvCxnSpPr>
+          <p:cNvPr id="25" name="Straight Connector 24">
+            <a:extLst>
+              <a:ext uri="{FF2B5EF4-FFF2-40B4-BE49-F238E27FC236}">
+                <a16:creationId xmlns:a16="http://schemas.microsoft.com/office/drawing/2014/main" id="{4BF9BA34-6930-B7B9-C226-AA3E60A69AA0}"/>
+              </a:ext>
+            </a:extLst>
+          </p:cNvPr>
+          <p:cNvCxnSpPr>
+            <a:cxnSpLocks/>
+          </p:cNvCxnSpPr>
+          <p:nvPr/>
+        </p:nvCxnSpPr>
+        <p:spPr>
+          <a:xfrm>
+            <a:off x="4684957" y="2109233"/>
+            <a:ext cx="909364" cy="0"/>
+          </a:xfrm>
+          <a:prstGeom prst="line">
+            <a:avLst/>
+          </a:prstGeom>
+          <a:ln w="38100"/>
+        </p:spPr>
+        <p:style>
+          <a:lnRef idx="2">
+            <a:schemeClr val="accent3"/>
+          </a:lnRef>
+          <a:fillRef idx="0">
+            <a:schemeClr val="accent3"/>
+          </a:fillRef>
+          <a:effectRef idx="1">
+            <a:schemeClr val="accent3"/>
+          </a:effectRef>
+          <a:fontRef idx="minor">
+            <a:schemeClr val="tx1"/>
+          </a:fontRef>
+        </p:style>
+      </p:cxnSp>
+      <p:cxnSp>
+        <p:nvCxnSpPr>
+          <p:cNvPr id="28" name="Connector: Elbow 27">
+            <a:extLst>
+              <a:ext uri="{FF2B5EF4-FFF2-40B4-BE49-F238E27FC236}">
+                <a16:creationId xmlns:a16="http://schemas.microsoft.com/office/drawing/2014/main" id="{485DAA37-B14B-7FD3-ABB1-EE1E7A811577}"/>
+              </a:ext>
+            </a:extLst>
+          </p:cNvPr>
+          <p:cNvCxnSpPr>
+            <a:stCxn id="5" idx="2"/>
+            <a:endCxn id="24" idx="3"/>
+          </p:cNvCxnSpPr>
+          <p:nvPr/>
+        </p:nvCxnSpPr>
+        <p:spPr>
+          <a:xfrm rot="5400000">
+            <a:off x="7673657" y="2164276"/>
+            <a:ext cx="298199" cy="1401774"/>
+          </a:xfrm>
+          <a:prstGeom prst="bentConnector2">
+            <a:avLst/>
+          </a:prstGeom>
+        </p:spPr>
+        <p:style>
+          <a:lnRef idx="2">
+            <a:schemeClr val="accent1"/>
+          </a:lnRef>
+          <a:fillRef idx="0">
+            <a:schemeClr val="accent1"/>
+          </a:fillRef>
+          <a:effectRef idx="1">
+            <a:schemeClr val="accent1"/>
+          </a:effectRef>
+          <a:fontRef idx="minor">
+            <a:schemeClr val="tx1"/>
+          </a:fontRef>
+        </p:style>
+      </p:cxnSp>
+      <p:cxnSp>
+        <p:nvCxnSpPr>
+          <p:cNvPr id="29" name="Connector: Elbow 28">
+            <a:extLst>
+              <a:ext uri="{FF2B5EF4-FFF2-40B4-BE49-F238E27FC236}">
+                <a16:creationId xmlns:a16="http://schemas.microsoft.com/office/drawing/2014/main" id="{5EA83B12-2CE2-50A6-3FD2-AAF4A8E4BA00}"/>
+              </a:ext>
+            </a:extLst>
+          </p:cNvPr>
+          <p:cNvCxnSpPr>
+            <a:cxnSpLocks/>
+            <a:stCxn id="24" idx="1"/>
+            <a:endCxn id="10" idx="3"/>
+          </p:cNvCxnSpPr>
+          <p:nvPr/>
+        </p:nvCxnSpPr>
+        <p:spPr>
+          <a:xfrm rot="10800000">
+            <a:off x="4195485" y="2431965"/>
+            <a:ext cx="1081105" cy="582299"/>
+          </a:xfrm>
+          <a:prstGeom prst="bentConnector2">
+            <a:avLst/>
+          </a:prstGeom>
+        </p:spPr>
+        <p:style>
+          <a:lnRef idx="2">
+            <a:schemeClr val="accent1"/>
+          </a:lnRef>
+          <a:fillRef idx="0">
+            <a:schemeClr val="accent1"/>
+          </a:fillRef>
+          <a:effectRef idx="1">
+            <a:schemeClr val="accent1"/>
+          </a:effectRef>
+          <a:fontRef idx="minor">
+            <a:schemeClr val="tx1"/>
+          </a:fontRef>
+        </p:style>
+      </p:cxnSp>
+    </p:spTree>
+    <p:extLst>
+      <p:ext uri="{BB962C8B-B14F-4D97-AF65-F5344CB8AC3E}">
+        <p14:creationId xmlns:p14="http://schemas.microsoft.com/office/powerpoint/2010/main" val="3616202045"/>
       </p:ext>
     </p:extLst>
   </p:cSld>

</xml_diff>

<commit_message>
update the difference compare section.
</commit_message>
<xml_diff>
--- a/OT_System_Attack_Case_Study/Railway_HQ_HMI/img/designDoc.pptx
+++ b/OT_System_Attack_Case_Study/Railway_HQ_HMI/img/designDoc.pptx
@@ -4,10 +4,14 @@
   <p:sldMasterIdLst>
     <p:sldMasterId id="2147483648" r:id="rId1"/>
   </p:sldMasterIdLst>
+  <p:notesMasterIdLst>
+    <p:notesMasterId r:id="rId6"/>
+  </p:notesMasterIdLst>
   <p:sldIdLst>
     <p:sldId id="256" r:id="rId2"/>
     <p:sldId id="257" r:id="rId3"/>
     <p:sldId id="258" r:id="rId4"/>
+    <p:sldId id="259" r:id="rId5"/>
   </p:sldIdLst>
   <p:sldSz cx="12192000" cy="6858000"/>
   <p:notesSz cx="6858000" cy="9144000"/>
@@ -112,6 +116,356 @@
     </p:ext>
   </p:extLst>
 </p:presentation>
+</file>
+
+<file path=ppt/notesMasters/notesMaster1.xml><?xml version="1.0" encoding="utf-8"?>
+<p:notesMaster xmlns:a="http://schemas.openxmlformats.org/drawingml/2006/main" xmlns:r="http://schemas.openxmlformats.org/officeDocument/2006/relationships" xmlns:p="http://schemas.openxmlformats.org/presentationml/2006/main">
+  <p:cSld>
+    <p:bg>
+      <p:bgRef idx="1001">
+        <a:schemeClr val="bg1"/>
+      </p:bgRef>
+    </p:bg>
+    <p:spTree>
+      <p:nvGrpSpPr>
+        <p:cNvPr id="1" name=""/>
+        <p:cNvGrpSpPr/>
+        <p:nvPr/>
+      </p:nvGrpSpPr>
+      <p:grpSpPr>
+        <a:xfrm>
+          <a:off x="0" y="0"/>
+          <a:ext cx="0" cy="0"/>
+          <a:chOff x="0" y="0"/>
+          <a:chExt cx="0" cy="0"/>
+        </a:xfrm>
+      </p:grpSpPr>
+      <p:sp>
+        <p:nvSpPr>
+          <p:cNvPr id="2" name="Header Placeholder 1"/>
+          <p:cNvSpPr>
+            <a:spLocks noGrp="1"/>
+          </p:cNvSpPr>
+          <p:nvPr>
+            <p:ph type="hdr" sz="quarter"/>
+          </p:nvPr>
+        </p:nvSpPr>
+        <p:spPr>
+          <a:xfrm>
+            <a:off x="0" y="0"/>
+            <a:ext cx="2971800" cy="458788"/>
+          </a:xfrm>
+          <a:prstGeom prst="rect">
+            <a:avLst/>
+          </a:prstGeom>
+        </p:spPr>
+        <p:txBody>
+          <a:bodyPr vert="horz" lIns="91440" tIns="45720" rIns="91440" bIns="45720" rtlCol="0"/>
+          <a:lstStyle>
+            <a:lvl1pPr algn="l">
+              <a:defRPr sz="1200"/>
+            </a:lvl1pPr>
+          </a:lstStyle>
+          <a:p>
+            <a:endParaRPr lang="en-SG"/>
+          </a:p>
+        </p:txBody>
+      </p:sp>
+      <p:sp>
+        <p:nvSpPr>
+          <p:cNvPr id="3" name="Date Placeholder 2"/>
+          <p:cNvSpPr>
+            <a:spLocks noGrp="1"/>
+          </p:cNvSpPr>
+          <p:nvPr>
+            <p:ph type="dt" idx="1"/>
+          </p:nvPr>
+        </p:nvSpPr>
+        <p:spPr>
+          <a:xfrm>
+            <a:off x="3884613" y="0"/>
+            <a:ext cx="2971800" cy="458788"/>
+          </a:xfrm>
+          <a:prstGeom prst="rect">
+            <a:avLst/>
+          </a:prstGeom>
+        </p:spPr>
+        <p:txBody>
+          <a:bodyPr vert="horz" lIns="91440" tIns="45720" rIns="91440" bIns="45720" rtlCol="0"/>
+          <a:lstStyle>
+            <a:lvl1pPr algn="r">
+              <a:defRPr sz="1200"/>
+            </a:lvl1pPr>
+          </a:lstStyle>
+          <a:p>
+            <a:fld id="{4BB16BDD-9791-4237-A9A1-E718D2137CC9}" type="datetimeFigureOut">
+              <a:rPr lang="en-SG" smtClean="0"/>
+              <a:t>14/6/2025</a:t>
+            </a:fld>
+            <a:endParaRPr lang="en-SG"/>
+          </a:p>
+        </p:txBody>
+      </p:sp>
+      <p:sp>
+        <p:nvSpPr>
+          <p:cNvPr id="4" name="Slide Image Placeholder 3"/>
+          <p:cNvSpPr>
+            <a:spLocks noGrp="1" noRot="1" noChangeAspect="1"/>
+          </p:cNvSpPr>
+          <p:nvPr>
+            <p:ph type="sldImg" idx="2"/>
+          </p:nvPr>
+        </p:nvSpPr>
+        <p:spPr>
+          <a:xfrm>
+            <a:off x="685800" y="1143000"/>
+            <a:ext cx="5486400" cy="3086100"/>
+          </a:xfrm>
+          <a:prstGeom prst="rect">
+            <a:avLst/>
+          </a:prstGeom>
+          <a:noFill/>
+          <a:ln w="12700">
+            <a:solidFill>
+              <a:prstClr val="black"/>
+            </a:solidFill>
+          </a:ln>
+        </p:spPr>
+        <p:txBody>
+          <a:bodyPr vert="horz" lIns="91440" tIns="45720" rIns="91440" bIns="45720" rtlCol="0" anchor="ctr"/>
+          <a:lstStyle/>
+          <a:p>
+            <a:endParaRPr lang="en-SG"/>
+          </a:p>
+        </p:txBody>
+      </p:sp>
+      <p:sp>
+        <p:nvSpPr>
+          <p:cNvPr id="5" name="Notes Placeholder 4"/>
+          <p:cNvSpPr>
+            <a:spLocks noGrp="1"/>
+          </p:cNvSpPr>
+          <p:nvPr>
+            <p:ph type="body" sz="quarter" idx="3"/>
+          </p:nvPr>
+        </p:nvSpPr>
+        <p:spPr>
+          <a:xfrm>
+            <a:off x="685800" y="4400550"/>
+            <a:ext cx="5486400" cy="3600450"/>
+          </a:xfrm>
+          <a:prstGeom prst="rect">
+            <a:avLst/>
+          </a:prstGeom>
+        </p:spPr>
+        <p:txBody>
+          <a:bodyPr vert="horz" lIns="91440" tIns="45720" rIns="91440" bIns="45720" rtlCol="0"/>
+          <a:lstStyle/>
+          <a:p>
+            <a:pPr lvl="0"/>
+            <a:r>
+              <a:rPr lang="en-US"/>
+              <a:t>Click to edit Master text styles</a:t>
+            </a:r>
+          </a:p>
+          <a:p>
+            <a:pPr lvl="1"/>
+            <a:r>
+              <a:rPr lang="en-US"/>
+              <a:t>Second level</a:t>
+            </a:r>
+          </a:p>
+          <a:p>
+            <a:pPr lvl="2"/>
+            <a:r>
+              <a:rPr lang="en-US"/>
+              <a:t>Third level</a:t>
+            </a:r>
+          </a:p>
+          <a:p>
+            <a:pPr lvl="3"/>
+            <a:r>
+              <a:rPr lang="en-US"/>
+              <a:t>Fourth level</a:t>
+            </a:r>
+          </a:p>
+          <a:p>
+            <a:pPr lvl="4"/>
+            <a:r>
+              <a:rPr lang="en-US"/>
+              <a:t>Fifth level</a:t>
+            </a:r>
+            <a:endParaRPr lang="en-SG"/>
+          </a:p>
+        </p:txBody>
+      </p:sp>
+      <p:sp>
+        <p:nvSpPr>
+          <p:cNvPr id="6" name="Footer Placeholder 5"/>
+          <p:cNvSpPr>
+            <a:spLocks noGrp="1"/>
+          </p:cNvSpPr>
+          <p:nvPr>
+            <p:ph type="ftr" sz="quarter" idx="4"/>
+          </p:nvPr>
+        </p:nvSpPr>
+        <p:spPr>
+          <a:xfrm>
+            <a:off x="0" y="8685213"/>
+            <a:ext cx="2971800" cy="458787"/>
+          </a:xfrm>
+          <a:prstGeom prst="rect">
+            <a:avLst/>
+          </a:prstGeom>
+        </p:spPr>
+        <p:txBody>
+          <a:bodyPr vert="horz" lIns="91440" tIns="45720" rIns="91440" bIns="45720" rtlCol="0" anchor="b"/>
+          <a:lstStyle>
+            <a:lvl1pPr algn="l">
+              <a:defRPr sz="1200"/>
+            </a:lvl1pPr>
+          </a:lstStyle>
+          <a:p>
+            <a:endParaRPr lang="en-SG"/>
+          </a:p>
+        </p:txBody>
+      </p:sp>
+      <p:sp>
+        <p:nvSpPr>
+          <p:cNvPr id="7" name="Slide Number Placeholder 6"/>
+          <p:cNvSpPr>
+            <a:spLocks noGrp="1"/>
+          </p:cNvSpPr>
+          <p:nvPr>
+            <p:ph type="sldNum" sz="quarter" idx="5"/>
+          </p:nvPr>
+        </p:nvSpPr>
+        <p:spPr>
+          <a:xfrm>
+            <a:off x="3884613" y="8685213"/>
+            <a:ext cx="2971800" cy="458787"/>
+          </a:xfrm>
+          <a:prstGeom prst="rect">
+            <a:avLst/>
+          </a:prstGeom>
+        </p:spPr>
+        <p:txBody>
+          <a:bodyPr vert="horz" lIns="91440" tIns="45720" rIns="91440" bIns="45720" rtlCol="0" anchor="b"/>
+          <a:lstStyle>
+            <a:lvl1pPr algn="r">
+              <a:defRPr sz="1200"/>
+            </a:lvl1pPr>
+          </a:lstStyle>
+          <a:p>
+            <a:fld id="{6E366C2A-7779-4D47-AF81-FD7C27487D55}" type="slidenum">
+              <a:rPr lang="en-SG" smtClean="0"/>
+              <a:t>‹#›</a:t>
+            </a:fld>
+            <a:endParaRPr lang="en-SG"/>
+          </a:p>
+        </p:txBody>
+      </p:sp>
+    </p:spTree>
+    <p:extLst>
+      <p:ext uri="{BB962C8B-B14F-4D97-AF65-F5344CB8AC3E}">
+        <p14:creationId xmlns:p14="http://schemas.microsoft.com/office/powerpoint/2010/main" val="3429320395"/>
+      </p:ext>
+    </p:extLst>
+  </p:cSld>
+  <p:clrMap bg1="lt1" tx1="dk1" bg2="lt2" tx2="dk2" accent1="accent1" accent2="accent2" accent3="accent3" accent4="accent4" accent5="accent5" accent6="accent6" hlink="hlink" folHlink="folHlink"/>
+  <p:notesStyle>
+    <a:lvl1pPr marL="0" algn="l" defTabSz="914400" rtl="0" eaLnBrk="1" latinLnBrk="0" hangingPunct="1">
+      <a:defRPr sz="1200" kern="1200">
+        <a:solidFill>
+          <a:schemeClr val="tx1"/>
+        </a:solidFill>
+        <a:latin typeface="+mn-lt"/>
+        <a:ea typeface="+mn-ea"/>
+        <a:cs typeface="+mn-cs"/>
+      </a:defRPr>
+    </a:lvl1pPr>
+    <a:lvl2pPr marL="457200" algn="l" defTabSz="914400" rtl="0" eaLnBrk="1" latinLnBrk="0" hangingPunct="1">
+      <a:defRPr sz="1200" kern="1200">
+        <a:solidFill>
+          <a:schemeClr val="tx1"/>
+        </a:solidFill>
+        <a:latin typeface="+mn-lt"/>
+        <a:ea typeface="+mn-ea"/>
+        <a:cs typeface="+mn-cs"/>
+      </a:defRPr>
+    </a:lvl2pPr>
+    <a:lvl3pPr marL="914400" algn="l" defTabSz="914400" rtl="0" eaLnBrk="1" latinLnBrk="0" hangingPunct="1">
+      <a:defRPr sz="1200" kern="1200">
+        <a:solidFill>
+          <a:schemeClr val="tx1"/>
+        </a:solidFill>
+        <a:latin typeface="+mn-lt"/>
+        <a:ea typeface="+mn-ea"/>
+        <a:cs typeface="+mn-cs"/>
+      </a:defRPr>
+    </a:lvl3pPr>
+    <a:lvl4pPr marL="1371600" algn="l" defTabSz="914400" rtl="0" eaLnBrk="1" latinLnBrk="0" hangingPunct="1">
+      <a:defRPr sz="1200" kern="1200">
+        <a:solidFill>
+          <a:schemeClr val="tx1"/>
+        </a:solidFill>
+        <a:latin typeface="+mn-lt"/>
+        <a:ea typeface="+mn-ea"/>
+        <a:cs typeface="+mn-cs"/>
+      </a:defRPr>
+    </a:lvl4pPr>
+    <a:lvl5pPr marL="1828800" algn="l" defTabSz="914400" rtl="0" eaLnBrk="1" latinLnBrk="0" hangingPunct="1">
+      <a:defRPr sz="1200" kern="1200">
+        <a:solidFill>
+          <a:schemeClr val="tx1"/>
+        </a:solidFill>
+        <a:latin typeface="+mn-lt"/>
+        <a:ea typeface="+mn-ea"/>
+        <a:cs typeface="+mn-cs"/>
+      </a:defRPr>
+    </a:lvl5pPr>
+    <a:lvl6pPr marL="2286000" algn="l" defTabSz="914400" rtl="0" eaLnBrk="1" latinLnBrk="0" hangingPunct="1">
+      <a:defRPr sz="1200" kern="1200">
+        <a:solidFill>
+          <a:schemeClr val="tx1"/>
+        </a:solidFill>
+        <a:latin typeface="+mn-lt"/>
+        <a:ea typeface="+mn-ea"/>
+        <a:cs typeface="+mn-cs"/>
+      </a:defRPr>
+    </a:lvl6pPr>
+    <a:lvl7pPr marL="2743200" algn="l" defTabSz="914400" rtl="0" eaLnBrk="1" latinLnBrk="0" hangingPunct="1">
+      <a:defRPr sz="1200" kern="1200">
+        <a:solidFill>
+          <a:schemeClr val="tx1"/>
+        </a:solidFill>
+        <a:latin typeface="+mn-lt"/>
+        <a:ea typeface="+mn-ea"/>
+        <a:cs typeface="+mn-cs"/>
+      </a:defRPr>
+    </a:lvl7pPr>
+    <a:lvl8pPr marL="3200400" algn="l" defTabSz="914400" rtl="0" eaLnBrk="1" latinLnBrk="0" hangingPunct="1">
+      <a:defRPr sz="1200" kern="1200">
+        <a:solidFill>
+          <a:schemeClr val="tx1"/>
+        </a:solidFill>
+        <a:latin typeface="+mn-lt"/>
+        <a:ea typeface="+mn-ea"/>
+        <a:cs typeface="+mn-cs"/>
+      </a:defRPr>
+    </a:lvl8pPr>
+    <a:lvl9pPr marL="3657600" algn="l" defTabSz="914400" rtl="0" eaLnBrk="1" latinLnBrk="0" hangingPunct="1">
+      <a:defRPr sz="1200" kern="1200">
+        <a:solidFill>
+          <a:schemeClr val="tx1"/>
+        </a:solidFill>
+        <a:latin typeface="+mn-lt"/>
+        <a:ea typeface="+mn-ea"/>
+        <a:cs typeface="+mn-cs"/>
+      </a:defRPr>
+    </a:lvl9pPr>
+  </p:notesStyle>
+</p:notesMaster>
 </file>
 
 <file path=ppt/slideLayouts/slideLayout1.xml><?xml version="1.0" encoding="utf-8"?>
@@ -7115,6 +7469,508 @@
     <p:extLst>
       <p:ext uri="{BB962C8B-B14F-4D97-AF65-F5344CB8AC3E}">
         <p14:creationId xmlns:p14="http://schemas.microsoft.com/office/powerpoint/2010/main" val="3616202045"/>
+      </p:ext>
+    </p:extLst>
+  </p:cSld>
+  <p:clrMapOvr>
+    <a:masterClrMapping/>
+  </p:clrMapOvr>
+</p:sld>
+</file>
+
+<file path=ppt/slides/slide4.xml><?xml version="1.0" encoding="utf-8"?>
+<p:sld xmlns:a="http://schemas.openxmlformats.org/drawingml/2006/main" xmlns:r="http://schemas.openxmlformats.org/officeDocument/2006/relationships" xmlns:p="http://schemas.openxmlformats.org/presentationml/2006/main">
+  <p:cSld>
+    <p:spTree>
+      <p:nvGrpSpPr>
+        <p:cNvPr id="1" name=""/>
+        <p:cNvGrpSpPr/>
+        <p:nvPr/>
+      </p:nvGrpSpPr>
+      <p:grpSpPr>
+        <a:xfrm>
+          <a:off x="0" y="0"/>
+          <a:ext cx="0" cy="0"/>
+          <a:chOff x="0" y="0"/>
+          <a:chExt cx="0" cy="0"/>
+        </a:xfrm>
+      </p:grpSpPr>
+      <p:pic>
+        <p:nvPicPr>
+          <p:cNvPr id="5" name="Picture 4" descr="A diagram of a system&#10;&#10;AI-generated content may be incorrect.">
+            <a:extLst>
+              <a:ext uri="{FF2B5EF4-FFF2-40B4-BE49-F238E27FC236}">
+                <a16:creationId xmlns:a16="http://schemas.microsoft.com/office/drawing/2014/main" id="{223CD167-C71B-E672-0FAC-E38951BE3634}"/>
+              </a:ext>
+            </a:extLst>
+          </p:cNvPr>
+          <p:cNvPicPr>
+            <a:picLocks noChangeAspect="1"/>
+          </p:cNvPicPr>
+          <p:nvPr/>
+        </p:nvPicPr>
+        <p:blipFill>
+          <a:blip r:embed="rId2">
+            <a:extLst>
+              <a:ext uri="{28A0092B-C50C-407E-A947-70E740481C1C}">
+                <a14:useLocalDpi xmlns:a14="http://schemas.microsoft.com/office/drawing/2010/main" val="0"/>
+              </a:ext>
+            </a:extLst>
+          </a:blip>
+          <a:stretch>
+            <a:fillRect/>
+          </a:stretch>
+        </p:blipFill>
+        <p:spPr>
+          <a:xfrm>
+            <a:off x="269147" y="0"/>
+            <a:ext cx="11653706" cy="6858000"/>
+          </a:xfrm>
+          <a:prstGeom prst="rect">
+            <a:avLst/>
+          </a:prstGeom>
+        </p:spPr>
+      </p:pic>
+      <p:sp>
+        <p:nvSpPr>
+          <p:cNvPr id="11" name="Freeform: Shape 10">
+            <a:extLst>
+              <a:ext uri="{FF2B5EF4-FFF2-40B4-BE49-F238E27FC236}">
+                <a16:creationId xmlns:a16="http://schemas.microsoft.com/office/drawing/2014/main" id="{07B19FBC-B41E-D1AF-31DE-AFCFB573A586}"/>
+              </a:ext>
+            </a:extLst>
+          </p:cNvPr>
+          <p:cNvSpPr/>
+          <p:nvPr/>
+        </p:nvSpPr>
+        <p:spPr>
+          <a:xfrm>
+            <a:off x="408792" y="112955"/>
+            <a:ext cx="11306286" cy="6632090"/>
+          </a:xfrm>
+          <a:custGeom>
+            <a:avLst/>
+            <a:gdLst>
+              <a:gd name="connsiteX0" fmla="*/ 2474257 w 11306286"/>
+              <a:gd name="connsiteY0" fmla="*/ 3953436 h 6632090"/>
+              <a:gd name="connsiteX1" fmla="*/ 2474257 w 11306286"/>
+              <a:gd name="connsiteY1" fmla="*/ 4717229 h 6632090"/>
+              <a:gd name="connsiteX2" fmla="*/ 7013984 w 11306286"/>
+              <a:gd name="connsiteY2" fmla="*/ 4717229 h 6632090"/>
+              <a:gd name="connsiteX3" fmla="*/ 7013984 w 11306286"/>
+              <a:gd name="connsiteY3" fmla="*/ 3953436 h 6632090"/>
+              <a:gd name="connsiteX4" fmla="*/ 2474257 w 11306286"/>
+              <a:gd name="connsiteY4" fmla="*/ 2874981 h 6632090"/>
+              <a:gd name="connsiteX5" fmla="*/ 2474257 w 11306286"/>
+              <a:gd name="connsiteY5" fmla="*/ 3757108 h 6632090"/>
+              <a:gd name="connsiteX6" fmla="*/ 3668356 w 11306286"/>
+              <a:gd name="connsiteY6" fmla="*/ 3757108 h 6632090"/>
+              <a:gd name="connsiteX7" fmla="*/ 3668356 w 11306286"/>
+              <a:gd name="connsiteY7" fmla="*/ 2874981 h 6632090"/>
+              <a:gd name="connsiteX8" fmla="*/ 5875465 w 11306286"/>
+              <a:gd name="connsiteY8" fmla="*/ 82476 h 6632090"/>
+              <a:gd name="connsiteX9" fmla="*/ 5875465 w 11306286"/>
+              <a:gd name="connsiteY9" fmla="*/ 1925620 h 6632090"/>
+              <a:gd name="connsiteX10" fmla="*/ 8638389 w 11306286"/>
+              <a:gd name="connsiteY10" fmla="*/ 1925620 h 6632090"/>
+              <a:gd name="connsiteX11" fmla="*/ 8638389 w 11306286"/>
+              <a:gd name="connsiteY11" fmla="*/ 82476 h 6632090"/>
+              <a:gd name="connsiteX12" fmla="*/ 8807511 w 11306286"/>
+              <a:gd name="connsiteY12" fmla="*/ 82476 h 6632090"/>
+              <a:gd name="connsiteX13" fmla="*/ 8807511 w 11306286"/>
+              <a:gd name="connsiteY13" fmla="*/ 4803290 h 6632090"/>
+              <a:gd name="connsiteX14" fmla="*/ 11198709 w 11306286"/>
+              <a:gd name="connsiteY14" fmla="*/ 4803290 h 6632090"/>
+              <a:gd name="connsiteX15" fmla="*/ 11198709 w 11306286"/>
+              <a:gd name="connsiteY15" fmla="*/ 82476 h 6632090"/>
+              <a:gd name="connsiteX16" fmla="*/ 0 w 11306286"/>
+              <a:gd name="connsiteY16" fmla="*/ 0 h 6632090"/>
+              <a:gd name="connsiteX17" fmla="*/ 11306286 w 11306286"/>
+              <a:gd name="connsiteY17" fmla="*/ 0 h 6632090"/>
+              <a:gd name="connsiteX18" fmla="*/ 11306286 w 11306286"/>
+              <a:gd name="connsiteY18" fmla="*/ 6632090 h 6632090"/>
+              <a:gd name="connsiteX19" fmla="*/ 0 w 11306286"/>
+              <a:gd name="connsiteY19" fmla="*/ 6632090 h 6632090"/>
+            </a:gdLst>
+            <a:ahLst/>
+            <a:cxnLst>
+              <a:cxn ang="0">
+                <a:pos x="connsiteX0" y="connsiteY0"/>
+              </a:cxn>
+              <a:cxn ang="0">
+                <a:pos x="connsiteX1" y="connsiteY1"/>
+              </a:cxn>
+              <a:cxn ang="0">
+                <a:pos x="connsiteX2" y="connsiteY2"/>
+              </a:cxn>
+              <a:cxn ang="0">
+                <a:pos x="connsiteX3" y="connsiteY3"/>
+              </a:cxn>
+              <a:cxn ang="0">
+                <a:pos x="connsiteX4" y="connsiteY4"/>
+              </a:cxn>
+              <a:cxn ang="0">
+                <a:pos x="connsiteX5" y="connsiteY5"/>
+              </a:cxn>
+              <a:cxn ang="0">
+                <a:pos x="connsiteX6" y="connsiteY6"/>
+              </a:cxn>
+              <a:cxn ang="0">
+                <a:pos x="connsiteX7" y="connsiteY7"/>
+              </a:cxn>
+              <a:cxn ang="0">
+                <a:pos x="connsiteX8" y="connsiteY8"/>
+              </a:cxn>
+              <a:cxn ang="0">
+                <a:pos x="connsiteX9" y="connsiteY9"/>
+              </a:cxn>
+              <a:cxn ang="0">
+                <a:pos x="connsiteX10" y="connsiteY10"/>
+              </a:cxn>
+              <a:cxn ang="0">
+                <a:pos x="connsiteX11" y="connsiteY11"/>
+              </a:cxn>
+              <a:cxn ang="0">
+                <a:pos x="connsiteX12" y="connsiteY12"/>
+              </a:cxn>
+              <a:cxn ang="0">
+                <a:pos x="connsiteX13" y="connsiteY13"/>
+              </a:cxn>
+              <a:cxn ang="0">
+                <a:pos x="connsiteX14" y="connsiteY14"/>
+              </a:cxn>
+              <a:cxn ang="0">
+                <a:pos x="connsiteX15" y="connsiteY15"/>
+              </a:cxn>
+              <a:cxn ang="0">
+                <a:pos x="connsiteX16" y="connsiteY16"/>
+              </a:cxn>
+              <a:cxn ang="0">
+                <a:pos x="connsiteX17" y="connsiteY17"/>
+              </a:cxn>
+              <a:cxn ang="0">
+                <a:pos x="connsiteX18" y="connsiteY18"/>
+              </a:cxn>
+              <a:cxn ang="0">
+                <a:pos x="connsiteX19" y="connsiteY19"/>
+              </a:cxn>
+            </a:cxnLst>
+            <a:rect l="l" t="t" r="r" b="b"/>
+            <a:pathLst>
+              <a:path w="11306286" h="6632090">
+                <a:moveTo>
+                  <a:pt x="2474257" y="3953436"/>
+                </a:moveTo>
+                <a:lnTo>
+                  <a:pt x="2474257" y="4717229"/>
+                </a:lnTo>
+                <a:lnTo>
+                  <a:pt x="7013984" y="4717229"/>
+                </a:lnTo>
+                <a:lnTo>
+                  <a:pt x="7013984" y="3953436"/>
+                </a:lnTo>
+                <a:close/>
+                <a:moveTo>
+                  <a:pt x="2474257" y="2874981"/>
+                </a:moveTo>
+                <a:lnTo>
+                  <a:pt x="2474257" y="3757108"/>
+                </a:lnTo>
+                <a:lnTo>
+                  <a:pt x="3668356" y="3757108"/>
+                </a:lnTo>
+                <a:lnTo>
+                  <a:pt x="3668356" y="2874981"/>
+                </a:lnTo>
+                <a:close/>
+                <a:moveTo>
+                  <a:pt x="5875465" y="82476"/>
+                </a:moveTo>
+                <a:lnTo>
+                  <a:pt x="5875465" y="1925620"/>
+                </a:lnTo>
+                <a:lnTo>
+                  <a:pt x="8638389" y="1925620"/>
+                </a:lnTo>
+                <a:lnTo>
+                  <a:pt x="8638389" y="82476"/>
+                </a:lnTo>
+                <a:close/>
+                <a:moveTo>
+                  <a:pt x="8807511" y="82476"/>
+                </a:moveTo>
+                <a:lnTo>
+                  <a:pt x="8807511" y="4803290"/>
+                </a:lnTo>
+                <a:lnTo>
+                  <a:pt x="11198709" y="4803290"/>
+                </a:lnTo>
+                <a:lnTo>
+                  <a:pt x="11198709" y="82476"/>
+                </a:lnTo>
+                <a:close/>
+                <a:moveTo>
+                  <a:pt x="0" y="0"/>
+                </a:moveTo>
+                <a:lnTo>
+                  <a:pt x="11306286" y="0"/>
+                </a:lnTo>
+                <a:lnTo>
+                  <a:pt x="11306286" y="6632090"/>
+                </a:lnTo>
+                <a:lnTo>
+                  <a:pt x="0" y="6632090"/>
+                </a:lnTo>
+                <a:close/>
+              </a:path>
+            </a:pathLst>
+          </a:custGeom>
+          <a:solidFill>
+            <a:schemeClr val="dk1">
+              <a:alpha val="65000"/>
+            </a:schemeClr>
+          </a:solidFill>
+        </p:spPr>
+        <p:style>
+          <a:lnRef idx="2">
+            <a:schemeClr val="dk1">
+              <a:shade val="15000"/>
+            </a:schemeClr>
+          </a:lnRef>
+          <a:fillRef idx="1">
+            <a:schemeClr val="dk1"/>
+          </a:fillRef>
+          <a:effectRef idx="0">
+            <a:schemeClr val="dk1"/>
+          </a:effectRef>
+          <a:fontRef idx="minor">
+            <a:schemeClr val="lt1"/>
+          </a:fontRef>
+        </p:style>
+        <p:txBody>
+          <a:bodyPr wrap="square" rtlCol="0" anchor="ctr">
+            <a:noAutofit/>
+          </a:bodyPr>
+          <a:lstStyle/>
+          <a:p>
+            <a:pPr algn="ctr"/>
+            <a:endParaRPr lang="en-SG" dirty="0"/>
+          </a:p>
+        </p:txBody>
+      </p:sp>
+      <p:sp>
+        <p:nvSpPr>
+          <p:cNvPr id="12" name="Rectangle 11">
+            <a:extLst>
+              <a:ext uri="{FF2B5EF4-FFF2-40B4-BE49-F238E27FC236}">
+                <a16:creationId xmlns:a16="http://schemas.microsoft.com/office/drawing/2014/main" id="{9C11C103-B130-7ED8-806A-E4323AF77914}"/>
+              </a:ext>
+            </a:extLst>
+          </p:cNvPr>
+          <p:cNvSpPr/>
+          <p:nvPr/>
+        </p:nvSpPr>
+        <p:spPr>
+          <a:xfrm>
+            <a:off x="2871216" y="2990088"/>
+            <a:ext cx="1225296" cy="896112"/>
+          </a:xfrm>
+          <a:prstGeom prst="rect">
+            <a:avLst/>
+          </a:prstGeom>
+          <a:noFill/>
+          <a:ln w="28575">
+            <a:solidFill>
+              <a:srgbClr val="FF0000"/>
+            </a:solidFill>
+          </a:ln>
+        </p:spPr>
+        <p:style>
+          <a:lnRef idx="2">
+            <a:schemeClr val="accent1">
+              <a:shade val="15000"/>
+            </a:schemeClr>
+          </a:lnRef>
+          <a:fillRef idx="1">
+            <a:schemeClr val="accent1"/>
+          </a:fillRef>
+          <a:effectRef idx="0">
+            <a:schemeClr val="accent1"/>
+          </a:effectRef>
+          <a:fontRef idx="minor">
+            <a:schemeClr val="lt1"/>
+          </a:fontRef>
+        </p:style>
+        <p:txBody>
+          <a:bodyPr rtlCol="0" anchor="ctr"/>
+          <a:lstStyle/>
+          <a:p>
+            <a:pPr algn="ctr"/>
+            <a:endParaRPr lang="en-SG"/>
+          </a:p>
+        </p:txBody>
+      </p:sp>
+      <p:sp>
+        <p:nvSpPr>
+          <p:cNvPr id="13" name="Rectangle 12">
+            <a:extLst>
+              <a:ext uri="{FF2B5EF4-FFF2-40B4-BE49-F238E27FC236}">
+                <a16:creationId xmlns:a16="http://schemas.microsoft.com/office/drawing/2014/main" id="{92E3BF88-D8B6-B489-04BF-345DAEDF86CF}"/>
+              </a:ext>
+            </a:extLst>
+          </p:cNvPr>
+          <p:cNvSpPr/>
+          <p:nvPr/>
+        </p:nvSpPr>
+        <p:spPr>
+          <a:xfrm>
+            <a:off x="2852928" y="4069080"/>
+            <a:ext cx="4581144" cy="676656"/>
+          </a:xfrm>
+          <a:prstGeom prst="rect">
+            <a:avLst/>
+          </a:prstGeom>
+          <a:noFill/>
+          <a:ln w="28575">
+            <a:solidFill>
+              <a:srgbClr val="FF0000"/>
+            </a:solidFill>
+          </a:ln>
+        </p:spPr>
+        <p:style>
+          <a:lnRef idx="2">
+            <a:schemeClr val="accent1">
+              <a:shade val="15000"/>
+            </a:schemeClr>
+          </a:lnRef>
+          <a:fillRef idx="1">
+            <a:schemeClr val="accent1"/>
+          </a:fillRef>
+          <a:effectRef idx="0">
+            <a:schemeClr val="accent1"/>
+          </a:effectRef>
+          <a:fontRef idx="minor">
+            <a:schemeClr val="lt1"/>
+          </a:fontRef>
+        </p:style>
+        <p:txBody>
+          <a:bodyPr rtlCol="0" anchor="ctr"/>
+          <a:lstStyle/>
+          <a:p>
+            <a:pPr algn="ctr"/>
+            <a:endParaRPr lang="en-SG"/>
+          </a:p>
+        </p:txBody>
+      </p:sp>
+      <p:sp>
+        <p:nvSpPr>
+          <p:cNvPr id="14" name="Rectangle 13">
+            <a:extLst>
+              <a:ext uri="{FF2B5EF4-FFF2-40B4-BE49-F238E27FC236}">
+                <a16:creationId xmlns:a16="http://schemas.microsoft.com/office/drawing/2014/main" id="{21FB4C18-B237-E8EB-4230-DB3297C70158}"/>
+              </a:ext>
+            </a:extLst>
+          </p:cNvPr>
+          <p:cNvSpPr/>
+          <p:nvPr/>
+        </p:nvSpPr>
+        <p:spPr>
+          <a:xfrm>
+            <a:off x="6278880" y="234695"/>
+            <a:ext cx="2755392" cy="1835075"/>
+          </a:xfrm>
+          <a:prstGeom prst="rect">
+            <a:avLst/>
+          </a:prstGeom>
+          <a:noFill/>
+          <a:ln w="28575">
+            <a:solidFill>
+              <a:srgbClr val="FF0000"/>
+            </a:solidFill>
+          </a:ln>
+        </p:spPr>
+        <p:style>
+          <a:lnRef idx="2">
+            <a:schemeClr val="accent1">
+              <a:shade val="15000"/>
+            </a:schemeClr>
+          </a:lnRef>
+          <a:fillRef idx="1">
+            <a:schemeClr val="accent1"/>
+          </a:fillRef>
+          <a:effectRef idx="0">
+            <a:schemeClr val="accent1"/>
+          </a:effectRef>
+          <a:fontRef idx="minor">
+            <a:schemeClr val="lt1"/>
+          </a:fontRef>
+        </p:style>
+        <p:txBody>
+          <a:bodyPr rtlCol="0" anchor="ctr"/>
+          <a:lstStyle/>
+          <a:p>
+            <a:pPr algn="ctr"/>
+            <a:endParaRPr lang="en-SG"/>
+          </a:p>
+        </p:txBody>
+      </p:sp>
+      <p:sp>
+        <p:nvSpPr>
+          <p:cNvPr id="15" name="Rectangle 14">
+            <a:extLst>
+              <a:ext uri="{FF2B5EF4-FFF2-40B4-BE49-F238E27FC236}">
+                <a16:creationId xmlns:a16="http://schemas.microsoft.com/office/drawing/2014/main" id="{E35F62BF-5258-671A-6443-8CC36C72F14B}"/>
+              </a:ext>
+            </a:extLst>
+          </p:cNvPr>
+          <p:cNvSpPr/>
+          <p:nvPr/>
+        </p:nvSpPr>
+        <p:spPr>
+          <a:xfrm>
+            <a:off x="9173916" y="234694"/>
+            <a:ext cx="2457251" cy="4693921"/>
+          </a:xfrm>
+          <a:prstGeom prst="rect">
+            <a:avLst/>
+          </a:prstGeom>
+          <a:noFill/>
+          <a:ln w="28575">
+            <a:solidFill>
+              <a:srgbClr val="FF0000"/>
+            </a:solidFill>
+          </a:ln>
+        </p:spPr>
+        <p:style>
+          <a:lnRef idx="2">
+            <a:schemeClr val="accent1">
+              <a:shade val="15000"/>
+            </a:schemeClr>
+          </a:lnRef>
+          <a:fillRef idx="1">
+            <a:schemeClr val="accent1"/>
+          </a:fillRef>
+          <a:effectRef idx="0">
+            <a:schemeClr val="accent1"/>
+          </a:effectRef>
+          <a:fontRef idx="minor">
+            <a:schemeClr val="lt1"/>
+          </a:fontRef>
+        </p:style>
+        <p:txBody>
+          <a:bodyPr rtlCol="0" anchor="ctr"/>
+          <a:lstStyle/>
+          <a:p>
+            <a:pPr algn="ctr"/>
+            <a:endParaRPr lang="en-SG"/>
+          </a:p>
+        </p:txBody>
+      </p:sp>
+    </p:spTree>
+    <p:extLst>
+      <p:ext uri="{BB962C8B-B14F-4D97-AF65-F5344CB8AC3E}">
+        <p14:creationId xmlns:p14="http://schemas.microsoft.com/office/powerpoint/2010/main" val="1454234563"/>
       </p:ext>
     </p:extLst>
   </p:cSld>
@@ -7437,4 +8293,319 @@
     </a:ext>
   </a:extLst>
 </a:theme>
+</file>
+
+<file path=ppt/theme/theme2.xml><?xml version="1.0" encoding="utf-8"?>
+<a:theme xmlns:a="http://schemas.openxmlformats.org/drawingml/2006/main" name="Office Theme">
+  <a:themeElements>
+    <a:clrScheme name="Office">
+      <a:dk1>
+        <a:sysClr val="windowText" lastClr="000000"/>
+      </a:dk1>
+      <a:lt1>
+        <a:sysClr val="window" lastClr="FFFFFF"/>
+      </a:lt1>
+      <a:dk2>
+        <a:srgbClr val="0E2841"/>
+      </a:dk2>
+      <a:lt2>
+        <a:srgbClr val="E8E8E8"/>
+      </a:lt2>
+      <a:accent1>
+        <a:srgbClr val="156082"/>
+      </a:accent1>
+      <a:accent2>
+        <a:srgbClr val="E97132"/>
+      </a:accent2>
+      <a:accent3>
+        <a:srgbClr val="196B24"/>
+      </a:accent3>
+      <a:accent4>
+        <a:srgbClr val="0F9ED5"/>
+      </a:accent4>
+      <a:accent5>
+        <a:srgbClr val="A02B93"/>
+      </a:accent5>
+      <a:accent6>
+        <a:srgbClr val="4EA72E"/>
+      </a:accent6>
+      <a:hlink>
+        <a:srgbClr val="467886"/>
+      </a:hlink>
+      <a:folHlink>
+        <a:srgbClr val="96607D"/>
+      </a:folHlink>
+    </a:clrScheme>
+    <a:fontScheme name="Office">
+      <a:majorFont>
+        <a:latin typeface="Aptos Display" panose="02110004020202020204"/>
+        <a:ea typeface=""/>
+        <a:cs typeface=""/>
+        <a:font script="Jpan" typeface="游ゴシック Light"/>
+        <a:font script="Hang" typeface="맑은 고딕"/>
+        <a:font script="Hans" typeface="等线 Light"/>
+        <a:font script="Hant" typeface="新細明體"/>
+        <a:font script="Arab" typeface="Times New Roman"/>
+        <a:font script="Hebr" typeface="Times New Roman"/>
+        <a:font script="Thai" typeface="Angsana New"/>
+        <a:font script="Ethi" typeface="Nyala"/>
+        <a:font script="Beng" typeface="Vrinda"/>
+        <a:font script="Gujr" typeface="Shruti"/>
+        <a:font script="Khmr" typeface="MoolBoran"/>
+        <a:font script="Knda" typeface="Tunga"/>
+        <a:font script="Guru" typeface="Raavi"/>
+        <a:font script="Cans" typeface="Euphemia"/>
+        <a:font script="Cher" typeface="Plantagenet Cherokee"/>
+        <a:font script="Yiii" typeface="Microsoft Yi Baiti"/>
+        <a:font script="Tibt" typeface="Microsoft Himalaya"/>
+        <a:font script="Thaa" typeface="MV Boli"/>
+        <a:font script="Deva" typeface="Mangal"/>
+        <a:font script="Telu" typeface="Gautami"/>
+        <a:font script="Taml" typeface="Latha"/>
+        <a:font script="Syrc" typeface="Estrangelo Edessa"/>
+        <a:font script="Orya" typeface="Kalinga"/>
+        <a:font script="Mlym" typeface="Kartika"/>
+        <a:font script="Laoo" typeface="DokChampa"/>
+        <a:font script="Sinh" typeface="Iskoola Pota"/>
+        <a:font script="Mong" typeface="Mongolian Baiti"/>
+        <a:font script="Viet" typeface="Times New Roman"/>
+        <a:font script="Uigh" typeface="Microsoft Uighur"/>
+        <a:font script="Geor" typeface="Sylfaen"/>
+        <a:font script="Armn" typeface="Arial"/>
+        <a:font script="Bugi" typeface="Leelawadee UI"/>
+        <a:font script="Bopo" typeface="Microsoft JhengHei"/>
+        <a:font script="Java" typeface="Javanese Text"/>
+        <a:font script="Lisu" typeface="Segoe UI"/>
+        <a:font script="Mymr" typeface="Myanmar Text"/>
+        <a:font script="Nkoo" typeface="Ebrima"/>
+        <a:font script="Olck" typeface="Nirmala UI"/>
+        <a:font script="Osma" typeface="Ebrima"/>
+        <a:font script="Phag" typeface="Phagspa"/>
+        <a:font script="Syrn" typeface="Estrangelo Edessa"/>
+        <a:font script="Syrj" typeface="Estrangelo Edessa"/>
+        <a:font script="Syre" typeface="Estrangelo Edessa"/>
+        <a:font script="Sora" typeface="Nirmala UI"/>
+        <a:font script="Tale" typeface="Microsoft Tai Le"/>
+        <a:font script="Talu" typeface="Microsoft New Tai Lue"/>
+        <a:font script="Tfng" typeface="Ebrima"/>
+      </a:majorFont>
+      <a:minorFont>
+        <a:latin typeface="Aptos" panose="02110004020202020204"/>
+        <a:ea typeface=""/>
+        <a:cs typeface=""/>
+        <a:font script="Jpan" typeface="游ゴシック"/>
+        <a:font script="Hang" typeface="맑은 고딕"/>
+        <a:font script="Hans" typeface="等线"/>
+        <a:font script="Hant" typeface="新細明體"/>
+        <a:font script="Arab" typeface="Arial"/>
+        <a:font script="Hebr" typeface="Arial"/>
+        <a:font script="Thai" typeface="Cordia New"/>
+        <a:font script="Ethi" typeface="Nyala"/>
+        <a:font script="Beng" typeface="Vrinda"/>
+        <a:font script="Gujr" typeface="Shruti"/>
+        <a:font script="Khmr" typeface="DaunPenh"/>
+        <a:font script="Knda" typeface="Tunga"/>
+        <a:font script="Guru" typeface="Raavi"/>
+        <a:font script="Cans" typeface="Euphemia"/>
+        <a:font script="Cher" typeface="Plantagenet Cherokee"/>
+        <a:font script="Yiii" typeface="Microsoft Yi Baiti"/>
+        <a:font script="Tibt" typeface="Microsoft Himalaya"/>
+        <a:font script="Thaa" typeface="MV Boli"/>
+        <a:font script="Deva" typeface="Mangal"/>
+        <a:font script="Telu" typeface="Gautami"/>
+        <a:font script="Taml" typeface="Latha"/>
+        <a:font script="Syrc" typeface="Estrangelo Edessa"/>
+        <a:font script="Orya" typeface="Kalinga"/>
+        <a:font script="Mlym" typeface="Kartika"/>
+        <a:font script="Laoo" typeface="DokChampa"/>
+        <a:font script="Sinh" typeface="Iskoola Pota"/>
+        <a:font script="Mong" typeface="Mongolian Baiti"/>
+        <a:font script="Viet" typeface="Arial"/>
+        <a:font script="Uigh" typeface="Microsoft Uighur"/>
+        <a:font script="Geor" typeface="Sylfaen"/>
+        <a:font script="Armn" typeface="Arial"/>
+        <a:font script="Bugi" typeface="Leelawadee UI"/>
+        <a:font script="Bopo" typeface="Microsoft JhengHei"/>
+        <a:font script="Java" typeface="Javanese Text"/>
+        <a:font script="Lisu" typeface="Segoe UI"/>
+        <a:font script="Mymr" typeface="Myanmar Text"/>
+        <a:font script="Nkoo" typeface="Ebrima"/>
+        <a:font script="Olck" typeface="Nirmala UI"/>
+        <a:font script="Osma" typeface="Ebrima"/>
+        <a:font script="Phag" typeface="Phagspa"/>
+        <a:font script="Syrn" typeface="Estrangelo Edessa"/>
+        <a:font script="Syrj" typeface="Estrangelo Edessa"/>
+        <a:font script="Syre" typeface="Estrangelo Edessa"/>
+        <a:font script="Sora" typeface="Nirmala UI"/>
+        <a:font script="Tale" typeface="Microsoft Tai Le"/>
+        <a:font script="Talu" typeface="Microsoft New Tai Lue"/>
+        <a:font script="Tfng" typeface="Ebrima"/>
+      </a:minorFont>
+    </a:fontScheme>
+    <a:fmtScheme name="Office">
+      <a:fillStyleLst>
+        <a:solidFill>
+          <a:schemeClr val="phClr"/>
+        </a:solidFill>
+        <a:gradFill rotWithShape="1">
+          <a:gsLst>
+            <a:gs pos="0">
+              <a:schemeClr val="phClr">
+                <a:lumMod val="110000"/>
+                <a:satMod val="105000"/>
+                <a:tint val="67000"/>
+              </a:schemeClr>
+            </a:gs>
+            <a:gs pos="50000">
+              <a:schemeClr val="phClr">
+                <a:lumMod val="105000"/>
+                <a:satMod val="103000"/>
+                <a:tint val="73000"/>
+              </a:schemeClr>
+            </a:gs>
+            <a:gs pos="100000">
+              <a:schemeClr val="phClr">
+                <a:lumMod val="105000"/>
+                <a:satMod val="109000"/>
+                <a:tint val="81000"/>
+              </a:schemeClr>
+            </a:gs>
+          </a:gsLst>
+          <a:lin ang="5400000" scaled="0"/>
+        </a:gradFill>
+        <a:gradFill rotWithShape="1">
+          <a:gsLst>
+            <a:gs pos="0">
+              <a:schemeClr val="phClr">
+                <a:satMod val="103000"/>
+                <a:lumMod val="102000"/>
+                <a:tint val="94000"/>
+              </a:schemeClr>
+            </a:gs>
+            <a:gs pos="50000">
+              <a:schemeClr val="phClr">
+                <a:satMod val="110000"/>
+                <a:lumMod val="100000"/>
+                <a:shade val="100000"/>
+              </a:schemeClr>
+            </a:gs>
+            <a:gs pos="100000">
+              <a:schemeClr val="phClr">
+                <a:lumMod val="99000"/>
+                <a:satMod val="120000"/>
+                <a:shade val="78000"/>
+              </a:schemeClr>
+            </a:gs>
+          </a:gsLst>
+          <a:lin ang="5400000" scaled="0"/>
+        </a:gradFill>
+      </a:fillStyleLst>
+      <a:lnStyleLst>
+        <a:ln w="12700" cap="flat" cmpd="sng" algn="ctr">
+          <a:solidFill>
+            <a:schemeClr val="phClr"/>
+          </a:solidFill>
+          <a:prstDash val="solid"/>
+          <a:miter lim="800000"/>
+        </a:ln>
+        <a:ln w="19050" cap="flat" cmpd="sng" algn="ctr">
+          <a:solidFill>
+            <a:schemeClr val="phClr"/>
+          </a:solidFill>
+          <a:prstDash val="solid"/>
+          <a:miter lim="800000"/>
+        </a:ln>
+        <a:ln w="25400" cap="flat" cmpd="sng" algn="ctr">
+          <a:solidFill>
+            <a:schemeClr val="phClr"/>
+          </a:solidFill>
+          <a:prstDash val="solid"/>
+          <a:miter lim="800000"/>
+        </a:ln>
+      </a:lnStyleLst>
+      <a:effectStyleLst>
+        <a:effectStyle>
+          <a:effectLst/>
+        </a:effectStyle>
+        <a:effectStyle>
+          <a:effectLst/>
+        </a:effectStyle>
+        <a:effectStyle>
+          <a:effectLst>
+            <a:outerShdw blurRad="57150" dist="19050" dir="5400000" algn="ctr" rotWithShape="0">
+              <a:srgbClr val="000000">
+                <a:alpha val="63000"/>
+              </a:srgbClr>
+            </a:outerShdw>
+          </a:effectLst>
+        </a:effectStyle>
+      </a:effectStyleLst>
+      <a:bgFillStyleLst>
+        <a:solidFill>
+          <a:schemeClr val="phClr"/>
+        </a:solidFill>
+        <a:solidFill>
+          <a:schemeClr val="phClr">
+            <a:tint val="95000"/>
+            <a:satMod val="170000"/>
+          </a:schemeClr>
+        </a:solidFill>
+        <a:gradFill rotWithShape="1">
+          <a:gsLst>
+            <a:gs pos="0">
+              <a:schemeClr val="phClr">
+                <a:tint val="93000"/>
+                <a:satMod val="150000"/>
+                <a:shade val="98000"/>
+                <a:lumMod val="102000"/>
+              </a:schemeClr>
+            </a:gs>
+            <a:gs pos="50000">
+              <a:schemeClr val="phClr">
+                <a:tint val="98000"/>
+                <a:satMod val="130000"/>
+                <a:shade val="90000"/>
+                <a:lumMod val="103000"/>
+              </a:schemeClr>
+            </a:gs>
+            <a:gs pos="100000">
+              <a:schemeClr val="phClr">
+                <a:shade val="63000"/>
+                <a:satMod val="120000"/>
+              </a:schemeClr>
+            </a:gs>
+          </a:gsLst>
+          <a:lin ang="5400000" scaled="0"/>
+        </a:gradFill>
+      </a:bgFillStyleLst>
+    </a:fmtScheme>
+  </a:themeElements>
+  <a:objectDefaults>
+    <a:lnDef>
+      <a:spPr/>
+      <a:bodyPr/>
+      <a:lstStyle/>
+      <a:style>
+        <a:lnRef idx="2">
+          <a:schemeClr val="accent1"/>
+        </a:lnRef>
+        <a:fillRef idx="0">
+          <a:schemeClr val="accent1"/>
+        </a:fillRef>
+        <a:effectRef idx="1">
+          <a:schemeClr val="accent1"/>
+        </a:effectRef>
+        <a:fontRef idx="minor">
+          <a:schemeClr val="tx1"/>
+        </a:fontRef>
+      </a:style>
+    </a:lnDef>
+  </a:objectDefaults>
+  <a:extraClrSchemeLst/>
+  <a:extLst>
+    <a:ext uri="{05A4C25C-085E-4340-85A3-A5531E510DB2}">
+      <thm15:themeFamily xmlns:thm15="http://schemas.microsoft.com/office/thememl/2012/main" name="Office Theme" id="{2E142A2C-CD16-42D6-873A-C26D2A0506FA}" vid="{1BDDFF52-6CD6-40A5-AB3C-68EB2F1E4D0A}"/>
+    </a:ext>
+  </a:extLst>
+</a:theme>
 </file>
</xml_diff>

<commit_message>
update the HMI connection section.
</commit_message>
<xml_diff>
--- a/OT_System_Attack_Case_Study/Railway_HQ_HMI/img/designDoc.pptx
+++ b/OT_System_Attack_Case_Study/Railway_HQ_HMI/img/designDoc.pptx
@@ -5,13 +5,14 @@
     <p:sldMasterId id="2147483648" r:id="rId1"/>
   </p:sldMasterIdLst>
   <p:notesMasterIdLst>
-    <p:notesMasterId r:id="rId6"/>
+    <p:notesMasterId r:id="rId7"/>
   </p:notesMasterIdLst>
   <p:sldIdLst>
     <p:sldId id="256" r:id="rId2"/>
     <p:sldId id="257" r:id="rId3"/>
     <p:sldId id="258" r:id="rId4"/>
     <p:sldId id="259" r:id="rId5"/>
+    <p:sldId id="260" r:id="rId6"/>
   </p:sldIdLst>
   <p:sldSz cx="12192000" cy="6858000"/>
   <p:notesSz cx="6858000" cy="9144000"/>
@@ -7971,6 +7972,1489 @@
     <p:extLst>
       <p:ext uri="{BB962C8B-B14F-4D97-AF65-F5344CB8AC3E}">
         <p14:creationId xmlns:p14="http://schemas.microsoft.com/office/powerpoint/2010/main" val="1454234563"/>
+      </p:ext>
+    </p:extLst>
+  </p:cSld>
+  <p:clrMapOvr>
+    <a:masterClrMapping/>
+  </p:clrMapOvr>
+</p:sld>
+</file>
+
+<file path=ppt/slides/slide5.xml><?xml version="1.0" encoding="utf-8"?>
+<p:sld xmlns:a="http://schemas.openxmlformats.org/drawingml/2006/main" xmlns:r="http://schemas.openxmlformats.org/officeDocument/2006/relationships" xmlns:p="http://schemas.openxmlformats.org/presentationml/2006/main">
+  <p:cSld>
+    <p:spTree>
+      <p:nvGrpSpPr>
+        <p:cNvPr id="1" name=""/>
+        <p:cNvGrpSpPr/>
+        <p:nvPr/>
+      </p:nvGrpSpPr>
+      <p:grpSpPr>
+        <a:xfrm>
+          <a:off x="0" y="0"/>
+          <a:ext cx="0" cy="0"/>
+          <a:chOff x="0" y="0"/>
+          <a:chExt cx="0" cy="0"/>
+        </a:xfrm>
+      </p:grpSpPr>
+      <p:sp>
+        <p:nvSpPr>
+          <p:cNvPr id="56" name="Rectangle 55">
+            <a:extLst>
+              <a:ext uri="{FF2B5EF4-FFF2-40B4-BE49-F238E27FC236}">
+                <a16:creationId xmlns:a16="http://schemas.microsoft.com/office/drawing/2014/main" id="{1EAF0185-6273-33AC-87F1-0B329D41533A}"/>
+              </a:ext>
+            </a:extLst>
+          </p:cNvPr>
+          <p:cNvSpPr/>
+          <p:nvPr/>
+        </p:nvSpPr>
+        <p:spPr>
+          <a:xfrm>
+            <a:off x="4469144" y="838864"/>
+            <a:ext cx="7573333" cy="5524501"/>
+          </a:xfrm>
+          <a:prstGeom prst="rect">
+            <a:avLst/>
+          </a:prstGeom>
+          <a:solidFill>
+            <a:schemeClr val="accent4">
+              <a:lumMod val="20000"/>
+              <a:lumOff val="80000"/>
+            </a:schemeClr>
+          </a:solidFill>
+          <a:ln w="12700"/>
+        </p:spPr>
+        <p:style>
+          <a:lnRef idx="2">
+            <a:schemeClr val="accent1">
+              <a:shade val="15000"/>
+            </a:schemeClr>
+          </a:lnRef>
+          <a:fillRef idx="1">
+            <a:schemeClr val="accent1"/>
+          </a:fillRef>
+          <a:effectRef idx="0">
+            <a:schemeClr val="accent1"/>
+          </a:effectRef>
+          <a:fontRef idx="minor">
+            <a:schemeClr val="lt1"/>
+          </a:fontRef>
+        </p:style>
+        <p:txBody>
+          <a:bodyPr rtlCol="0" anchor="ctr"/>
+          <a:lstStyle/>
+          <a:p>
+            <a:pPr algn="ctr"/>
+            <a:endParaRPr lang="en-SG" dirty="0"/>
+          </a:p>
+        </p:txBody>
+      </p:sp>
+      <p:sp>
+        <p:nvSpPr>
+          <p:cNvPr id="55" name="Rectangle 54">
+            <a:extLst>
+              <a:ext uri="{FF2B5EF4-FFF2-40B4-BE49-F238E27FC236}">
+                <a16:creationId xmlns:a16="http://schemas.microsoft.com/office/drawing/2014/main" id="{B32BFC99-8A6D-7C79-9B95-69986A1516C5}"/>
+              </a:ext>
+            </a:extLst>
+          </p:cNvPr>
+          <p:cNvSpPr/>
+          <p:nvPr/>
+        </p:nvSpPr>
+        <p:spPr>
+          <a:xfrm>
+            <a:off x="317202" y="857915"/>
+            <a:ext cx="3943227" cy="5501232"/>
+          </a:xfrm>
+          <a:prstGeom prst="rect">
+            <a:avLst/>
+          </a:prstGeom>
+          <a:solidFill>
+            <a:schemeClr val="accent6">
+              <a:lumMod val="20000"/>
+              <a:lumOff val="80000"/>
+            </a:schemeClr>
+          </a:solidFill>
+          <a:ln w="12700"/>
+        </p:spPr>
+        <p:style>
+          <a:lnRef idx="2">
+            <a:schemeClr val="accent1">
+              <a:shade val="15000"/>
+            </a:schemeClr>
+          </a:lnRef>
+          <a:fillRef idx="1">
+            <a:schemeClr val="accent1"/>
+          </a:fillRef>
+          <a:effectRef idx="0">
+            <a:schemeClr val="accent1"/>
+          </a:effectRef>
+          <a:fontRef idx="minor">
+            <a:schemeClr val="lt1"/>
+          </a:fontRef>
+        </p:style>
+        <p:txBody>
+          <a:bodyPr rtlCol="0" anchor="ctr"/>
+          <a:lstStyle/>
+          <a:p>
+            <a:pPr algn="ctr"/>
+            <a:endParaRPr lang="en-SG" dirty="0"/>
+          </a:p>
+        </p:txBody>
+      </p:sp>
+      <p:pic>
+        <p:nvPicPr>
+          <p:cNvPr id="6" name="Picture 5">
+            <a:extLst>
+              <a:ext uri="{FF2B5EF4-FFF2-40B4-BE49-F238E27FC236}">
+                <a16:creationId xmlns:a16="http://schemas.microsoft.com/office/drawing/2014/main" id="{021E2CC0-636B-2B99-6556-DBC3CA8C1584}"/>
+              </a:ext>
+            </a:extLst>
+          </p:cNvPr>
+          <p:cNvPicPr>
+            <a:picLocks noChangeAspect="1"/>
+          </p:cNvPicPr>
+          <p:nvPr/>
+        </p:nvPicPr>
+        <p:blipFill>
+          <a:blip r:embed="rId2"/>
+          <a:stretch>
+            <a:fillRect/>
+          </a:stretch>
+        </p:blipFill>
+        <p:spPr>
+          <a:xfrm>
+            <a:off x="6486749" y="1219863"/>
+            <a:ext cx="5048923" cy="2704780"/>
+          </a:xfrm>
+          <a:prstGeom prst="rect">
+            <a:avLst/>
+          </a:prstGeom>
+          <a:ln w="19050">
+            <a:solidFill>
+              <a:srgbClr val="6458BC"/>
+            </a:solidFill>
+          </a:ln>
+        </p:spPr>
+      </p:pic>
+      <p:pic>
+        <p:nvPicPr>
+          <p:cNvPr id="8" name="Picture 7">
+            <a:extLst>
+              <a:ext uri="{FF2B5EF4-FFF2-40B4-BE49-F238E27FC236}">
+                <a16:creationId xmlns:a16="http://schemas.microsoft.com/office/drawing/2014/main" id="{5133879C-F2CB-4402-AF42-C90C0399C86C}"/>
+              </a:ext>
+            </a:extLst>
+          </p:cNvPr>
+          <p:cNvPicPr>
+            <a:picLocks noChangeAspect="1"/>
+          </p:cNvPicPr>
+          <p:nvPr/>
+        </p:nvPicPr>
+        <p:blipFill>
+          <a:blip r:embed="rId3"/>
+          <a:stretch>
+            <a:fillRect/>
+          </a:stretch>
+        </p:blipFill>
+        <p:spPr>
+          <a:xfrm>
+            <a:off x="458057" y="3673353"/>
+            <a:ext cx="3742436" cy="2476075"/>
+          </a:xfrm>
+          <a:prstGeom prst="rect">
+            <a:avLst/>
+          </a:prstGeom>
+        </p:spPr>
+      </p:pic>
+      <p:pic>
+        <p:nvPicPr>
+          <p:cNvPr id="9" name="Picture 8" descr="A screenshot of a computer&#10;&#10;Description automatically generated">
+            <a:extLst>
+              <a:ext uri="{FF2B5EF4-FFF2-40B4-BE49-F238E27FC236}">
+                <a16:creationId xmlns:a16="http://schemas.microsoft.com/office/drawing/2014/main" id="{D98790D9-B52C-180D-31EB-A8667984E2F9}"/>
+              </a:ext>
+            </a:extLst>
+          </p:cNvPr>
+          <p:cNvPicPr>
+            <a:picLocks noChangeAspect="1"/>
+          </p:cNvPicPr>
+          <p:nvPr/>
+        </p:nvPicPr>
+        <p:blipFill>
+          <a:blip r:embed="rId4">
+            <a:extLst>
+              <a:ext uri="{28A0092B-C50C-407E-A947-70E740481C1C}">
+                <a14:useLocalDpi xmlns:a14="http://schemas.microsoft.com/office/drawing/2010/main" val="0"/>
+              </a:ext>
+            </a:extLst>
+          </a:blip>
+          <a:stretch>
+            <a:fillRect/>
+          </a:stretch>
+        </p:blipFill>
+        <p:spPr>
+          <a:xfrm>
+            <a:off x="7050622" y="4498175"/>
+            <a:ext cx="2351731" cy="1347044"/>
+          </a:xfrm>
+          <a:prstGeom prst="rect">
+            <a:avLst/>
+          </a:prstGeom>
+          <a:ln w="9525">
+            <a:solidFill>
+              <a:srgbClr val="D67A3B"/>
+            </a:solidFill>
+          </a:ln>
+        </p:spPr>
+      </p:pic>
+      <p:pic>
+        <p:nvPicPr>
+          <p:cNvPr id="10" name="Picture 9" descr="A screenshot of a computer&#10;&#10;Description automatically generated">
+            <a:extLst>
+              <a:ext uri="{FF2B5EF4-FFF2-40B4-BE49-F238E27FC236}">
+                <a16:creationId xmlns:a16="http://schemas.microsoft.com/office/drawing/2014/main" id="{AF46491A-65BA-D2C4-8402-03CD6C341A64}"/>
+              </a:ext>
+            </a:extLst>
+          </p:cNvPr>
+          <p:cNvPicPr>
+            <a:picLocks noChangeAspect="1"/>
+          </p:cNvPicPr>
+          <p:nvPr/>
+        </p:nvPicPr>
+        <p:blipFill>
+          <a:blip r:embed="rId5">
+            <a:extLst>
+              <a:ext uri="{28A0092B-C50C-407E-A947-70E740481C1C}">
+                <a14:useLocalDpi xmlns:a14="http://schemas.microsoft.com/office/drawing/2010/main" val="0"/>
+              </a:ext>
+            </a:extLst>
+          </a:blip>
+          <a:stretch>
+            <a:fillRect/>
+          </a:stretch>
+        </p:blipFill>
+        <p:spPr>
+          <a:xfrm>
+            <a:off x="9576201" y="4488650"/>
+            <a:ext cx="2348479" cy="1347044"/>
+          </a:xfrm>
+          <a:prstGeom prst="rect">
+            <a:avLst/>
+          </a:prstGeom>
+          <a:ln>
+            <a:solidFill>
+              <a:srgbClr val="D67A3B"/>
+            </a:solidFill>
+          </a:ln>
+        </p:spPr>
+      </p:pic>
+      <p:pic>
+        <p:nvPicPr>
+          <p:cNvPr id="11" name="Picture 10">
+            <a:extLst>
+              <a:ext uri="{FF2B5EF4-FFF2-40B4-BE49-F238E27FC236}">
+                <a16:creationId xmlns:a16="http://schemas.microsoft.com/office/drawing/2014/main" id="{C71CF54A-26C4-9D1B-7211-8B1439974081}"/>
+              </a:ext>
+            </a:extLst>
+          </p:cNvPr>
+          <p:cNvPicPr>
+            <a:picLocks noChangeAspect="1"/>
+          </p:cNvPicPr>
+          <p:nvPr/>
+        </p:nvPicPr>
+        <p:blipFill>
+          <a:blip r:embed="rId6"/>
+          <a:stretch>
+            <a:fillRect/>
+          </a:stretch>
+        </p:blipFill>
+        <p:spPr>
+          <a:xfrm>
+            <a:off x="4527280" y="4515482"/>
+            <a:ext cx="2349494" cy="1347044"/>
+          </a:xfrm>
+          <a:prstGeom prst="rect">
+            <a:avLst/>
+          </a:prstGeom>
+          <a:ln w="12700">
+            <a:solidFill>
+              <a:srgbClr val="D67A3B"/>
+            </a:solidFill>
+          </a:ln>
+        </p:spPr>
+      </p:pic>
+      <p:pic>
+        <p:nvPicPr>
+          <p:cNvPr id="13" name="Picture 12">
+            <a:extLst>
+              <a:ext uri="{FF2B5EF4-FFF2-40B4-BE49-F238E27FC236}">
+                <a16:creationId xmlns:a16="http://schemas.microsoft.com/office/drawing/2014/main" id="{0D7BD9BF-252B-BA54-46DF-6E93E6377EBB}"/>
+              </a:ext>
+            </a:extLst>
+          </p:cNvPr>
+          <p:cNvPicPr>
+            <a:picLocks noChangeAspect="1"/>
+          </p:cNvPicPr>
+          <p:nvPr/>
+        </p:nvPicPr>
+        <p:blipFill>
+          <a:blip r:embed="rId7"/>
+          <a:stretch>
+            <a:fillRect/>
+          </a:stretch>
+        </p:blipFill>
+        <p:spPr>
+          <a:xfrm>
+            <a:off x="458057" y="1192203"/>
+            <a:ext cx="3742436" cy="2414475"/>
+          </a:xfrm>
+          <a:prstGeom prst="rect">
+            <a:avLst/>
+          </a:prstGeom>
+        </p:spPr>
+      </p:pic>
+      <p:sp>
+        <p:nvSpPr>
+          <p:cNvPr id="14" name="Rectangle 13">
+            <a:extLst>
+              <a:ext uri="{FF2B5EF4-FFF2-40B4-BE49-F238E27FC236}">
+                <a16:creationId xmlns:a16="http://schemas.microsoft.com/office/drawing/2014/main" id="{8C684C02-0334-DEC0-AB45-95A8331F1DCC}"/>
+              </a:ext>
+            </a:extLst>
+          </p:cNvPr>
+          <p:cNvSpPr/>
+          <p:nvPr/>
+        </p:nvSpPr>
+        <p:spPr>
+          <a:xfrm>
+            <a:off x="595731" y="1284411"/>
+            <a:ext cx="3377901" cy="803366"/>
+          </a:xfrm>
+          <a:prstGeom prst="rect">
+            <a:avLst/>
+          </a:prstGeom>
+          <a:noFill/>
+          <a:ln>
+            <a:solidFill>
+              <a:srgbClr val="FF0000"/>
+            </a:solidFill>
+            <a:prstDash val="sysDash"/>
+          </a:ln>
+        </p:spPr>
+        <p:style>
+          <a:lnRef idx="2">
+            <a:schemeClr val="accent1">
+              <a:shade val="15000"/>
+            </a:schemeClr>
+          </a:lnRef>
+          <a:fillRef idx="1">
+            <a:schemeClr val="accent1"/>
+          </a:fillRef>
+          <a:effectRef idx="0">
+            <a:schemeClr val="accent1"/>
+          </a:effectRef>
+          <a:fontRef idx="minor">
+            <a:schemeClr val="lt1"/>
+          </a:fontRef>
+        </p:style>
+        <p:txBody>
+          <a:bodyPr rtlCol="0" anchor="ctr"/>
+          <a:lstStyle/>
+          <a:p>
+            <a:pPr algn="ctr"/>
+            <a:endParaRPr lang="en-SG" dirty="0"/>
+          </a:p>
+        </p:txBody>
+      </p:sp>
+      <p:cxnSp>
+        <p:nvCxnSpPr>
+          <p:cNvPr id="16" name="Straight Arrow Connector 15">
+            <a:extLst>
+              <a:ext uri="{FF2B5EF4-FFF2-40B4-BE49-F238E27FC236}">
+                <a16:creationId xmlns:a16="http://schemas.microsoft.com/office/drawing/2014/main" id="{CE11EF62-9591-8CEC-E965-5989E8C55DC1}"/>
+              </a:ext>
+            </a:extLst>
+          </p:cNvPr>
+          <p:cNvCxnSpPr>
+            <a:cxnSpLocks/>
+          </p:cNvCxnSpPr>
+          <p:nvPr/>
+        </p:nvCxnSpPr>
+        <p:spPr>
+          <a:xfrm>
+            <a:off x="3962195" y="1448465"/>
+            <a:ext cx="2501450" cy="0"/>
+          </a:xfrm>
+          <a:prstGeom prst="straightConnector1">
+            <a:avLst/>
+          </a:prstGeom>
+          <a:ln>
+            <a:solidFill>
+              <a:srgbClr val="FF0000"/>
+            </a:solidFill>
+            <a:prstDash val="sysDash"/>
+            <a:tailEnd type="triangle"/>
+          </a:ln>
+        </p:spPr>
+        <p:style>
+          <a:lnRef idx="2">
+            <a:schemeClr val="accent1"/>
+          </a:lnRef>
+          <a:fillRef idx="0">
+            <a:schemeClr val="accent1"/>
+          </a:fillRef>
+          <a:effectRef idx="1">
+            <a:schemeClr val="accent1"/>
+          </a:effectRef>
+          <a:fontRef idx="minor">
+            <a:schemeClr val="tx1"/>
+          </a:fontRef>
+        </p:style>
+      </p:cxnSp>
+      <p:sp>
+        <p:nvSpPr>
+          <p:cNvPr id="18" name="Rectangle 17">
+            <a:extLst>
+              <a:ext uri="{FF2B5EF4-FFF2-40B4-BE49-F238E27FC236}">
+                <a16:creationId xmlns:a16="http://schemas.microsoft.com/office/drawing/2014/main" id="{5C687B49-5FD7-6559-2B21-F55C5AA96D99}"/>
+              </a:ext>
+            </a:extLst>
+          </p:cNvPr>
+          <p:cNvSpPr/>
+          <p:nvPr/>
+        </p:nvSpPr>
+        <p:spPr>
+          <a:xfrm>
+            <a:off x="579224" y="4628829"/>
+            <a:ext cx="1323190" cy="803366"/>
+          </a:xfrm>
+          <a:prstGeom prst="rect">
+            <a:avLst/>
+          </a:prstGeom>
+          <a:noFill/>
+          <a:ln>
+            <a:solidFill>
+              <a:srgbClr val="FF0000"/>
+            </a:solidFill>
+            <a:prstDash val="sysDash"/>
+          </a:ln>
+        </p:spPr>
+        <p:style>
+          <a:lnRef idx="2">
+            <a:schemeClr val="accent1">
+              <a:shade val="15000"/>
+            </a:schemeClr>
+          </a:lnRef>
+          <a:fillRef idx="1">
+            <a:schemeClr val="accent1"/>
+          </a:fillRef>
+          <a:effectRef idx="0">
+            <a:schemeClr val="accent1"/>
+          </a:effectRef>
+          <a:fontRef idx="minor">
+            <a:schemeClr val="lt1"/>
+          </a:fontRef>
+        </p:style>
+        <p:txBody>
+          <a:bodyPr rtlCol="0" anchor="ctr"/>
+          <a:lstStyle/>
+          <a:p>
+            <a:pPr algn="ctr"/>
+            <a:endParaRPr lang="en-SG" dirty="0"/>
+          </a:p>
+        </p:txBody>
+      </p:sp>
+      <p:cxnSp>
+        <p:nvCxnSpPr>
+          <p:cNvPr id="19" name="Straight Arrow Connector 18">
+            <a:extLst>
+              <a:ext uri="{FF2B5EF4-FFF2-40B4-BE49-F238E27FC236}">
+                <a16:creationId xmlns:a16="http://schemas.microsoft.com/office/drawing/2014/main" id="{922B6FDA-0B0B-54C7-4B5E-C31349C01BB7}"/>
+              </a:ext>
+            </a:extLst>
+          </p:cNvPr>
+          <p:cNvCxnSpPr>
+            <a:cxnSpLocks/>
+          </p:cNvCxnSpPr>
+          <p:nvPr/>
+        </p:nvCxnSpPr>
+        <p:spPr>
+          <a:xfrm>
+            <a:off x="1902414" y="5252318"/>
+            <a:ext cx="2624866" cy="0"/>
+          </a:xfrm>
+          <a:prstGeom prst="straightConnector1">
+            <a:avLst/>
+          </a:prstGeom>
+          <a:ln>
+            <a:solidFill>
+              <a:srgbClr val="FF0000"/>
+            </a:solidFill>
+            <a:prstDash val="sysDash"/>
+            <a:tailEnd type="triangle"/>
+          </a:ln>
+        </p:spPr>
+        <p:style>
+          <a:lnRef idx="2">
+            <a:schemeClr val="accent1"/>
+          </a:lnRef>
+          <a:fillRef idx="0">
+            <a:schemeClr val="accent1"/>
+          </a:fillRef>
+          <a:effectRef idx="1">
+            <a:schemeClr val="accent1"/>
+          </a:effectRef>
+          <a:fontRef idx="minor">
+            <a:schemeClr val="tx1"/>
+          </a:fontRef>
+        </p:style>
+      </p:cxnSp>
+      <p:sp>
+        <p:nvSpPr>
+          <p:cNvPr id="21" name="Rectangle 20">
+            <a:extLst>
+              <a:ext uri="{FF2B5EF4-FFF2-40B4-BE49-F238E27FC236}">
+                <a16:creationId xmlns:a16="http://schemas.microsoft.com/office/drawing/2014/main" id="{0F064FE1-4BE3-82BA-B3E3-87DD08ABF516}"/>
+              </a:ext>
+            </a:extLst>
+          </p:cNvPr>
+          <p:cNvSpPr/>
+          <p:nvPr/>
+        </p:nvSpPr>
+        <p:spPr>
+          <a:xfrm>
+            <a:off x="2284681" y="4421884"/>
+            <a:ext cx="1032735" cy="721238"/>
+          </a:xfrm>
+          <a:prstGeom prst="rect">
+            <a:avLst/>
+          </a:prstGeom>
+          <a:noFill/>
+          <a:ln>
+            <a:solidFill>
+              <a:srgbClr val="FF0000"/>
+            </a:solidFill>
+            <a:prstDash val="sysDash"/>
+          </a:ln>
+        </p:spPr>
+        <p:style>
+          <a:lnRef idx="2">
+            <a:schemeClr val="accent1">
+              <a:shade val="15000"/>
+            </a:schemeClr>
+          </a:lnRef>
+          <a:fillRef idx="1">
+            <a:schemeClr val="accent1"/>
+          </a:fillRef>
+          <a:effectRef idx="0">
+            <a:schemeClr val="accent1"/>
+          </a:effectRef>
+          <a:fontRef idx="minor">
+            <a:schemeClr val="lt1"/>
+          </a:fontRef>
+        </p:style>
+        <p:txBody>
+          <a:bodyPr rtlCol="0" anchor="ctr"/>
+          <a:lstStyle/>
+          <a:p>
+            <a:pPr algn="ctr"/>
+            <a:endParaRPr lang="en-SG" dirty="0"/>
+          </a:p>
+        </p:txBody>
+      </p:sp>
+      <p:cxnSp>
+        <p:nvCxnSpPr>
+          <p:cNvPr id="23" name="Connector: Elbow 22">
+            <a:extLst>
+              <a:ext uri="{FF2B5EF4-FFF2-40B4-BE49-F238E27FC236}">
+                <a16:creationId xmlns:a16="http://schemas.microsoft.com/office/drawing/2014/main" id="{0FB73732-7C1F-14EF-892F-04007C8F4A06}"/>
+              </a:ext>
+            </a:extLst>
+          </p:cNvPr>
+          <p:cNvCxnSpPr>
+            <a:stCxn id="21" idx="0"/>
+            <a:endCxn id="9" idx="0"/>
+          </p:cNvCxnSpPr>
+          <p:nvPr/>
+        </p:nvCxnSpPr>
+        <p:spPr>
+          <a:xfrm rot="16200000" flipH="1">
+            <a:off x="5475622" y="1747310"/>
+            <a:ext cx="76291" cy="5425439"/>
+          </a:xfrm>
+          <a:prstGeom prst="bentConnector3">
+            <a:avLst>
+              <a:gd name="adj1" fmla="val -299642"/>
+            </a:avLst>
+          </a:prstGeom>
+          <a:ln>
+            <a:solidFill>
+              <a:srgbClr val="FF0000"/>
+            </a:solidFill>
+            <a:prstDash val="sysDash"/>
+            <a:tailEnd type="triangle"/>
+          </a:ln>
+        </p:spPr>
+        <p:style>
+          <a:lnRef idx="2">
+            <a:schemeClr val="accent1"/>
+          </a:lnRef>
+          <a:fillRef idx="0">
+            <a:schemeClr val="accent1"/>
+          </a:fillRef>
+          <a:effectRef idx="1">
+            <a:schemeClr val="accent1"/>
+          </a:effectRef>
+          <a:fontRef idx="minor">
+            <a:schemeClr val="tx1"/>
+          </a:fontRef>
+        </p:style>
+      </p:cxnSp>
+      <p:sp>
+        <p:nvSpPr>
+          <p:cNvPr id="25" name="Rectangle 24">
+            <a:extLst>
+              <a:ext uri="{FF2B5EF4-FFF2-40B4-BE49-F238E27FC236}">
+                <a16:creationId xmlns:a16="http://schemas.microsoft.com/office/drawing/2014/main" id="{C22D4887-48AB-297F-C434-3B14EC94AEA9}"/>
+              </a:ext>
+            </a:extLst>
+          </p:cNvPr>
+          <p:cNvSpPr/>
+          <p:nvPr/>
+        </p:nvSpPr>
+        <p:spPr>
+          <a:xfrm>
+            <a:off x="3484010" y="4421884"/>
+            <a:ext cx="803407" cy="544958"/>
+          </a:xfrm>
+          <a:prstGeom prst="rect">
+            <a:avLst/>
+          </a:prstGeom>
+          <a:noFill/>
+          <a:ln>
+            <a:solidFill>
+              <a:srgbClr val="FF0000"/>
+            </a:solidFill>
+            <a:prstDash val="sysDash"/>
+          </a:ln>
+        </p:spPr>
+        <p:style>
+          <a:lnRef idx="2">
+            <a:schemeClr val="accent1">
+              <a:shade val="15000"/>
+            </a:schemeClr>
+          </a:lnRef>
+          <a:fillRef idx="1">
+            <a:schemeClr val="accent1"/>
+          </a:fillRef>
+          <a:effectRef idx="0">
+            <a:schemeClr val="accent1"/>
+          </a:effectRef>
+          <a:fontRef idx="minor">
+            <a:schemeClr val="lt1"/>
+          </a:fontRef>
+        </p:style>
+        <p:txBody>
+          <a:bodyPr rtlCol="0" anchor="ctr"/>
+          <a:lstStyle/>
+          <a:p>
+            <a:pPr algn="ctr"/>
+            <a:endParaRPr lang="en-SG" dirty="0"/>
+          </a:p>
+        </p:txBody>
+      </p:sp>
+      <p:cxnSp>
+        <p:nvCxnSpPr>
+          <p:cNvPr id="26" name="Connector: Elbow 25">
+            <a:extLst>
+              <a:ext uri="{FF2B5EF4-FFF2-40B4-BE49-F238E27FC236}">
+                <a16:creationId xmlns:a16="http://schemas.microsoft.com/office/drawing/2014/main" id="{CDE0A277-53B8-F747-F0B3-A31C4CD71991}"/>
+              </a:ext>
+            </a:extLst>
+          </p:cNvPr>
+          <p:cNvCxnSpPr>
+            <a:cxnSpLocks/>
+            <a:stCxn id="25" idx="0"/>
+            <a:endCxn id="10" idx="0"/>
+          </p:cNvCxnSpPr>
+          <p:nvPr/>
+        </p:nvCxnSpPr>
+        <p:spPr>
+          <a:xfrm rot="16200000" flipH="1">
+            <a:off x="7284694" y="1022904"/>
+            <a:ext cx="66766" cy="6864727"/>
+          </a:xfrm>
+          <a:prstGeom prst="bentConnector3">
+            <a:avLst>
+              <a:gd name="adj1" fmla="val -242526"/>
+            </a:avLst>
+          </a:prstGeom>
+          <a:ln>
+            <a:solidFill>
+              <a:srgbClr val="FF0000"/>
+            </a:solidFill>
+            <a:prstDash val="sysDash"/>
+            <a:tailEnd type="triangle"/>
+          </a:ln>
+        </p:spPr>
+        <p:style>
+          <a:lnRef idx="2">
+            <a:schemeClr val="accent1"/>
+          </a:lnRef>
+          <a:fillRef idx="0">
+            <a:schemeClr val="accent1"/>
+          </a:fillRef>
+          <a:effectRef idx="1">
+            <a:schemeClr val="accent1"/>
+          </a:effectRef>
+          <a:fontRef idx="minor">
+            <a:schemeClr val="tx1"/>
+          </a:fontRef>
+        </p:style>
+      </p:cxnSp>
+      <p:sp>
+        <p:nvSpPr>
+          <p:cNvPr id="29" name="TextBox 28">
+            <a:extLst>
+              <a:ext uri="{FF2B5EF4-FFF2-40B4-BE49-F238E27FC236}">
+                <a16:creationId xmlns:a16="http://schemas.microsoft.com/office/drawing/2014/main" id="{34C3738D-9705-5A4F-D1D1-2D3D57CE11E5}"/>
+              </a:ext>
+            </a:extLst>
+          </p:cNvPr>
+          <p:cNvSpPr txBox="1"/>
+          <p:nvPr/>
+        </p:nvSpPr>
+        <p:spPr>
+          <a:xfrm>
+            <a:off x="1081182" y="1294577"/>
+            <a:ext cx="2647212" cy="307777"/>
+          </a:xfrm>
+          <a:prstGeom prst="rect">
+            <a:avLst/>
+          </a:prstGeom>
+          <a:noFill/>
+        </p:spPr>
+        <p:txBody>
+          <a:bodyPr wrap="square" rtlCol="0">
+            <a:spAutoFit/>
+          </a:bodyPr>
+          <a:lstStyle/>
+          <a:p>
+            <a:r>
+              <a:rPr lang="en-US" sz="1400" b="1" dirty="0">
+                <a:solidFill>
+                  <a:schemeClr val="accent1">
+                    <a:lumMod val="75000"/>
+                  </a:schemeClr>
+                </a:solidFill>
+              </a:rPr>
+              <a:t>Human Machine Interface </a:t>
+            </a:r>
+            <a:endParaRPr lang="en-US" sz="1100" b="1" dirty="0">
+              <a:solidFill>
+                <a:schemeClr val="accent1">
+                  <a:lumMod val="75000"/>
+                </a:schemeClr>
+              </a:solidFill>
+            </a:endParaRPr>
+          </a:p>
+        </p:txBody>
+      </p:sp>
+      <p:sp>
+        <p:nvSpPr>
+          <p:cNvPr id="34" name="TextBox 33">
+            <a:extLst>
+              <a:ext uri="{FF2B5EF4-FFF2-40B4-BE49-F238E27FC236}">
+                <a16:creationId xmlns:a16="http://schemas.microsoft.com/office/drawing/2014/main" id="{31EC018F-98DB-1F76-CF61-F8ED81740D01}"/>
+              </a:ext>
+            </a:extLst>
+          </p:cNvPr>
+          <p:cNvSpPr txBox="1"/>
+          <p:nvPr/>
+        </p:nvSpPr>
+        <p:spPr>
+          <a:xfrm>
+            <a:off x="308472" y="848728"/>
+            <a:ext cx="3634406" cy="307777"/>
+          </a:xfrm>
+          <a:prstGeom prst="rect">
+            <a:avLst/>
+          </a:prstGeom>
+          <a:noFill/>
+        </p:spPr>
+        <p:txBody>
+          <a:bodyPr wrap="square" rtlCol="0">
+            <a:spAutoFit/>
+          </a:bodyPr>
+          <a:lstStyle/>
+          <a:p>
+            <a:r>
+              <a:rPr lang="en-US" sz="1400" b="1" dirty="0"/>
+              <a:t>Real World Railway HQ Center HMI View</a:t>
+            </a:r>
+          </a:p>
+        </p:txBody>
+      </p:sp>
+      <p:sp>
+        <p:nvSpPr>
+          <p:cNvPr id="35" name="TextBox 34">
+            <a:extLst>
+              <a:ext uri="{FF2B5EF4-FFF2-40B4-BE49-F238E27FC236}">
+                <a16:creationId xmlns:a16="http://schemas.microsoft.com/office/drawing/2014/main" id="{1236FC93-8834-0760-2AC7-28624F2B5719}"/>
+              </a:ext>
+            </a:extLst>
+          </p:cNvPr>
+          <p:cNvSpPr txBox="1"/>
+          <p:nvPr/>
+        </p:nvSpPr>
+        <p:spPr>
+          <a:xfrm>
+            <a:off x="9015695" y="959797"/>
+            <a:ext cx="2647212" cy="276999"/>
+          </a:xfrm>
+          <a:prstGeom prst="rect">
+            <a:avLst/>
+          </a:prstGeom>
+          <a:noFill/>
+        </p:spPr>
+        <p:txBody>
+          <a:bodyPr wrap="square" rtlCol="0">
+            <a:spAutoFit/>
+          </a:bodyPr>
+          <a:lstStyle/>
+          <a:p>
+            <a:r>
+              <a:rPr lang="en-US" sz="1200" b="1" dirty="0">
+                <a:solidFill>
+                  <a:schemeClr val="accent1">
+                    <a:lumMod val="75000"/>
+                  </a:schemeClr>
+                </a:solidFill>
+              </a:rPr>
+              <a:t>Cyber Range HQ Management HMI</a:t>
+            </a:r>
+          </a:p>
+        </p:txBody>
+      </p:sp>
+      <p:sp>
+        <p:nvSpPr>
+          <p:cNvPr id="38" name="TextBox 37">
+            <a:extLst>
+              <a:ext uri="{FF2B5EF4-FFF2-40B4-BE49-F238E27FC236}">
+                <a16:creationId xmlns:a16="http://schemas.microsoft.com/office/drawing/2014/main" id="{0F0452DD-0DF4-3E1A-2238-3643F4BA6DCF}"/>
+              </a:ext>
+            </a:extLst>
+          </p:cNvPr>
+          <p:cNvSpPr txBox="1"/>
+          <p:nvPr/>
+        </p:nvSpPr>
+        <p:spPr>
+          <a:xfrm>
+            <a:off x="4442156" y="3891093"/>
+            <a:ext cx="7542899" cy="276999"/>
+          </a:xfrm>
+          <a:prstGeom prst="rect">
+            <a:avLst/>
+          </a:prstGeom>
+          <a:noFill/>
+        </p:spPr>
+        <p:txBody>
+          <a:bodyPr wrap="square" rtlCol="0">
+            <a:spAutoFit/>
+          </a:bodyPr>
+          <a:lstStyle/>
+          <a:p>
+            <a:r>
+              <a:rPr lang="en-US" sz="1200" b="1" dirty="0">
+                <a:solidFill>
+                  <a:schemeClr val="accent1"/>
+                </a:solidFill>
+              </a:rPr>
+              <a:t>Show the Signal, Track-block and Train HMI on small TVs or monitors  to simulate the Machine-Level HMIs</a:t>
+            </a:r>
+          </a:p>
+        </p:txBody>
+      </p:sp>
+      <p:pic>
+        <p:nvPicPr>
+          <p:cNvPr id="40" name="Graphic 39" descr="Programmer male with solid fill">
+            <a:extLst>
+              <a:ext uri="{FF2B5EF4-FFF2-40B4-BE49-F238E27FC236}">
+                <a16:creationId xmlns:a16="http://schemas.microsoft.com/office/drawing/2014/main" id="{699D71DD-5D1C-7851-6406-7351F74C94F1}"/>
+              </a:ext>
+            </a:extLst>
+          </p:cNvPr>
+          <p:cNvPicPr>
+            <a:picLocks noChangeAspect="1"/>
+          </p:cNvPicPr>
+          <p:nvPr/>
+        </p:nvPicPr>
+        <p:blipFill>
+          <a:blip r:embed="rId8">
+            <a:extLst>
+              <a:ext uri="{96DAC541-7B7A-43D3-8B79-37D633B846F1}">
+                <asvg:svgBlip xmlns:asvg="http://schemas.microsoft.com/office/drawing/2016/SVG/main" r:embed="rId9"/>
+              </a:ext>
+            </a:extLst>
+          </a:blip>
+          <a:stretch>
+            <a:fillRect/>
+          </a:stretch>
+        </p:blipFill>
+        <p:spPr>
+          <a:xfrm>
+            <a:off x="9305894" y="5816644"/>
+            <a:ext cx="542502" cy="542502"/>
+          </a:xfrm>
+          <a:prstGeom prst="rect">
+            <a:avLst/>
+          </a:prstGeom>
+        </p:spPr>
+      </p:pic>
+      <p:pic>
+        <p:nvPicPr>
+          <p:cNvPr id="41" name="Graphic 40" descr="Programmer male with solid fill">
+            <a:extLst>
+              <a:ext uri="{FF2B5EF4-FFF2-40B4-BE49-F238E27FC236}">
+                <a16:creationId xmlns:a16="http://schemas.microsoft.com/office/drawing/2014/main" id="{86D650C7-ADB3-D283-3D70-A0C6118C0388}"/>
+              </a:ext>
+            </a:extLst>
+          </p:cNvPr>
+          <p:cNvPicPr>
+            <a:picLocks noChangeAspect="1"/>
+          </p:cNvPicPr>
+          <p:nvPr/>
+        </p:nvPicPr>
+        <p:blipFill>
+          <a:blip r:embed="rId8">
+            <a:extLst>
+              <a:ext uri="{96DAC541-7B7A-43D3-8B79-37D633B846F1}">
+                <asvg:svgBlip xmlns:asvg="http://schemas.microsoft.com/office/drawing/2016/SVG/main" r:embed="rId9"/>
+              </a:ext>
+            </a:extLst>
+          </a:blip>
+          <a:stretch>
+            <a:fillRect/>
+          </a:stretch>
+        </p:blipFill>
+        <p:spPr>
+          <a:xfrm>
+            <a:off x="8760605" y="5822504"/>
+            <a:ext cx="540860" cy="540860"/>
+          </a:xfrm>
+          <a:prstGeom prst="rect">
+            <a:avLst/>
+          </a:prstGeom>
+        </p:spPr>
+      </p:pic>
+      <p:pic>
+        <p:nvPicPr>
+          <p:cNvPr id="42" name="Graphic 41" descr="Programmer male with solid fill">
+            <a:extLst>
+              <a:ext uri="{FF2B5EF4-FFF2-40B4-BE49-F238E27FC236}">
+                <a16:creationId xmlns:a16="http://schemas.microsoft.com/office/drawing/2014/main" id="{10927B74-9EC7-5090-5501-BF9F31C9B5EA}"/>
+              </a:ext>
+            </a:extLst>
+          </p:cNvPr>
+          <p:cNvPicPr>
+            <a:picLocks noChangeAspect="1"/>
+          </p:cNvPicPr>
+          <p:nvPr/>
+        </p:nvPicPr>
+        <p:blipFill>
+          <a:blip r:embed="rId8">
+            <a:extLst>
+              <a:ext uri="{96DAC541-7B7A-43D3-8B79-37D633B846F1}">
+                <asvg:svgBlip xmlns:asvg="http://schemas.microsoft.com/office/drawing/2016/SVG/main" r:embed="rId9"/>
+              </a:ext>
+            </a:extLst>
+          </a:blip>
+          <a:stretch>
+            <a:fillRect/>
+          </a:stretch>
+        </p:blipFill>
+        <p:spPr>
+          <a:xfrm>
+            <a:off x="8134685" y="5832030"/>
+            <a:ext cx="540860" cy="540860"/>
+          </a:xfrm>
+          <a:prstGeom prst="rect">
+            <a:avLst/>
+          </a:prstGeom>
+        </p:spPr>
+      </p:pic>
+      <p:sp>
+        <p:nvSpPr>
+          <p:cNvPr id="43" name="TextBox 42">
+            <a:extLst>
+              <a:ext uri="{FF2B5EF4-FFF2-40B4-BE49-F238E27FC236}">
+                <a16:creationId xmlns:a16="http://schemas.microsoft.com/office/drawing/2014/main" id="{26052E4E-0028-288E-ECEB-46855EC18473}"/>
+              </a:ext>
+            </a:extLst>
+          </p:cNvPr>
+          <p:cNvSpPr txBox="1"/>
+          <p:nvPr/>
+        </p:nvSpPr>
+        <p:spPr>
+          <a:xfrm>
+            <a:off x="9933456" y="5879832"/>
+            <a:ext cx="1828755" cy="461665"/>
+          </a:xfrm>
+          <a:prstGeom prst="rect">
+            <a:avLst/>
+          </a:prstGeom>
+          <a:noFill/>
+        </p:spPr>
+        <p:txBody>
+          <a:bodyPr wrap="square" rtlCol="0">
+            <a:spAutoFit/>
+          </a:bodyPr>
+          <a:lstStyle/>
+          <a:p>
+            <a:r>
+              <a:rPr lang="en-US" sz="1200" b="1" dirty="0">
+                <a:solidFill>
+                  <a:schemeClr val="accent1"/>
+                </a:solidFill>
+              </a:rPr>
+              <a:t>Cyber Exercise Blue Team Defenders </a:t>
+            </a:r>
+          </a:p>
+        </p:txBody>
+      </p:sp>
+      <p:pic>
+        <p:nvPicPr>
+          <p:cNvPr id="45" name="Graphic 44" descr="Construction worker male with solid fill">
+            <a:extLst>
+              <a:ext uri="{FF2B5EF4-FFF2-40B4-BE49-F238E27FC236}">
+                <a16:creationId xmlns:a16="http://schemas.microsoft.com/office/drawing/2014/main" id="{9231A78C-06EF-251A-0D34-281A065C03BD}"/>
+              </a:ext>
+            </a:extLst>
+          </p:cNvPr>
+          <p:cNvPicPr>
+            <a:picLocks noChangeAspect="1"/>
+          </p:cNvPicPr>
+          <p:nvPr/>
+        </p:nvPicPr>
+        <p:blipFill>
+          <a:blip r:embed="rId10">
+            <a:extLst>
+              <a:ext uri="{96DAC541-7B7A-43D3-8B79-37D633B846F1}">
+                <asvg:svgBlip xmlns:asvg="http://schemas.microsoft.com/office/drawing/2016/SVG/main" r:embed="rId11"/>
+              </a:ext>
+            </a:extLst>
+          </a:blip>
+          <a:stretch>
+            <a:fillRect/>
+          </a:stretch>
+        </p:blipFill>
+        <p:spPr>
+          <a:xfrm>
+            <a:off x="5249774" y="5895800"/>
+            <a:ext cx="482396" cy="482396"/>
+          </a:xfrm>
+          <a:prstGeom prst="rect">
+            <a:avLst/>
+          </a:prstGeom>
+        </p:spPr>
+      </p:pic>
+      <p:pic>
+        <p:nvPicPr>
+          <p:cNvPr id="48" name="Graphic 47" descr="Construction worker male with solid fill">
+            <a:extLst>
+              <a:ext uri="{FF2B5EF4-FFF2-40B4-BE49-F238E27FC236}">
+                <a16:creationId xmlns:a16="http://schemas.microsoft.com/office/drawing/2014/main" id="{B1BBD6FB-639E-13ED-A3FB-38532A5FA1A6}"/>
+              </a:ext>
+            </a:extLst>
+          </p:cNvPr>
+          <p:cNvPicPr>
+            <a:picLocks noChangeAspect="1"/>
+          </p:cNvPicPr>
+          <p:nvPr/>
+        </p:nvPicPr>
+        <p:blipFill>
+          <a:blip r:embed="rId10">
+            <a:extLst>
+              <a:ext uri="{96DAC541-7B7A-43D3-8B79-37D633B846F1}">
+                <asvg:svgBlip xmlns:asvg="http://schemas.microsoft.com/office/drawing/2016/SVG/main" r:embed="rId11"/>
+              </a:ext>
+            </a:extLst>
+          </a:blip>
+          <a:stretch>
+            <a:fillRect/>
+          </a:stretch>
+        </p:blipFill>
+        <p:spPr>
+          <a:xfrm>
+            <a:off x="4712767" y="5908703"/>
+            <a:ext cx="482396" cy="482396"/>
+          </a:xfrm>
+          <a:prstGeom prst="rect">
+            <a:avLst/>
+          </a:prstGeom>
+        </p:spPr>
+      </p:pic>
+      <p:pic>
+        <p:nvPicPr>
+          <p:cNvPr id="49" name="Graphic 48" descr="Construction worker male with solid fill">
+            <a:extLst>
+              <a:ext uri="{FF2B5EF4-FFF2-40B4-BE49-F238E27FC236}">
+                <a16:creationId xmlns:a16="http://schemas.microsoft.com/office/drawing/2014/main" id="{91934949-45A2-6FD1-1AA8-1279FFD56C3D}"/>
+              </a:ext>
+            </a:extLst>
+          </p:cNvPr>
+          <p:cNvPicPr>
+            <a:picLocks noChangeAspect="1"/>
+          </p:cNvPicPr>
+          <p:nvPr/>
+        </p:nvPicPr>
+        <p:blipFill>
+          <a:blip r:embed="rId10">
+            <a:extLst>
+              <a:ext uri="{96DAC541-7B7A-43D3-8B79-37D633B846F1}">
+                <asvg:svgBlip xmlns:asvg="http://schemas.microsoft.com/office/drawing/2016/SVG/main" r:embed="rId11"/>
+              </a:ext>
+            </a:extLst>
+          </a:blip>
+          <a:stretch>
+            <a:fillRect/>
+          </a:stretch>
+        </p:blipFill>
+        <p:spPr>
+          <a:xfrm>
+            <a:off x="5802026" y="5898042"/>
+            <a:ext cx="482396" cy="482396"/>
+          </a:xfrm>
+          <a:prstGeom prst="rect">
+            <a:avLst/>
+          </a:prstGeom>
+        </p:spPr>
+      </p:pic>
+      <p:sp>
+        <p:nvSpPr>
+          <p:cNvPr id="50" name="TextBox 49">
+            <a:extLst>
+              <a:ext uri="{FF2B5EF4-FFF2-40B4-BE49-F238E27FC236}">
+                <a16:creationId xmlns:a16="http://schemas.microsoft.com/office/drawing/2014/main" id="{457FFE1B-F3F8-AC1D-ECB0-EC301FD32919}"/>
+              </a:ext>
+            </a:extLst>
+          </p:cNvPr>
+          <p:cNvSpPr txBox="1"/>
+          <p:nvPr/>
+        </p:nvSpPr>
+        <p:spPr>
+          <a:xfrm>
+            <a:off x="6205951" y="5992351"/>
+            <a:ext cx="1983226" cy="276999"/>
+          </a:xfrm>
+          <a:prstGeom prst="rect">
+            <a:avLst/>
+          </a:prstGeom>
+          <a:noFill/>
+        </p:spPr>
+        <p:txBody>
+          <a:bodyPr wrap="square" rtlCol="0">
+            <a:spAutoFit/>
+          </a:bodyPr>
+          <a:lstStyle/>
+          <a:p>
+            <a:r>
+              <a:rPr lang="en-US" sz="1200" b="1" dirty="0">
+                <a:solidFill>
+                  <a:schemeClr val="accent2"/>
+                </a:solidFill>
+              </a:rPr>
+              <a:t>HQ System Operators </a:t>
+            </a:r>
+          </a:p>
+        </p:txBody>
+      </p:sp>
+      <p:sp>
+        <p:nvSpPr>
+          <p:cNvPr id="51" name="TextBox 50">
+            <a:extLst>
+              <a:ext uri="{FF2B5EF4-FFF2-40B4-BE49-F238E27FC236}">
+                <a16:creationId xmlns:a16="http://schemas.microsoft.com/office/drawing/2014/main" id="{64DF6111-308A-4658-310D-C13227FB27C7}"/>
+              </a:ext>
+            </a:extLst>
+          </p:cNvPr>
+          <p:cNvSpPr txBox="1"/>
+          <p:nvPr/>
+        </p:nvSpPr>
+        <p:spPr>
+          <a:xfrm>
+            <a:off x="4410023" y="4291079"/>
+            <a:ext cx="2104893" cy="261610"/>
+          </a:xfrm>
+          <a:prstGeom prst="rect">
+            <a:avLst/>
+          </a:prstGeom>
+          <a:noFill/>
+        </p:spPr>
+        <p:txBody>
+          <a:bodyPr wrap="square" rtlCol="0">
+            <a:spAutoFit/>
+          </a:bodyPr>
+          <a:lstStyle/>
+          <a:p>
+            <a:r>
+              <a:rPr lang="en-US" sz="1100" b="1" dirty="0">
+                <a:solidFill>
+                  <a:srgbClr val="D67A3B"/>
+                </a:solidFill>
+              </a:rPr>
+              <a:t>HQ Railway Block Control HMI</a:t>
+            </a:r>
+            <a:endParaRPr lang="en-SG" sz="1100" b="1" dirty="0">
+              <a:solidFill>
+                <a:srgbClr val="D67A3B"/>
+              </a:solidFill>
+            </a:endParaRPr>
+          </a:p>
+        </p:txBody>
+      </p:sp>
+      <p:sp>
+        <p:nvSpPr>
+          <p:cNvPr id="52" name="TextBox 51">
+            <a:extLst>
+              <a:ext uri="{FF2B5EF4-FFF2-40B4-BE49-F238E27FC236}">
+                <a16:creationId xmlns:a16="http://schemas.microsoft.com/office/drawing/2014/main" id="{E6FE6893-635C-A7E9-D5BB-EFF572628BD6}"/>
+              </a:ext>
+            </a:extLst>
+          </p:cNvPr>
+          <p:cNvSpPr txBox="1"/>
+          <p:nvPr/>
+        </p:nvSpPr>
+        <p:spPr>
+          <a:xfrm>
+            <a:off x="6941611" y="4275014"/>
+            <a:ext cx="2198550" cy="261610"/>
+          </a:xfrm>
+          <a:prstGeom prst="rect">
+            <a:avLst/>
+          </a:prstGeom>
+          <a:noFill/>
+        </p:spPr>
+        <p:txBody>
+          <a:bodyPr wrap="square" rtlCol="0">
+            <a:spAutoFit/>
+          </a:bodyPr>
+          <a:lstStyle/>
+          <a:p>
+            <a:r>
+              <a:rPr lang="en-US" sz="1100" b="1" dirty="0">
+                <a:solidFill>
+                  <a:srgbClr val="D67A3B"/>
+                </a:solidFill>
+              </a:rPr>
+              <a:t>HQ Signal System Monitor HMI</a:t>
+            </a:r>
+            <a:endParaRPr lang="en-SG" sz="1100" b="1" dirty="0">
+              <a:solidFill>
+                <a:srgbClr val="D67A3B"/>
+              </a:solidFill>
+            </a:endParaRPr>
+          </a:p>
+        </p:txBody>
+      </p:sp>
+      <p:sp>
+        <p:nvSpPr>
+          <p:cNvPr id="53" name="TextBox 52">
+            <a:extLst>
+              <a:ext uri="{FF2B5EF4-FFF2-40B4-BE49-F238E27FC236}">
+                <a16:creationId xmlns:a16="http://schemas.microsoft.com/office/drawing/2014/main" id="{9ED891A1-F130-8176-5619-9CEB48BA56B5}"/>
+              </a:ext>
+            </a:extLst>
+          </p:cNvPr>
+          <p:cNvSpPr txBox="1"/>
+          <p:nvPr/>
+        </p:nvSpPr>
+        <p:spPr>
+          <a:xfrm>
+            <a:off x="9511364" y="4243689"/>
+            <a:ext cx="2198550" cy="261610"/>
+          </a:xfrm>
+          <a:prstGeom prst="rect">
+            <a:avLst/>
+          </a:prstGeom>
+          <a:noFill/>
+        </p:spPr>
+        <p:txBody>
+          <a:bodyPr wrap="square" rtlCol="0">
+            <a:spAutoFit/>
+          </a:bodyPr>
+          <a:lstStyle/>
+          <a:p>
+            <a:r>
+              <a:rPr lang="en-US" sz="1100" b="1" dirty="0">
+                <a:solidFill>
+                  <a:srgbClr val="D67A3B"/>
+                </a:solidFill>
+              </a:rPr>
+              <a:t>HQ Railway Train Control HMI</a:t>
+            </a:r>
+            <a:endParaRPr lang="en-SG" sz="1100" b="1" dirty="0">
+              <a:solidFill>
+                <a:srgbClr val="D67A3B"/>
+              </a:solidFill>
+            </a:endParaRPr>
+          </a:p>
+        </p:txBody>
+      </p:sp>
+      <p:sp>
+        <p:nvSpPr>
+          <p:cNvPr id="54" name="TextBox 53">
+            <a:extLst>
+              <a:ext uri="{FF2B5EF4-FFF2-40B4-BE49-F238E27FC236}">
+                <a16:creationId xmlns:a16="http://schemas.microsoft.com/office/drawing/2014/main" id="{BE40CE42-2DE5-7A48-2D23-613471FDFD07}"/>
+              </a:ext>
+            </a:extLst>
+          </p:cNvPr>
+          <p:cNvSpPr txBox="1"/>
+          <p:nvPr/>
+        </p:nvSpPr>
+        <p:spPr>
+          <a:xfrm>
+            <a:off x="4657879" y="870269"/>
+            <a:ext cx="3634406" cy="307777"/>
+          </a:xfrm>
+          <a:prstGeom prst="rect">
+            <a:avLst/>
+          </a:prstGeom>
+          <a:noFill/>
+        </p:spPr>
+        <p:txBody>
+          <a:bodyPr wrap="square" rtlCol="0">
+            <a:spAutoFit/>
+          </a:bodyPr>
+          <a:lstStyle/>
+          <a:p>
+            <a:r>
+              <a:rPr lang="en-US" sz="1400" b="1" dirty="0"/>
+              <a:t>Cyber Exercise Simulated HQ HMI View </a:t>
+            </a:r>
+          </a:p>
+        </p:txBody>
+      </p:sp>
+      <p:sp>
+        <p:nvSpPr>
+          <p:cNvPr id="36" name="TextBox 35">
+            <a:extLst>
+              <a:ext uri="{FF2B5EF4-FFF2-40B4-BE49-F238E27FC236}">
+                <a16:creationId xmlns:a16="http://schemas.microsoft.com/office/drawing/2014/main" id="{FBD1D574-021B-1FBB-1DC7-616B1C901502}"/>
+              </a:ext>
+            </a:extLst>
+          </p:cNvPr>
+          <p:cNvSpPr txBox="1"/>
+          <p:nvPr/>
+        </p:nvSpPr>
+        <p:spPr>
+          <a:xfrm>
+            <a:off x="4424195" y="1461709"/>
+            <a:ext cx="2104893" cy="1015663"/>
+          </a:xfrm>
+          <a:prstGeom prst="rect">
+            <a:avLst/>
+          </a:prstGeom>
+          <a:noFill/>
+        </p:spPr>
+        <p:txBody>
+          <a:bodyPr wrap="square" rtlCol="0">
+            <a:spAutoFit/>
+          </a:bodyPr>
+          <a:lstStyle/>
+          <a:p>
+            <a:r>
+              <a:rPr lang="en-US" sz="1200" b="1" dirty="0">
+                <a:solidFill>
+                  <a:schemeClr val="accent1"/>
+                </a:solidFill>
+              </a:rPr>
+              <a:t>Show the cyber range </a:t>
+            </a:r>
+            <a:r>
+              <a:rPr lang="en-US" sz="1200" b="1" u="sng" dirty="0">
+                <a:solidFill>
+                  <a:schemeClr val="accent1"/>
+                </a:solidFill>
+              </a:rPr>
+              <a:t>HQ Management HMI </a:t>
+            </a:r>
+            <a:r>
+              <a:rPr lang="en-US" sz="1200" b="1" dirty="0">
+                <a:solidFill>
+                  <a:schemeClr val="accent1"/>
+                </a:solidFill>
+              </a:rPr>
+              <a:t>on the cyber exercise main screen to simulate the </a:t>
+            </a:r>
+            <a:r>
+              <a:rPr lang="en-US" sz="1200" b="1" u="sng" dirty="0">
+                <a:solidFill>
+                  <a:schemeClr val="accent1"/>
+                </a:solidFill>
+              </a:rPr>
+              <a:t>Supervisory HMI</a:t>
+            </a:r>
+            <a:r>
+              <a:rPr lang="en-US" sz="1200" b="1" dirty="0">
+                <a:solidFill>
+                  <a:schemeClr val="accent1"/>
+                </a:solidFill>
+              </a:rPr>
+              <a:t> in the real world </a:t>
+            </a:r>
+          </a:p>
+        </p:txBody>
+      </p:sp>
+      <p:pic>
+        <p:nvPicPr>
+          <p:cNvPr id="59" name="Picture 58" descr="A logo of a train&#10;&#10;Description automatically generated">
+            <a:extLst>
+              <a:ext uri="{FF2B5EF4-FFF2-40B4-BE49-F238E27FC236}">
+                <a16:creationId xmlns:a16="http://schemas.microsoft.com/office/drawing/2014/main" id="{D72E58F3-7E28-4FF0-D3FE-B1312CD3F7D4}"/>
+              </a:ext>
+            </a:extLst>
+          </p:cNvPr>
+          <p:cNvPicPr>
+            <a:picLocks noChangeAspect="1"/>
+          </p:cNvPicPr>
+          <p:nvPr/>
+        </p:nvPicPr>
+        <p:blipFill>
+          <a:blip r:embed="rId12">
+            <a:extLst>
+              <a:ext uri="{28A0092B-C50C-407E-A947-70E740481C1C}">
+                <a14:useLocalDpi xmlns:a14="http://schemas.microsoft.com/office/drawing/2010/main" val="0"/>
+              </a:ext>
+            </a:extLst>
+          </a:blip>
+          <a:stretch>
+            <a:fillRect/>
+          </a:stretch>
+        </p:blipFill>
+        <p:spPr>
+          <a:xfrm>
+            <a:off x="4878120" y="2680531"/>
+            <a:ext cx="1002848" cy="1030654"/>
+          </a:xfrm>
+          <a:prstGeom prst="rect">
+            <a:avLst/>
+          </a:prstGeom>
+          <a:ln w="19050">
+            <a:solidFill>
+              <a:schemeClr val="tx1"/>
+            </a:solidFill>
+          </a:ln>
+        </p:spPr>
+      </p:pic>
+    </p:spTree>
+    <p:extLst>
+      <p:ext uri="{BB962C8B-B14F-4D97-AF65-F5344CB8AC3E}">
+        <p14:creationId xmlns:p14="http://schemas.microsoft.com/office/powerpoint/2010/main" val="2676138871"/>
       </p:ext>
     </p:extLst>
   </p:cSld>

</xml_diff>